<commit_message>
updated presentation slide desk for Preprocessing, Exploratory Analysis, Challenges and Expansion Ideas
</commit_message>
<xml_diff>
--- a/Project 02.pptx
+++ b/Project 02.pptx
@@ -5,17 +5,20 @@
     <p:sldMasterId id="2147483648" r:id="rId1"/>
   </p:sldMasterIdLst>
   <p:notesMasterIdLst>
-    <p:notesMasterId r:id="rId10"/>
+    <p:notesMasterId r:id="rId13"/>
   </p:notesMasterIdLst>
   <p:sldIdLst>
     <p:sldId id="256" r:id="rId2"/>
     <p:sldId id="257" r:id="rId3"/>
     <p:sldId id="259" r:id="rId4"/>
-    <p:sldId id="261" r:id="rId5"/>
-    <p:sldId id="264" r:id="rId6"/>
-    <p:sldId id="263" r:id="rId7"/>
-    <p:sldId id="262" r:id="rId8"/>
-    <p:sldId id="260" r:id="rId9"/>
+    <p:sldId id="265" r:id="rId5"/>
+    <p:sldId id="266" r:id="rId6"/>
+    <p:sldId id="261" r:id="rId7"/>
+    <p:sldId id="264" r:id="rId8"/>
+    <p:sldId id="263" r:id="rId9"/>
+    <p:sldId id="262" r:id="rId10"/>
+    <p:sldId id="267" r:id="rId11"/>
+    <p:sldId id="260" r:id="rId12"/>
   </p:sldIdLst>
   <p:sldSz cx="9144000" cy="5143500" type="screen16x9"/>
   <p:notesSz cx="6858000" cy="9144000"/>
@@ -215,7 +218,7 @@
           <a:p>
             <a:fld id="{C8D18E60-4300-4729-A0D7-6AB984C3922D}" type="datetimeFigureOut">
               <a:rPr lang="en-US" smtClean="0"/>
-              <a:t>6/8/2022</a:t>
+              <a:t>6/10/22</a:t>
             </a:fld>
             <a:endParaRPr lang="en-US"/>
           </a:p>
@@ -526,7 +529,7 @@
           <a:bodyPr/>
           <a:lstStyle/>
           <a:p>
-            <a:endParaRPr lang="en-US"/>
+            <a:endParaRPr lang="en-US" dirty="0"/>
           </a:p>
         </p:txBody>
       </p:sp>
@@ -537,7 +540,7 @@
             <a:spLocks noGrp="1"/>
           </p:cNvSpPr>
           <p:nvPr>
-            <p:ph type="sldNum" sz="quarter" idx="10"/>
+            <p:ph type="sldNum" sz="quarter" idx="5"/>
           </p:nvPr>
         </p:nvSpPr>
         <p:spPr/>
@@ -545,9 +548,93 @@
           <a:bodyPr/>
           <a:lstStyle/>
           <a:p>
+            <a:fld id="{AF533E96-F078-4B3D-A8F4-F1AF21EBC357}" type="slidenum">
+              <a:rPr lang="en-US" smtClean="0"/>
+              <a:t>5</a:t>
+            </a:fld>
+            <a:endParaRPr lang="en-US"/>
+          </a:p>
+        </p:txBody>
+      </p:sp>
+    </p:spTree>
+    <p:extLst>
+      <p:ext uri="{BB962C8B-B14F-4D97-AF65-F5344CB8AC3E}">
+        <p14:creationId xmlns:p14="http://schemas.microsoft.com/office/powerpoint/2010/main" val="1424305248"/>
+      </p:ext>
+    </p:extLst>
+  </p:cSld>
+  <p:clrMapOvr>
+    <a:masterClrMapping/>
+  </p:clrMapOvr>
+</p:notes>
+</file>
+
+<file path=ppt/notesSlides/notesSlide2.xml><?xml version="1.0" encoding="utf-8"?>
+<p:notes xmlns:a="http://schemas.openxmlformats.org/drawingml/2006/main" xmlns:r="http://schemas.openxmlformats.org/officeDocument/2006/relationships" xmlns:p="http://schemas.openxmlformats.org/presentationml/2006/main">
+  <p:cSld>
+    <p:spTree>
+      <p:nvGrpSpPr>
+        <p:cNvPr id="1" name=""/>
+        <p:cNvGrpSpPr/>
+        <p:nvPr/>
+      </p:nvGrpSpPr>
+      <p:grpSpPr>
+        <a:xfrm>
+          <a:off x="0" y="0"/>
+          <a:ext cx="0" cy="0"/>
+          <a:chOff x="0" y="0"/>
+          <a:chExt cx="0" cy="0"/>
+        </a:xfrm>
+      </p:grpSpPr>
+      <p:sp>
+        <p:nvSpPr>
+          <p:cNvPr id="2" name="Slide Image Placeholder 1"/>
+          <p:cNvSpPr>
+            <a:spLocks noGrp="1" noRot="1" noChangeAspect="1"/>
+          </p:cNvSpPr>
+          <p:nvPr>
+            <p:ph type="sldImg"/>
+          </p:nvPr>
+        </p:nvSpPr>
+        <p:spPr/>
+      </p:sp>
+      <p:sp>
+        <p:nvSpPr>
+          <p:cNvPr id="3" name="Notes Placeholder 2"/>
+          <p:cNvSpPr>
+            <a:spLocks noGrp="1"/>
+          </p:cNvSpPr>
+          <p:nvPr>
+            <p:ph type="body" idx="1"/>
+          </p:nvPr>
+        </p:nvSpPr>
+        <p:spPr/>
+        <p:txBody>
+          <a:bodyPr/>
+          <a:lstStyle/>
+          <a:p>
+            <a:endParaRPr lang="en-US"/>
+          </a:p>
+        </p:txBody>
+      </p:sp>
+      <p:sp>
+        <p:nvSpPr>
+          <p:cNvPr id="4" name="Slide Number Placeholder 3"/>
+          <p:cNvSpPr>
+            <a:spLocks noGrp="1"/>
+          </p:cNvSpPr>
+          <p:nvPr>
+            <p:ph type="sldNum" sz="quarter" idx="10"/>
+          </p:nvPr>
+        </p:nvSpPr>
+        <p:spPr/>
+        <p:txBody>
+          <a:bodyPr/>
+          <a:lstStyle/>
+          <a:p>
             <a:fld id="{87350B06-B074-48FC-8CFD-53D2CD8FB95F}" type="slidenum">
               <a:rPr lang="en-US" smtClean="0"/>
-              <a:t>8</a:t>
+              <a:t>11</a:t>
             </a:fld>
             <a:endParaRPr lang="en-US"/>
           </a:p>
@@ -785,7 +872,7 @@
             <a:fld id="{53074F12-AA26-4AC8-9962-C36BB8F32554}" type="datetimeFigureOut">
               <a:rPr lang="en-US" smtClean="0"/>
               <a:pPr/>
-              <a:t>6/8/2022</a:t>
+              <a:t>6/10/22</a:t>
             </a:fld>
             <a:endParaRPr lang="en-US"/>
           </a:p>
@@ -1039,7 +1126,7 @@
             <a:fld id="{53074F12-AA26-4AC8-9962-C36BB8F32554}" type="datetimeFigureOut">
               <a:rPr lang="en-US" smtClean="0"/>
               <a:pPr/>
-              <a:t>6/8/2022</a:t>
+              <a:t>6/10/22</a:t>
             </a:fld>
             <a:endParaRPr lang="en-US"/>
           </a:p>
@@ -1209,7 +1296,7 @@
             <a:fld id="{53074F12-AA26-4AC8-9962-C36BB8F32554}" type="datetimeFigureOut">
               <a:rPr lang="en-US" smtClean="0"/>
               <a:pPr/>
-              <a:t>6/8/2022</a:t>
+              <a:t>6/10/22</a:t>
             </a:fld>
             <a:endParaRPr lang="en-US"/>
           </a:p>
@@ -1389,7 +1476,7 @@
             <a:fld id="{53074F12-AA26-4AC8-9962-C36BB8F32554}" type="datetimeFigureOut">
               <a:rPr lang="en-US" smtClean="0"/>
               <a:pPr/>
-              <a:t>6/8/2022</a:t>
+              <a:t>6/10/22</a:t>
             </a:fld>
             <a:endParaRPr lang="en-US"/>
           </a:p>
@@ -1671,7 +1758,7 @@
             <a:fld id="{53074F12-AA26-4AC8-9962-C36BB8F32554}" type="datetimeFigureOut">
               <a:rPr lang="en-US" smtClean="0"/>
               <a:pPr/>
-              <a:t>6/8/2022</a:t>
+              <a:t>6/10/22</a:t>
             </a:fld>
             <a:endParaRPr lang="en-US"/>
           </a:p>
@@ -1918,7 +2005,7 @@
             <a:fld id="{53074F12-AA26-4AC8-9962-C36BB8F32554}" type="datetimeFigureOut">
               <a:rPr lang="en-US" smtClean="0"/>
               <a:pPr/>
-              <a:t>6/8/2022</a:t>
+              <a:t>6/10/22</a:t>
             </a:fld>
             <a:endParaRPr lang="en-US"/>
           </a:p>
@@ -2165,7 +2252,7 @@
             <a:fld id="{53074F12-AA26-4AC8-9962-C36BB8F32554}" type="datetimeFigureOut">
               <a:rPr lang="en-US" smtClean="0"/>
               <a:pPr/>
-              <a:t>6/8/2022</a:t>
+              <a:t>6/10/22</a:t>
             </a:fld>
             <a:endParaRPr lang="en-US"/>
           </a:p>
@@ -2452,7 +2539,7 @@
             <a:fld id="{53074F12-AA26-4AC8-9962-C36BB8F32554}" type="datetimeFigureOut">
               <a:rPr lang="en-US" smtClean="0"/>
               <a:pPr/>
-              <a:t>6/8/2022</a:t>
+              <a:t>6/10/22</a:t>
             </a:fld>
             <a:endParaRPr lang="en-US"/>
           </a:p>
@@ -2939,7 +3026,7 @@
             <a:fld id="{53074F12-AA26-4AC8-9962-C36BB8F32554}" type="datetimeFigureOut">
               <a:rPr lang="en-US" smtClean="0"/>
               <a:pPr/>
-              <a:t>6/8/2022</a:t>
+              <a:t>6/10/22</a:t>
             </a:fld>
             <a:endParaRPr lang="en-US"/>
           </a:p>
@@ -3058,7 +3145,7 @@
             <a:fld id="{53074F12-AA26-4AC8-9962-C36BB8F32554}" type="datetimeFigureOut">
               <a:rPr lang="en-US" smtClean="0"/>
               <a:pPr/>
-              <a:t>6/8/2022</a:t>
+              <a:t>6/10/22</a:t>
             </a:fld>
             <a:endParaRPr lang="en-US"/>
           </a:p>
@@ -3155,7 +3242,7 @@
             <a:fld id="{53074F12-AA26-4AC8-9962-C36BB8F32554}" type="datetimeFigureOut">
               <a:rPr lang="en-US" smtClean="0"/>
               <a:pPr/>
-              <a:t>6/8/2022</a:t>
+              <a:t>6/10/22</a:t>
             </a:fld>
             <a:endParaRPr lang="en-US"/>
           </a:p>
@@ -3432,7 +3519,7 @@
             <a:fld id="{53074F12-AA26-4AC8-9962-C36BB8F32554}" type="datetimeFigureOut">
               <a:rPr lang="en-US" smtClean="0"/>
               <a:pPr/>
-              <a:t>6/8/2022</a:t>
+              <a:t>6/10/22</a:t>
             </a:fld>
             <a:endParaRPr lang="en-US"/>
           </a:p>
@@ -3654,7 +3741,7 @@
             <a:fld id="{53074F12-AA26-4AC8-9962-C36BB8F32554}" type="datetimeFigureOut">
               <a:rPr lang="en-US" smtClean="0"/>
               <a:pPr/>
-              <a:t>6/8/2022</a:t>
+              <a:t>6/10/22</a:t>
             </a:fld>
             <a:endParaRPr lang="en-US"/>
           </a:p>
@@ -4194,6 +4281,210 @@
 </p:sld>
 </file>
 
+<file path=ppt/slides/slide10.xml><?xml version="1.0" encoding="utf-8"?>
+<p:sld xmlns:a="http://schemas.openxmlformats.org/drawingml/2006/main" xmlns:r="http://schemas.openxmlformats.org/officeDocument/2006/relationships" xmlns:p="http://schemas.openxmlformats.org/presentationml/2006/main">
+  <p:cSld>
+    <p:spTree>
+      <p:nvGrpSpPr>
+        <p:cNvPr id="1" name=""/>
+        <p:cNvGrpSpPr/>
+        <p:nvPr/>
+      </p:nvGrpSpPr>
+      <p:grpSpPr>
+        <a:xfrm>
+          <a:off x="0" y="0"/>
+          <a:ext cx="0" cy="0"/>
+          <a:chOff x="0" y="0"/>
+          <a:chExt cx="0" cy="0"/>
+        </a:xfrm>
+      </p:grpSpPr>
+      <p:sp>
+        <p:nvSpPr>
+          <p:cNvPr id="2" name="Title 1">
+            <a:extLst>
+              <a:ext uri="{FF2B5EF4-FFF2-40B4-BE49-F238E27FC236}">
+                <a16:creationId xmlns:a16="http://schemas.microsoft.com/office/drawing/2014/main" id="{3B29FA3B-E1C3-E837-6783-7829D717D5B7}"/>
+              </a:ext>
+            </a:extLst>
+          </p:cNvPr>
+          <p:cNvSpPr>
+            <a:spLocks noGrp="1"/>
+          </p:cNvSpPr>
+          <p:nvPr>
+            <p:ph type="title"/>
+          </p:nvPr>
+        </p:nvSpPr>
+        <p:spPr/>
+        <p:txBody>
+          <a:bodyPr>
+            <a:normAutofit/>
+          </a:bodyPr>
+          <a:lstStyle/>
+          <a:p>
+            <a:r>
+              <a:rPr lang="en-US" dirty="0"/>
+              <a:t>Expansion Ideas</a:t>
+            </a:r>
+          </a:p>
+        </p:txBody>
+      </p:sp>
+      <p:sp>
+        <p:nvSpPr>
+          <p:cNvPr id="4" name="Content Placeholder 3">
+            <a:extLst>
+              <a:ext uri="{FF2B5EF4-FFF2-40B4-BE49-F238E27FC236}">
+                <a16:creationId xmlns:a16="http://schemas.microsoft.com/office/drawing/2014/main" id="{6B4C9F8C-F1DE-CDA9-4B21-8680FB68849B}"/>
+              </a:ext>
+            </a:extLst>
+          </p:cNvPr>
+          <p:cNvSpPr>
+            <a:spLocks noGrp="1"/>
+          </p:cNvSpPr>
+          <p:nvPr>
+            <p:ph sz="half" idx="2"/>
+          </p:nvPr>
+        </p:nvSpPr>
+        <p:spPr>
+          <a:xfrm>
+            <a:off x="522130" y="1636776"/>
+            <a:ext cx="8182957" cy="3054096"/>
+          </a:xfrm>
+        </p:spPr>
+        <p:txBody>
+          <a:bodyPr/>
+          <a:lstStyle/>
+          <a:p>
+            <a:pPr algn="l"/>
+            <a:r>
+              <a:rPr lang="en-US" dirty="0"/>
+              <a:t>LSTM model – Evaluation.</a:t>
+            </a:r>
+          </a:p>
+          <a:p>
+            <a:pPr algn="l"/>
+            <a:r>
+              <a:rPr lang="en-US" dirty="0"/>
+              <a:t>Data collection and Analysis from additional News source.</a:t>
+            </a:r>
+          </a:p>
+          <a:p>
+            <a:pPr algn="l"/>
+            <a:r>
+              <a:rPr lang="en-US" dirty="0"/>
+              <a:t>Expand News corpus volume.</a:t>
+            </a:r>
+          </a:p>
+          <a:p>
+            <a:pPr algn="l"/>
+            <a:r>
+              <a:rPr lang="en-US"/>
+              <a:t>Score sentiments </a:t>
+            </a:r>
+            <a:r>
+              <a:rPr lang="en-US" dirty="0"/>
+              <a:t>using RNNs.</a:t>
+            </a:r>
+          </a:p>
+          <a:p>
+            <a:pPr algn="l"/>
+            <a:r>
+              <a:rPr lang="en-US" dirty="0"/>
+              <a:t>Assess and compare models’ performance.</a:t>
+            </a:r>
+          </a:p>
+          <a:p>
+            <a:pPr algn="l"/>
+            <a:endParaRPr lang="en-US" dirty="0"/>
+          </a:p>
+          <a:p>
+            <a:pPr algn="l"/>
+            <a:endParaRPr lang="en-US" dirty="0"/>
+          </a:p>
+        </p:txBody>
+      </p:sp>
+    </p:spTree>
+    <p:extLst>
+      <p:ext uri="{BB962C8B-B14F-4D97-AF65-F5344CB8AC3E}">
+        <p14:creationId xmlns:p14="http://schemas.microsoft.com/office/powerpoint/2010/main" val="2327358653"/>
+      </p:ext>
+    </p:extLst>
+  </p:cSld>
+  <p:clrMapOvr>
+    <a:masterClrMapping/>
+  </p:clrMapOvr>
+</p:sld>
+</file>
+
+<file path=ppt/slides/slide11.xml><?xml version="1.0" encoding="utf-8"?>
+<p:sld xmlns:a="http://schemas.openxmlformats.org/drawingml/2006/main" xmlns:r="http://schemas.openxmlformats.org/officeDocument/2006/relationships" xmlns:p="http://schemas.openxmlformats.org/presentationml/2006/main">
+  <p:cSld>
+    <p:spTree>
+      <p:nvGrpSpPr>
+        <p:cNvPr id="1" name=""/>
+        <p:cNvGrpSpPr/>
+        <p:nvPr/>
+      </p:nvGrpSpPr>
+      <p:grpSpPr>
+        <a:xfrm>
+          <a:off x="0" y="0"/>
+          <a:ext cx="0" cy="0"/>
+          <a:chOff x="0" y="0"/>
+          <a:chExt cx="0" cy="0"/>
+        </a:xfrm>
+      </p:grpSpPr>
+      <p:sp>
+        <p:nvSpPr>
+          <p:cNvPr id="5" name="TextBox 4">
+            <a:extLst>
+              <a:ext uri="{FF2B5EF4-FFF2-40B4-BE49-F238E27FC236}">
+                <a16:creationId xmlns:a16="http://schemas.microsoft.com/office/drawing/2014/main" id="{C203A596-FF26-A210-2113-4A9A67629F3D}"/>
+              </a:ext>
+            </a:extLst>
+          </p:cNvPr>
+          <p:cNvSpPr txBox="1"/>
+          <p:nvPr/>
+        </p:nvSpPr>
+        <p:spPr>
+          <a:xfrm>
+            <a:off x="1856232" y="2387084"/>
+            <a:ext cx="5870448" cy="707886"/>
+          </a:xfrm>
+          <a:prstGeom prst="rect">
+            <a:avLst/>
+          </a:prstGeom>
+          <a:noFill/>
+        </p:spPr>
+        <p:txBody>
+          <a:bodyPr wrap="square" rtlCol="0">
+            <a:spAutoFit/>
+          </a:bodyPr>
+          <a:lstStyle/>
+          <a:p>
+            <a:pPr algn="ctr"/>
+            <a:r>
+              <a:rPr lang="en-US" sz="4000" dirty="0">
+                <a:solidFill>
+                  <a:schemeClr val="bg1"/>
+                </a:solidFill>
+              </a:rPr>
+              <a:t>Questions ?</a:t>
+            </a:r>
+          </a:p>
+        </p:txBody>
+      </p:sp>
+    </p:spTree>
+    <p:extLst>
+      <p:ext uri="{BB962C8B-B14F-4D97-AF65-F5344CB8AC3E}">
+        <p14:creationId xmlns:p14="http://schemas.microsoft.com/office/powerpoint/2010/main" val="109100692"/>
+      </p:ext>
+    </p:extLst>
+  </p:cSld>
+  <p:clrMapOvr>
+    <a:masterClrMapping/>
+  </p:clrMapOvr>
+</p:sld>
+</file>
+
 <file path=ppt/slides/slide2.xml><?xml version="1.0" encoding="utf-8"?>
 <p:sld xmlns:a="http://schemas.openxmlformats.org/drawingml/2006/main" xmlns:r="http://schemas.openxmlformats.org/officeDocument/2006/relationships" xmlns:p="http://schemas.openxmlformats.org/presentationml/2006/main">
   <p:cSld>
@@ -4248,7 +4539,7 @@
         <p:spPr/>
         <p:txBody>
           <a:bodyPr>
-            <a:normAutofit lnSpcReduction="10000"/>
+            <a:normAutofit fontScale="92500" lnSpcReduction="20000"/>
           </a:bodyPr>
           <a:lstStyle/>
           <a:p>
@@ -4260,7 +4551,7 @@
           <a:p>
             <a:r>
               <a:rPr lang="en-US" dirty="0"/>
-              <a:t>Preprocessing steps and Exploratory Analysis </a:t>
+              <a:t>Preprocessing and Exploratory Analysis </a:t>
             </a:r>
           </a:p>
           <a:p>
@@ -4284,7 +4575,13 @@
           <a:p>
             <a:r>
               <a:rPr lang="en-US" dirty="0"/>
-              <a:t>Expansions </a:t>
+              <a:t>Expansion</a:t>
+            </a:r>
+          </a:p>
+          <a:p>
+            <a:r>
+              <a:rPr lang="en-US" dirty="0"/>
+              <a:t> Ideas</a:t>
             </a:r>
           </a:p>
           <a:p>
@@ -4454,27 +4751,13 @@
         <p:spPr/>
         <p:txBody>
           <a:bodyPr>
-            <a:normAutofit fontScale="90000"/>
+            <a:normAutofit/>
           </a:bodyPr>
           <a:lstStyle/>
           <a:p>
             <a:r>
               <a:rPr lang="en-US" dirty="0"/>
-              <a:t>Pre-processing and </a:t>
-            </a:r>
-            <a:br>
-              <a:rPr lang="en-US" dirty="0"/>
-            </a:br>
-            <a:r>
-              <a:rPr lang="en-US" dirty="0"/>
-              <a:t>Exploratory </a:t>
-            </a:r>
-            <a:br>
-              <a:rPr lang="en-US" dirty="0"/>
-            </a:br>
-            <a:r>
-              <a:rPr lang="en-US" dirty="0"/>
-              <a:t>Analysis</a:t>
+              <a:t>Pre-processing</a:t>
             </a:r>
           </a:p>
         </p:txBody>
@@ -4500,7 +4783,10 @@
           <a:bodyPr/>
           <a:lstStyle/>
           <a:p>
-            <a:endParaRPr lang="en-US"/>
+            <a:r>
+              <a:rPr lang="en-US" dirty="0"/>
+              <a:t>Techniques</a:t>
+            </a:r>
           </a:p>
         </p:txBody>
       </p:sp>
@@ -4520,12 +4806,87 @@
             <p:ph sz="quarter" idx="4"/>
           </p:nvPr>
         </p:nvSpPr>
-        <p:spPr/>
-        <p:txBody>
-          <a:bodyPr/>
+        <p:spPr>
+          <a:xfrm>
+            <a:off x="4754880" y="2127914"/>
+            <a:ext cx="3844147" cy="2276294"/>
+          </a:xfrm>
+          <a:ln>
+            <a:solidFill>
+              <a:schemeClr val="accent1">
+                <a:lumMod val="40000"/>
+                <a:lumOff val="60000"/>
+                <a:alpha val="30000"/>
+              </a:schemeClr>
+            </a:solidFill>
+          </a:ln>
+        </p:spPr>
+        <p:txBody>
+          <a:bodyPr>
+            <a:normAutofit/>
+          </a:bodyPr>
           <a:lstStyle/>
           <a:p>
-            <a:endParaRPr lang="en-US"/>
+            <a:pPr lvl="1" algn="l">
+              <a:buFont typeface="Arial" panose="020B0604020202020204" pitchFamily="34" charset="0"/>
+              <a:buChar char="•"/>
+            </a:pPr>
+            <a:r>
+              <a:rPr lang="en-US" b="1" dirty="0"/>
+              <a:t>Lowercasing</a:t>
+            </a:r>
+          </a:p>
+          <a:p>
+            <a:pPr lvl="1" algn="l">
+              <a:buFont typeface="Arial" panose="020B0604020202020204" pitchFamily="34" charset="0"/>
+              <a:buChar char="•"/>
+            </a:pPr>
+            <a:r>
+              <a:rPr lang="en-US" b="1" dirty="0" err="1"/>
+              <a:t>Stopwords</a:t>
+            </a:r>
+            <a:endParaRPr lang="en-US" b="1" dirty="0"/>
+          </a:p>
+          <a:p>
+            <a:pPr lvl="1" algn="l">
+              <a:buFont typeface="Arial" panose="020B0604020202020204" pitchFamily="34" charset="0"/>
+              <a:buChar char="•"/>
+            </a:pPr>
+            <a:r>
+              <a:rPr lang="en-US" b="1" dirty="0"/>
+              <a:t>Word segmentation (Tokenization)</a:t>
+            </a:r>
+          </a:p>
+          <a:p>
+            <a:pPr lvl="1" algn="l">
+              <a:buFont typeface="Arial" panose="020B0604020202020204" pitchFamily="34" charset="0"/>
+              <a:buChar char="•"/>
+            </a:pPr>
+            <a:r>
+              <a:rPr lang="en-US" b="1" dirty="0"/>
+              <a:t>Lemmatization</a:t>
+            </a:r>
+          </a:p>
+          <a:p>
+            <a:pPr lvl="1" algn="l">
+              <a:buFont typeface="Arial" panose="020B0604020202020204" pitchFamily="34" charset="0"/>
+              <a:buChar char="•"/>
+            </a:pPr>
+            <a:r>
+              <a:rPr lang="en-US" b="1" dirty="0"/>
+              <a:t>TF-IDF</a:t>
+            </a:r>
+          </a:p>
+          <a:p>
+            <a:pPr algn="l"/>
+            <a:endParaRPr lang="en-US" b="1" dirty="0"/>
+          </a:p>
+          <a:p>
+            <a:pPr algn="l"/>
+            <a:endParaRPr lang="en-US" b="1" dirty="0"/>
+          </a:p>
+          <a:p>
+            <a:endParaRPr lang="en-US" dirty="0"/>
           </a:p>
         </p:txBody>
       </p:sp>
@@ -4550,7 +4911,10 @@
           <a:bodyPr/>
           <a:lstStyle/>
           <a:p>
-            <a:endParaRPr lang="en-US"/>
+            <a:r>
+              <a:rPr lang="en-US" dirty="0"/>
+              <a:t>Tools</a:t>
+            </a:r>
           </a:p>
         </p:txBody>
       </p:sp>
@@ -4570,25 +4934,924 @@
             <p:ph sz="half" idx="2"/>
           </p:nvPr>
         </p:nvSpPr>
-        <p:spPr/>
-        <p:txBody>
-          <a:bodyPr/>
+        <p:spPr>
+          <a:xfrm>
+            <a:off x="695867" y="2141845"/>
+            <a:ext cx="3391501" cy="2276294"/>
+          </a:xfrm>
+          <a:ln>
+            <a:solidFill>
+              <a:schemeClr val="accent1">
+                <a:lumMod val="40000"/>
+                <a:lumOff val="60000"/>
+                <a:alpha val="30000"/>
+              </a:schemeClr>
+            </a:solidFill>
+          </a:ln>
+        </p:spPr>
+        <p:txBody>
+          <a:bodyPr>
+            <a:normAutofit/>
+          </a:bodyPr>
           <a:lstStyle/>
           <a:p>
-            <a:endParaRPr lang="en-US"/>
+            <a:pPr algn="l"/>
+            <a:r>
+              <a:rPr lang="en-US" dirty="0"/>
+              <a:t>NLTK</a:t>
+            </a:r>
+          </a:p>
+          <a:p>
+            <a:pPr algn="l"/>
+            <a:r>
+              <a:rPr lang="en-US" dirty="0" err="1"/>
+              <a:t>WordCloud</a:t>
+            </a:r>
+            <a:endParaRPr lang="en-US" dirty="0"/>
           </a:p>
         </p:txBody>
       </p:sp>
     </p:spTree>
     <p:extLst>
       <p:ext uri="{BB962C8B-B14F-4D97-AF65-F5344CB8AC3E}">
-        <p14:creationId xmlns:p14="http://schemas.microsoft.com/office/powerpoint/2010/main" val="836583286"/>
+        <p14:creationId xmlns:p14="http://schemas.microsoft.com/office/powerpoint/2010/main" val="98785347"/>
       </p:ext>
     </p:extLst>
   </p:cSld>
   <p:clrMapOvr>
     <a:masterClrMapping/>
   </p:clrMapOvr>
+  <p:timing>
+    <p:tnLst>
+      <p:par>
+        <p:cTn id="1" dur="indefinite" restart="never" nodeType="tmRoot">
+          <p:childTnLst>
+            <p:seq concurrent="1" nextAc="seek">
+              <p:cTn id="2" dur="indefinite" nodeType="mainSeq">
+                <p:childTnLst>
+                  <p:par>
+                    <p:cTn id="3" fill="hold">
+                      <p:stCondLst>
+                        <p:cond delay="indefinite"/>
+                      </p:stCondLst>
+                      <p:childTnLst>
+                        <p:par>
+                          <p:cTn id="4" fill="hold">
+                            <p:stCondLst>
+                              <p:cond delay="0"/>
+                            </p:stCondLst>
+                            <p:childTnLst>
+                              <p:par>
+                                <p:cTn id="5" presetID="2" presetClass="entr" presetSubtype="4" fill="hold" grpId="0" nodeType="clickEffect">
+                                  <p:stCondLst>
+                                    <p:cond delay="0"/>
+                                  </p:stCondLst>
+                                  <p:childTnLst>
+                                    <p:set>
+                                      <p:cBhvr>
+                                        <p:cTn id="6" dur="1" fill="hold">
+                                          <p:stCondLst>
+                                            <p:cond delay="0"/>
+                                          </p:stCondLst>
+                                        </p:cTn>
+                                        <p:tgtEl>
+                                          <p:spTgt spid="12">
+                                            <p:txEl>
+                                              <p:pRg st="0" end="0"/>
+                                            </p:txEl>
+                                          </p:spTgt>
+                                        </p:tgtEl>
+                                        <p:attrNameLst>
+                                          <p:attrName>style.visibility</p:attrName>
+                                        </p:attrNameLst>
+                                      </p:cBhvr>
+                                      <p:to>
+                                        <p:strVal val="visible"/>
+                                      </p:to>
+                                    </p:set>
+                                    <p:anim calcmode="lin" valueType="num">
+                                      <p:cBhvr additive="base">
+                                        <p:cTn id="7" dur="500" fill="hold"/>
+                                        <p:tgtEl>
+                                          <p:spTgt spid="12">
+                                            <p:txEl>
+                                              <p:pRg st="0" end="0"/>
+                                            </p:txEl>
+                                          </p:spTgt>
+                                        </p:tgtEl>
+                                        <p:attrNameLst>
+                                          <p:attrName>ppt_x</p:attrName>
+                                        </p:attrNameLst>
+                                      </p:cBhvr>
+                                      <p:tavLst>
+                                        <p:tav tm="0">
+                                          <p:val>
+                                            <p:strVal val="#ppt_x"/>
+                                          </p:val>
+                                        </p:tav>
+                                        <p:tav tm="100000">
+                                          <p:val>
+                                            <p:strVal val="#ppt_x"/>
+                                          </p:val>
+                                        </p:tav>
+                                      </p:tavLst>
+                                    </p:anim>
+                                    <p:anim calcmode="lin" valueType="num">
+                                      <p:cBhvr additive="base">
+                                        <p:cTn id="8" dur="500" fill="hold"/>
+                                        <p:tgtEl>
+                                          <p:spTgt spid="12">
+                                            <p:txEl>
+                                              <p:pRg st="0" end="0"/>
+                                            </p:txEl>
+                                          </p:spTgt>
+                                        </p:tgtEl>
+                                        <p:attrNameLst>
+                                          <p:attrName>ppt_y</p:attrName>
+                                        </p:attrNameLst>
+                                      </p:cBhvr>
+                                      <p:tavLst>
+                                        <p:tav tm="0">
+                                          <p:val>
+                                            <p:strVal val="1+#ppt_h/2"/>
+                                          </p:val>
+                                        </p:tav>
+                                        <p:tav tm="100000">
+                                          <p:val>
+                                            <p:strVal val="#ppt_y"/>
+                                          </p:val>
+                                        </p:tav>
+                                      </p:tavLst>
+                                    </p:anim>
+                                  </p:childTnLst>
+                                </p:cTn>
+                              </p:par>
+                            </p:childTnLst>
+                          </p:cTn>
+                        </p:par>
+                      </p:childTnLst>
+                    </p:cTn>
+                  </p:par>
+                  <p:par>
+                    <p:cTn id="9" fill="hold">
+                      <p:stCondLst>
+                        <p:cond delay="indefinite"/>
+                      </p:stCondLst>
+                      <p:childTnLst>
+                        <p:par>
+                          <p:cTn id="10" fill="hold">
+                            <p:stCondLst>
+                              <p:cond delay="0"/>
+                            </p:stCondLst>
+                            <p:childTnLst>
+                              <p:par>
+                                <p:cTn id="11" presetID="2" presetClass="entr" presetSubtype="4" fill="hold" nodeType="clickEffect">
+                                  <p:stCondLst>
+                                    <p:cond delay="0"/>
+                                  </p:stCondLst>
+                                  <p:childTnLst>
+                                    <p:set>
+                                      <p:cBhvr>
+                                        <p:cTn id="12" dur="1" fill="hold">
+                                          <p:stCondLst>
+                                            <p:cond delay="0"/>
+                                          </p:stCondLst>
+                                        </p:cTn>
+                                        <p:tgtEl>
+                                          <p:spTgt spid="14">
+                                            <p:txEl>
+                                              <p:pRg st="0" end="0"/>
+                                            </p:txEl>
+                                          </p:spTgt>
+                                        </p:tgtEl>
+                                        <p:attrNameLst>
+                                          <p:attrName>style.visibility</p:attrName>
+                                        </p:attrNameLst>
+                                      </p:cBhvr>
+                                      <p:to>
+                                        <p:strVal val="visible"/>
+                                      </p:to>
+                                    </p:set>
+                                    <p:anim calcmode="lin" valueType="num">
+                                      <p:cBhvr additive="base">
+                                        <p:cTn id="13" dur="500" fill="hold"/>
+                                        <p:tgtEl>
+                                          <p:spTgt spid="14">
+                                            <p:txEl>
+                                              <p:pRg st="0" end="0"/>
+                                            </p:txEl>
+                                          </p:spTgt>
+                                        </p:tgtEl>
+                                        <p:attrNameLst>
+                                          <p:attrName>ppt_x</p:attrName>
+                                        </p:attrNameLst>
+                                      </p:cBhvr>
+                                      <p:tavLst>
+                                        <p:tav tm="0">
+                                          <p:val>
+                                            <p:strVal val="#ppt_x"/>
+                                          </p:val>
+                                        </p:tav>
+                                        <p:tav tm="100000">
+                                          <p:val>
+                                            <p:strVal val="#ppt_x"/>
+                                          </p:val>
+                                        </p:tav>
+                                      </p:tavLst>
+                                    </p:anim>
+                                    <p:anim calcmode="lin" valueType="num">
+                                      <p:cBhvr additive="base">
+                                        <p:cTn id="14" dur="500" fill="hold"/>
+                                        <p:tgtEl>
+                                          <p:spTgt spid="14">
+                                            <p:txEl>
+                                              <p:pRg st="0" end="0"/>
+                                            </p:txEl>
+                                          </p:spTgt>
+                                        </p:tgtEl>
+                                        <p:attrNameLst>
+                                          <p:attrName>ppt_y</p:attrName>
+                                        </p:attrNameLst>
+                                      </p:cBhvr>
+                                      <p:tavLst>
+                                        <p:tav tm="0">
+                                          <p:val>
+                                            <p:strVal val="1+#ppt_h/2"/>
+                                          </p:val>
+                                        </p:tav>
+                                        <p:tav tm="100000">
+                                          <p:val>
+                                            <p:strVal val="#ppt_y"/>
+                                          </p:val>
+                                        </p:tav>
+                                      </p:tavLst>
+                                    </p:anim>
+                                  </p:childTnLst>
+                                </p:cTn>
+                              </p:par>
+                              <p:par>
+                                <p:cTn id="15" presetID="2" presetClass="entr" presetSubtype="4" fill="hold" nodeType="withEffect">
+                                  <p:stCondLst>
+                                    <p:cond delay="0"/>
+                                  </p:stCondLst>
+                                  <p:childTnLst>
+                                    <p:set>
+                                      <p:cBhvr>
+                                        <p:cTn id="16" dur="1" fill="hold">
+                                          <p:stCondLst>
+                                            <p:cond delay="0"/>
+                                          </p:stCondLst>
+                                        </p:cTn>
+                                        <p:tgtEl>
+                                          <p:spTgt spid="14">
+                                            <p:txEl>
+                                              <p:pRg st="1" end="1"/>
+                                            </p:txEl>
+                                          </p:spTgt>
+                                        </p:tgtEl>
+                                        <p:attrNameLst>
+                                          <p:attrName>style.visibility</p:attrName>
+                                        </p:attrNameLst>
+                                      </p:cBhvr>
+                                      <p:to>
+                                        <p:strVal val="visible"/>
+                                      </p:to>
+                                    </p:set>
+                                    <p:anim calcmode="lin" valueType="num">
+                                      <p:cBhvr additive="base">
+                                        <p:cTn id="17" dur="500" fill="hold"/>
+                                        <p:tgtEl>
+                                          <p:spTgt spid="14">
+                                            <p:txEl>
+                                              <p:pRg st="1" end="1"/>
+                                            </p:txEl>
+                                          </p:spTgt>
+                                        </p:tgtEl>
+                                        <p:attrNameLst>
+                                          <p:attrName>ppt_x</p:attrName>
+                                        </p:attrNameLst>
+                                      </p:cBhvr>
+                                      <p:tavLst>
+                                        <p:tav tm="0">
+                                          <p:val>
+                                            <p:strVal val="#ppt_x"/>
+                                          </p:val>
+                                        </p:tav>
+                                        <p:tav tm="100000">
+                                          <p:val>
+                                            <p:strVal val="#ppt_x"/>
+                                          </p:val>
+                                        </p:tav>
+                                      </p:tavLst>
+                                    </p:anim>
+                                    <p:anim calcmode="lin" valueType="num">
+                                      <p:cBhvr additive="base">
+                                        <p:cTn id="18" dur="500" fill="hold"/>
+                                        <p:tgtEl>
+                                          <p:spTgt spid="14">
+                                            <p:txEl>
+                                              <p:pRg st="1" end="1"/>
+                                            </p:txEl>
+                                          </p:spTgt>
+                                        </p:tgtEl>
+                                        <p:attrNameLst>
+                                          <p:attrName>ppt_y</p:attrName>
+                                        </p:attrNameLst>
+                                      </p:cBhvr>
+                                      <p:tavLst>
+                                        <p:tav tm="0">
+                                          <p:val>
+                                            <p:strVal val="1+#ppt_h/2"/>
+                                          </p:val>
+                                        </p:tav>
+                                        <p:tav tm="100000">
+                                          <p:val>
+                                            <p:strVal val="#ppt_y"/>
+                                          </p:val>
+                                        </p:tav>
+                                      </p:tavLst>
+                                    </p:anim>
+                                  </p:childTnLst>
+                                </p:cTn>
+                              </p:par>
+                            </p:childTnLst>
+                          </p:cTn>
+                        </p:par>
+                      </p:childTnLst>
+                    </p:cTn>
+                  </p:par>
+                  <p:par>
+                    <p:cTn id="19" fill="hold">
+                      <p:stCondLst>
+                        <p:cond delay="indefinite"/>
+                      </p:stCondLst>
+                      <p:childTnLst>
+                        <p:par>
+                          <p:cTn id="20" fill="hold">
+                            <p:stCondLst>
+                              <p:cond delay="0"/>
+                            </p:stCondLst>
+                            <p:childTnLst>
+                              <p:par>
+                                <p:cTn id="21" presetID="2" presetClass="entr" presetSubtype="4" fill="hold" grpId="0" nodeType="clickEffect">
+                                  <p:stCondLst>
+                                    <p:cond delay="0"/>
+                                  </p:stCondLst>
+                                  <p:childTnLst>
+                                    <p:set>
+                                      <p:cBhvr>
+                                        <p:cTn id="22" dur="1" fill="hold">
+                                          <p:stCondLst>
+                                            <p:cond delay="0"/>
+                                          </p:stCondLst>
+                                        </p:cTn>
+                                        <p:tgtEl>
+                                          <p:spTgt spid="3">
+                                            <p:txEl>
+                                              <p:pRg st="0" end="0"/>
+                                            </p:txEl>
+                                          </p:spTgt>
+                                        </p:tgtEl>
+                                        <p:attrNameLst>
+                                          <p:attrName>style.visibility</p:attrName>
+                                        </p:attrNameLst>
+                                      </p:cBhvr>
+                                      <p:to>
+                                        <p:strVal val="visible"/>
+                                      </p:to>
+                                    </p:set>
+                                    <p:anim calcmode="lin" valueType="num">
+                                      <p:cBhvr additive="base">
+                                        <p:cTn id="23" dur="500" fill="hold"/>
+                                        <p:tgtEl>
+                                          <p:spTgt spid="3">
+                                            <p:txEl>
+                                              <p:pRg st="0" end="0"/>
+                                            </p:txEl>
+                                          </p:spTgt>
+                                        </p:tgtEl>
+                                        <p:attrNameLst>
+                                          <p:attrName>ppt_x</p:attrName>
+                                        </p:attrNameLst>
+                                      </p:cBhvr>
+                                      <p:tavLst>
+                                        <p:tav tm="0">
+                                          <p:val>
+                                            <p:strVal val="#ppt_x"/>
+                                          </p:val>
+                                        </p:tav>
+                                        <p:tav tm="100000">
+                                          <p:val>
+                                            <p:strVal val="#ppt_x"/>
+                                          </p:val>
+                                        </p:tav>
+                                      </p:tavLst>
+                                    </p:anim>
+                                    <p:anim calcmode="lin" valueType="num">
+                                      <p:cBhvr additive="base">
+                                        <p:cTn id="24" dur="500" fill="hold"/>
+                                        <p:tgtEl>
+                                          <p:spTgt spid="3">
+                                            <p:txEl>
+                                              <p:pRg st="0" end="0"/>
+                                            </p:txEl>
+                                          </p:spTgt>
+                                        </p:tgtEl>
+                                        <p:attrNameLst>
+                                          <p:attrName>ppt_y</p:attrName>
+                                        </p:attrNameLst>
+                                      </p:cBhvr>
+                                      <p:tavLst>
+                                        <p:tav tm="0">
+                                          <p:val>
+                                            <p:strVal val="1+#ppt_h/2"/>
+                                          </p:val>
+                                        </p:tav>
+                                        <p:tav tm="100000">
+                                          <p:val>
+                                            <p:strVal val="#ppt_y"/>
+                                          </p:val>
+                                        </p:tav>
+                                      </p:tavLst>
+                                    </p:anim>
+                                  </p:childTnLst>
+                                </p:cTn>
+                              </p:par>
+                            </p:childTnLst>
+                          </p:cTn>
+                        </p:par>
+                      </p:childTnLst>
+                    </p:cTn>
+                  </p:par>
+                  <p:par>
+                    <p:cTn id="25" fill="hold">
+                      <p:stCondLst>
+                        <p:cond delay="indefinite"/>
+                      </p:stCondLst>
+                      <p:childTnLst>
+                        <p:par>
+                          <p:cTn id="26" fill="hold">
+                            <p:stCondLst>
+                              <p:cond delay="0"/>
+                            </p:stCondLst>
+                            <p:childTnLst>
+                              <p:par>
+                                <p:cTn id="27" presetID="2" presetClass="entr" presetSubtype="4" fill="hold" nodeType="clickEffect">
+                                  <p:stCondLst>
+                                    <p:cond delay="0"/>
+                                  </p:stCondLst>
+                                  <p:childTnLst>
+                                    <p:set>
+                                      <p:cBhvr>
+                                        <p:cTn id="28" dur="1" fill="hold">
+                                          <p:stCondLst>
+                                            <p:cond delay="0"/>
+                                          </p:stCondLst>
+                                        </p:cTn>
+                                        <p:tgtEl>
+                                          <p:spTgt spid="10">
+                                            <p:txEl>
+                                              <p:pRg st="0" end="0"/>
+                                            </p:txEl>
+                                          </p:spTgt>
+                                        </p:tgtEl>
+                                        <p:attrNameLst>
+                                          <p:attrName>style.visibility</p:attrName>
+                                        </p:attrNameLst>
+                                      </p:cBhvr>
+                                      <p:to>
+                                        <p:strVal val="visible"/>
+                                      </p:to>
+                                    </p:set>
+                                    <p:anim calcmode="lin" valueType="num">
+                                      <p:cBhvr additive="base">
+                                        <p:cTn id="29" dur="500" fill="hold"/>
+                                        <p:tgtEl>
+                                          <p:spTgt spid="10">
+                                            <p:txEl>
+                                              <p:pRg st="0" end="0"/>
+                                            </p:txEl>
+                                          </p:spTgt>
+                                        </p:tgtEl>
+                                        <p:attrNameLst>
+                                          <p:attrName>ppt_x</p:attrName>
+                                        </p:attrNameLst>
+                                      </p:cBhvr>
+                                      <p:tavLst>
+                                        <p:tav tm="0">
+                                          <p:val>
+                                            <p:strVal val="#ppt_x"/>
+                                          </p:val>
+                                        </p:tav>
+                                        <p:tav tm="100000">
+                                          <p:val>
+                                            <p:strVal val="#ppt_x"/>
+                                          </p:val>
+                                        </p:tav>
+                                      </p:tavLst>
+                                    </p:anim>
+                                    <p:anim calcmode="lin" valueType="num">
+                                      <p:cBhvr additive="base">
+                                        <p:cTn id="30" dur="500" fill="hold"/>
+                                        <p:tgtEl>
+                                          <p:spTgt spid="10">
+                                            <p:txEl>
+                                              <p:pRg st="0" end="0"/>
+                                            </p:txEl>
+                                          </p:spTgt>
+                                        </p:tgtEl>
+                                        <p:attrNameLst>
+                                          <p:attrName>ppt_y</p:attrName>
+                                        </p:attrNameLst>
+                                      </p:cBhvr>
+                                      <p:tavLst>
+                                        <p:tav tm="0">
+                                          <p:val>
+                                            <p:strVal val="1+#ppt_h/2"/>
+                                          </p:val>
+                                        </p:tav>
+                                        <p:tav tm="100000">
+                                          <p:val>
+                                            <p:strVal val="#ppt_y"/>
+                                          </p:val>
+                                        </p:tav>
+                                      </p:tavLst>
+                                    </p:anim>
+                                  </p:childTnLst>
+                                </p:cTn>
+                              </p:par>
+                              <p:par>
+                                <p:cTn id="31" presetID="2" presetClass="entr" presetSubtype="4" fill="hold" nodeType="withEffect">
+                                  <p:stCondLst>
+                                    <p:cond delay="0"/>
+                                  </p:stCondLst>
+                                  <p:childTnLst>
+                                    <p:set>
+                                      <p:cBhvr>
+                                        <p:cTn id="32" dur="1" fill="hold">
+                                          <p:stCondLst>
+                                            <p:cond delay="0"/>
+                                          </p:stCondLst>
+                                        </p:cTn>
+                                        <p:tgtEl>
+                                          <p:spTgt spid="10">
+                                            <p:txEl>
+                                              <p:pRg st="1" end="1"/>
+                                            </p:txEl>
+                                          </p:spTgt>
+                                        </p:tgtEl>
+                                        <p:attrNameLst>
+                                          <p:attrName>style.visibility</p:attrName>
+                                        </p:attrNameLst>
+                                      </p:cBhvr>
+                                      <p:to>
+                                        <p:strVal val="visible"/>
+                                      </p:to>
+                                    </p:set>
+                                    <p:anim calcmode="lin" valueType="num">
+                                      <p:cBhvr additive="base">
+                                        <p:cTn id="33" dur="500" fill="hold"/>
+                                        <p:tgtEl>
+                                          <p:spTgt spid="10">
+                                            <p:txEl>
+                                              <p:pRg st="1" end="1"/>
+                                            </p:txEl>
+                                          </p:spTgt>
+                                        </p:tgtEl>
+                                        <p:attrNameLst>
+                                          <p:attrName>ppt_x</p:attrName>
+                                        </p:attrNameLst>
+                                      </p:cBhvr>
+                                      <p:tavLst>
+                                        <p:tav tm="0">
+                                          <p:val>
+                                            <p:strVal val="#ppt_x"/>
+                                          </p:val>
+                                        </p:tav>
+                                        <p:tav tm="100000">
+                                          <p:val>
+                                            <p:strVal val="#ppt_x"/>
+                                          </p:val>
+                                        </p:tav>
+                                      </p:tavLst>
+                                    </p:anim>
+                                    <p:anim calcmode="lin" valueType="num">
+                                      <p:cBhvr additive="base">
+                                        <p:cTn id="34" dur="500" fill="hold"/>
+                                        <p:tgtEl>
+                                          <p:spTgt spid="10">
+                                            <p:txEl>
+                                              <p:pRg st="1" end="1"/>
+                                            </p:txEl>
+                                          </p:spTgt>
+                                        </p:tgtEl>
+                                        <p:attrNameLst>
+                                          <p:attrName>ppt_y</p:attrName>
+                                        </p:attrNameLst>
+                                      </p:cBhvr>
+                                      <p:tavLst>
+                                        <p:tav tm="0">
+                                          <p:val>
+                                            <p:strVal val="1+#ppt_h/2"/>
+                                          </p:val>
+                                        </p:tav>
+                                        <p:tav tm="100000">
+                                          <p:val>
+                                            <p:strVal val="#ppt_y"/>
+                                          </p:val>
+                                        </p:tav>
+                                      </p:tavLst>
+                                    </p:anim>
+                                  </p:childTnLst>
+                                </p:cTn>
+                              </p:par>
+                              <p:par>
+                                <p:cTn id="35" presetID="2" presetClass="entr" presetSubtype="4" fill="hold" nodeType="withEffect">
+                                  <p:stCondLst>
+                                    <p:cond delay="0"/>
+                                  </p:stCondLst>
+                                  <p:childTnLst>
+                                    <p:set>
+                                      <p:cBhvr>
+                                        <p:cTn id="36" dur="1" fill="hold">
+                                          <p:stCondLst>
+                                            <p:cond delay="0"/>
+                                          </p:stCondLst>
+                                        </p:cTn>
+                                        <p:tgtEl>
+                                          <p:spTgt spid="10">
+                                            <p:txEl>
+                                              <p:pRg st="2" end="2"/>
+                                            </p:txEl>
+                                          </p:spTgt>
+                                        </p:tgtEl>
+                                        <p:attrNameLst>
+                                          <p:attrName>style.visibility</p:attrName>
+                                        </p:attrNameLst>
+                                      </p:cBhvr>
+                                      <p:to>
+                                        <p:strVal val="visible"/>
+                                      </p:to>
+                                    </p:set>
+                                    <p:anim calcmode="lin" valueType="num">
+                                      <p:cBhvr additive="base">
+                                        <p:cTn id="37" dur="500" fill="hold"/>
+                                        <p:tgtEl>
+                                          <p:spTgt spid="10">
+                                            <p:txEl>
+                                              <p:pRg st="2" end="2"/>
+                                            </p:txEl>
+                                          </p:spTgt>
+                                        </p:tgtEl>
+                                        <p:attrNameLst>
+                                          <p:attrName>ppt_x</p:attrName>
+                                        </p:attrNameLst>
+                                      </p:cBhvr>
+                                      <p:tavLst>
+                                        <p:tav tm="0">
+                                          <p:val>
+                                            <p:strVal val="#ppt_x"/>
+                                          </p:val>
+                                        </p:tav>
+                                        <p:tav tm="100000">
+                                          <p:val>
+                                            <p:strVal val="#ppt_x"/>
+                                          </p:val>
+                                        </p:tav>
+                                      </p:tavLst>
+                                    </p:anim>
+                                    <p:anim calcmode="lin" valueType="num">
+                                      <p:cBhvr additive="base">
+                                        <p:cTn id="38" dur="500" fill="hold"/>
+                                        <p:tgtEl>
+                                          <p:spTgt spid="10">
+                                            <p:txEl>
+                                              <p:pRg st="2" end="2"/>
+                                            </p:txEl>
+                                          </p:spTgt>
+                                        </p:tgtEl>
+                                        <p:attrNameLst>
+                                          <p:attrName>ppt_y</p:attrName>
+                                        </p:attrNameLst>
+                                      </p:cBhvr>
+                                      <p:tavLst>
+                                        <p:tav tm="0">
+                                          <p:val>
+                                            <p:strVal val="1+#ppt_h/2"/>
+                                          </p:val>
+                                        </p:tav>
+                                        <p:tav tm="100000">
+                                          <p:val>
+                                            <p:strVal val="#ppt_y"/>
+                                          </p:val>
+                                        </p:tav>
+                                      </p:tavLst>
+                                    </p:anim>
+                                  </p:childTnLst>
+                                </p:cTn>
+                              </p:par>
+                              <p:par>
+                                <p:cTn id="39" presetID="2" presetClass="entr" presetSubtype="4" fill="hold" nodeType="withEffect">
+                                  <p:stCondLst>
+                                    <p:cond delay="0"/>
+                                  </p:stCondLst>
+                                  <p:childTnLst>
+                                    <p:set>
+                                      <p:cBhvr>
+                                        <p:cTn id="40" dur="1" fill="hold">
+                                          <p:stCondLst>
+                                            <p:cond delay="0"/>
+                                          </p:stCondLst>
+                                        </p:cTn>
+                                        <p:tgtEl>
+                                          <p:spTgt spid="10">
+                                            <p:txEl>
+                                              <p:pRg st="3" end="3"/>
+                                            </p:txEl>
+                                          </p:spTgt>
+                                        </p:tgtEl>
+                                        <p:attrNameLst>
+                                          <p:attrName>style.visibility</p:attrName>
+                                        </p:attrNameLst>
+                                      </p:cBhvr>
+                                      <p:to>
+                                        <p:strVal val="visible"/>
+                                      </p:to>
+                                    </p:set>
+                                    <p:anim calcmode="lin" valueType="num">
+                                      <p:cBhvr additive="base">
+                                        <p:cTn id="41" dur="500" fill="hold"/>
+                                        <p:tgtEl>
+                                          <p:spTgt spid="10">
+                                            <p:txEl>
+                                              <p:pRg st="3" end="3"/>
+                                            </p:txEl>
+                                          </p:spTgt>
+                                        </p:tgtEl>
+                                        <p:attrNameLst>
+                                          <p:attrName>ppt_x</p:attrName>
+                                        </p:attrNameLst>
+                                      </p:cBhvr>
+                                      <p:tavLst>
+                                        <p:tav tm="0">
+                                          <p:val>
+                                            <p:strVal val="#ppt_x"/>
+                                          </p:val>
+                                        </p:tav>
+                                        <p:tav tm="100000">
+                                          <p:val>
+                                            <p:strVal val="#ppt_x"/>
+                                          </p:val>
+                                        </p:tav>
+                                      </p:tavLst>
+                                    </p:anim>
+                                    <p:anim calcmode="lin" valueType="num">
+                                      <p:cBhvr additive="base">
+                                        <p:cTn id="42" dur="500" fill="hold"/>
+                                        <p:tgtEl>
+                                          <p:spTgt spid="10">
+                                            <p:txEl>
+                                              <p:pRg st="3" end="3"/>
+                                            </p:txEl>
+                                          </p:spTgt>
+                                        </p:tgtEl>
+                                        <p:attrNameLst>
+                                          <p:attrName>ppt_y</p:attrName>
+                                        </p:attrNameLst>
+                                      </p:cBhvr>
+                                      <p:tavLst>
+                                        <p:tav tm="0">
+                                          <p:val>
+                                            <p:strVal val="1+#ppt_h/2"/>
+                                          </p:val>
+                                        </p:tav>
+                                        <p:tav tm="100000">
+                                          <p:val>
+                                            <p:strVal val="#ppt_y"/>
+                                          </p:val>
+                                        </p:tav>
+                                      </p:tavLst>
+                                    </p:anim>
+                                  </p:childTnLst>
+                                </p:cTn>
+                              </p:par>
+                              <p:par>
+                                <p:cTn id="43" presetID="2" presetClass="entr" presetSubtype="4" fill="hold" nodeType="withEffect">
+                                  <p:stCondLst>
+                                    <p:cond delay="0"/>
+                                  </p:stCondLst>
+                                  <p:childTnLst>
+                                    <p:set>
+                                      <p:cBhvr>
+                                        <p:cTn id="44" dur="1" fill="hold">
+                                          <p:stCondLst>
+                                            <p:cond delay="0"/>
+                                          </p:stCondLst>
+                                        </p:cTn>
+                                        <p:tgtEl>
+                                          <p:spTgt spid="10">
+                                            <p:txEl>
+                                              <p:pRg st="4" end="4"/>
+                                            </p:txEl>
+                                          </p:spTgt>
+                                        </p:tgtEl>
+                                        <p:attrNameLst>
+                                          <p:attrName>style.visibility</p:attrName>
+                                        </p:attrNameLst>
+                                      </p:cBhvr>
+                                      <p:to>
+                                        <p:strVal val="visible"/>
+                                      </p:to>
+                                    </p:set>
+                                    <p:anim calcmode="lin" valueType="num">
+                                      <p:cBhvr additive="base">
+                                        <p:cTn id="45" dur="500" fill="hold"/>
+                                        <p:tgtEl>
+                                          <p:spTgt spid="10">
+                                            <p:txEl>
+                                              <p:pRg st="4" end="4"/>
+                                            </p:txEl>
+                                          </p:spTgt>
+                                        </p:tgtEl>
+                                        <p:attrNameLst>
+                                          <p:attrName>ppt_x</p:attrName>
+                                        </p:attrNameLst>
+                                      </p:cBhvr>
+                                      <p:tavLst>
+                                        <p:tav tm="0">
+                                          <p:val>
+                                            <p:strVal val="#ppt_x"/>
+                                          </p:val>
+                                        </p:tav>
+                                        <p:tav tm="100000">
+                                          <p:val>
+                                            <p:strVal val="#ppt_x"/>
+                                          </p:val>
+                                        </p:tav>
+                                      </p:tavLst>
+                                    </p:anim>
+                                    <p:anim calcmode="lin" valueType="num">
+                                      <p:cBhvr additive="base">
+                                        <p:cTn id="46" dur="500" fill="hold"/>
+                                        <p:tgtEl>
+                                          <p:spTgt spid="10">
+                                            <p:txEl>
+                                              <p:pRg st="4" end="4"/>
+                                            </p:txEl>
+                                          </p:spTgt>
+                                        </p:tgtEl>
+                                        <p:attrNameLst>
+                                          <p:attrName>ppt_y</p:attrName>
+                                        </p:attrNameLst>
+                                      </p:cBhvr>
+                                      <p:tavLst>
+                                        <p:tav tm="0">
+                                          <p:val>
+                                            <p:strVal val="1+#ppt_h/2"/>
+                                          </p:val>
+                                        </p:tav>
+                                        <p:tav tm="100000">
+                                          <p:val>
+                                            <p:strVal val="#ppt_y"/>
+                                          </p:val>
+                                        </p:tav>
+                                      </p:tavLst>
+                                    </p:anim>
+                                  </p:childTnLst>
+                                </p:cTn>
+                              </p:par>
+                            </p:childTnLst>
+                          </p:cTn>
+                        </p:par>
+                      </p:childTnLst>
+                    </p:cTn>
+                  </p:par>
+                </p:childTnLst>
+              </p:cTn>
+              <p:prevCondLst>
+                <p:cond evt="onPrev" delay="0">
+                  <p:tgtEl>
+                    <p:sldTgt/>
+                  </p:tgtEl>
+                </p:cond>
+              </p:prevCondLst>
+              <p:nextCondLst>
+                <p:cond evt="onNext" delay="0">
+                  <p:tgtEl>
+                    <p:sldTgt/>
+                  </p:tgtEl>
+                </p:cond>
+              </p:nextCondLst>
+            </p:seq>
+          </p:childTnLst>
+        </p:cTn>
+      </p:par>
+    </p:tnLst>
+    <p:bldLst>
+      <p:bldP spid="3" grpId="0" build="p"/>
+      <p:bldP spid="12" grpId="0" build="p"/>
+    </p:bldLst>
+  </p:timing>
 </p:sld>
 </file>
 
@@ -4628,17 +5891,17 @@
           <a:p>
             <a:r>
               <a:rPr lang="en-US" dirty="0"/>
-              <a:t>NLP Sentiment Scores</a:t>
-            </a:r>
-          </a:p>
-        </p:txBody>
-      </p:sp>
-      <p:sp>
-        <p:nvSpPr>
-          <p:cNvPr id="14" name="Content Placeholder 13">
+              <a:t>	Exploratory Analysis</a:t>
+            </a:r>
+          </a:p>
+        </p:txBody>
+      </p:sp>
+      <p:sp>
+        <p:nvSpPr>
+          <p:cNvPr id="3" name="Text Placeholder 2">
             <a:extLst>
               <a:ext uri="{FF2B5EF4-FFF2-40B4-BE49-F238E27FC236}">
-                <a16:creationId xmlns:a16="http://schemas.microsoft.com/office/drawing/2014/main" id="{B8EA48B3-BFEC-5250-84ED-7AE604E94D24}"/>
+                <a16:creationId xmlns:a16="http://schemas.microsoft.com/office/drawing/2014/main" id="{4481ED22-CC5A-1C0C-92B1-BE18477AF5A0}"/>
               </a:ext>
             </a:extLst>
           </p:cNvPr>
@@ -4646,72 +5909,751 @@
             <a:spLocks noGrp="1"/>
           </p:cNvSpPr>
           <p:nvPr>
-            <p:ph sz="half" idx="2"/>
+            <p:ph type="body" sz="quarter" idx="3"/>
           </p:nvPr>
         </p:nvSpPr>
         <p:spPr>
           <a:xfrm>
-            <a:off x="390140" y="1667425"/>
-            <a:ext cx="8378468" cy="2276294"/>
+            <a:off x="4557252" y="1317189"/>
+            <a:ext cx="4041775" cy="479822"/>
           </a:xfrm>
         </p:spPr>
         <p:txBody>
-          <a:bodyPr>
-            <a:normAutofit fontScale="92500" lnSpcReduction="20000"/>
-          </a:bodyPr>
+          <a:bodyPr/>
           <a:lstStyle/>
           <a:p>
-            <a:pPr algn="l"/>
-            <a:r>
-              <a:rPr lang="en-US" dirty="0"/>
-              <a:t>Polygon Ticker News API</a:t>
-            </a:r>
-          </a:p>
-          <a:p>
-            <a:pPr algn="l"/>
-            <a:r>
-              <a:rPr lang="en-US" dirty="0"/>
-              <a:t>Sourced news articles for CY ‘22 ytd for various tickers</a:t>
-            </a:r>
-          </a:p>
-          <a:p>
-            <a:pPr algn="l"/>
-            <a:r>
-              <a:rPr lang="en-US" dirty="0"/>
-              <a:t>Performed sentiment analysis on both the title and text of new articles</a:t>
-            </a:r>
-          </a:p>
-          <a:p>
-            <a:pPr algn="l"/>
-            <a:r>
-              <a:rPr lang="en-US" dirty="0"/>
-              <a:t>Correlation metrics against stock performance to determine whether title or text compound score would serve as the main feature for the machine learning model</a:t>
-            </a:r>
-          </a:p>
-          <a:p>
-            <a:pPr marL="0" indent="0">
-              <a:buNone/>
-            </a:pPr>
-            <a:endParaRPr lang="en-US" dirty="0"/>
-          </a:p>
-          <a:p>
-            <a:pPr marL="0" indent="0">
-              <a:buNone/>
-            </a:pPr>
-            <a:endParaRPr lang="en-US" dirty="0"/>
-          </a:p>
-        </p:txBody>
-      </p:sp>
+            <a:r>
+              <a:rPr lang="en-US" dirty="0" err="1"/>
+              <a:t>Wordcloud</a:t>
+            </a:r>
+            <a:r>
+              <a:rPr lang="en-US" dirty="0"/>
+              <a:t> (XOM)</a:t>
+            </a:r>
+          </a:p>
+        </p:txBody>
+      </p:sp>
+      <p:pic>
+        <p:nvPicPr>
+          <p:cNvPr id="7" name="Content Placeholder 6" descr="Text&#10;&#10;Description automatically generated">
+            <a:extLst>
+              <a:ext uri="{FF2B5EF4-FFF2-40B4-BE49-F238E27FC236}">
+                <a16:creationId xmlns:a16="http://schemas.microsoft.com/office/drawing/2014/main" id="{3050D8A8-53E0-44F1-BC76-621215DCB520}"/>
+              </a:ext>
+            </a:extLst>
+          </p:cNvPr>
+          <p:cNvPicPr>
+            <a:picLocks noGrp="1" noChangeAspect="1"/>
+          </p:cNvPicPr>
+          <p:nvPr>
+            <p:ph sz="quarter" idx="4"/>
+          </p:nvPr>
+        </p:nvPicPr>
+        <p:blipFill>
+          <a:blip r:embed="rId3">
+            <a:extLst>
+              <a:ext uri="{28A0092B-C50C-407E-A947-70E740481C1C}">
+                <a14:useLocalDpi xmlns:a14="http://schemas.microsoft.com/office/drawing/2010/main" val="0"/>
+              </a:ext>
+            </a:extLst>
+          </a:blip>
+          <a:stretch>
+            <a:fillRect/>
+          </a:stretch>
+        </p:blipFill>
+        <p:spPr>
+          <a:xfrm>
+            <a:off x="4712680" y="1870997"/>
+            <a:ext cx="3799386" cy="1548464"/>
+          </a:xfrm>
+        </p:spPr>
+      </p:pic>
+      <p:sp>
+        <p:nvSpPr>
+          <p:cNvPr id="12" name="Text Placeholder 11">
+            <a:extLst>
+              <a:ext uri="{FF2B5EF4-FFF2-40B4-BE49-F238E27FC236}">
+                <a16:creationId xmlns:a16="http://schemas.microsoft.com/office/drawing/2014/main" id="{B47D7A09-57EA-F524-90A9-2457C48D5884}"/>
+              </a:ext>
+            </a:extLst>
+          </p:cNvPr>
+          <p:cNvSpPr>
+            <a:spLocks noGrp="1"/>
+          </p:cNvSpPr>
+          <p:nvPr>
+            <p:ph type="body" idx="1"/>
+          </p:nvPr>
+        </p:nvSpPr>
+        <p:spPr>
+          <a:xfrm>
+            <a:off x="522131" y="1317189"/>
+            <a:ext cx="4040188" cy="479822"/>
+          </a:xfrm>
+        </p:spPr>
+        <p:txBody>
+          <a:bodyPr/>
+          <a:lstStyle/>
+          <a:p>
+            <a:r>
+              <a:rPr lang="en-US" dirty="0" err="1"/>
+              <a:t>Wordcloud</a:t>
+            </a:r>
+            <a:r>
+              <a:rPr lang="en-US" dirty="0"/>
+              <a:t> (NVDA)</a:t>
+            </a:r>
+          </a:p>
+        </p:txBody>
+      </p:sp>
+      <p:pic>
+        <p:nvPicPr>
+          <p:cNvPr id="5" name="Content Placeholder 4" descr="Text&#10;&#10;Description automatically generated">
+            <a:extLst>
+              <a:ext uri="{FF2B5EF4-FFF2-40B4-BE49-F238E27FC236}">
+                <a16:creationId xmlns:a16="http://schemas.microsoft.com/office/drawing/2014/main" id="{6FB602CC-1C62-2873-24D5-CCB3F57C63BE}"/>
+              </a:ext>
+            </a:extLst>
+          </p:cNvPr>
+          <p:cNvPicPr>
+            <a:picLocks noGrp="1" noChangeAspect="1"/>
+          </p:cNvPicPr>
+          <p:nvPr>
+            <p:ph sz="half" idx="2"/>
+          </p:nvPr>
+        </p:nvPicPr>
+        <p:blipFill>
+          <a:blip r:embed="rId4">
+            <a:extLst>
+              <a:ext uri="{28A0092B-C50C-407E-A947-70E740481C1C}">
+                <a14:useLocalDpi xmlns:a14="http://schemas.microsoft.com/office/drawing/2010/main" val="0"/>
+              </a:ext>
+            </a:extLst>
+          </a:blip>
+          <a:stretch>
+            <a:fillRect/>
+          </a:stretch>
+        </p:blipFill>
+        <p:spPr>
+          <a:xfrm>
+            <a:off x="522289" y="1871393"/>
+            <a:ext cx="3821112" cy="1548463"/>
+          </a:xfrm>
+        </p:spPr>
+      </p:pic>
+      <p:pic>
+        <p:nvPicPr>
+          <p:cNvPr id="9" name="Picture 8" descr="Text&#10;&#10;Description automatically generated">
+            <a:extLst>
+              <a:ext uri="{FF2B5EF4-FFF2-40B4-BE49-F238E27FC236}">
+                <a16:creationId xmlns:a16="http://schemas.microsoft.com/office/drawing/2014/main" id="{60547F97-9673-A3D3-9A12-0789ACB64217}"/>
+              </a:ext>
+            </a:extLst>
+          </p:cNvPr>
+          <p:cNvPicPr>
+            <a:picLocks noChangeAspect="1"/>
+          </p:cNvPicPr>
+          <p:nvPr/>
+        </p:nvPicPr>
+        <p:blipFill>
+          <a:blip r:embed="rId5">
+            <a:extLst>
+              <a:ext uri="{28A0092B-C50C-407E-A947-70E740481C1C}">
+                <a14:useLocalDpi xmlns:a14="http://schemas.microsoft.com/office/drawing/2010/main" val="0"/>
+              </a:ext>
+            </a:extLst>
+          </a:blip>
+          <a:stretch>
+            <a:fillRect/>
+          </a:stretch>
+        </p:blipFill>
+        <p:spPr>
+          <a:xfrm>
+            <a:off x="532692" y="3508170"/>
+            <a:ext cx="3821112" cy="1548463"/>
+          </a:xfrm>
+          <a:prstGeom prst="rect">
+            <a:avLst/>
+          </a:prstGeom>
+        </p:spPr>
+      </p:pic>
+      <p:pic>
+        <p:nvPicPr>
+          <p:cNvPr id="13" name="Picture 12" descr="Text&#10;&#10;Description automatically generated with medium confidence">
+            <a:extLst>
+              <a:ext uri="{FF2B5EF4-FFF2-40B4-BE49-F238E27FC236}">
+                <a16:creationId xmlns:a16="http://schemas.microsoft.com/office/drawing/2014/main" id="{E66D4711-50D2-E4BC-BEE2-CB17A98C4F76}"/>
+              </a:ext>
+            </a:extLst>
+          </p:cNvPr>
+          <p:cNvPicPr>
+            <a:picLocks noChangeAspect="1"/>
+          </p:cNvPicPr>
+          <p:nvPr/>
+        </p:nvPicPr>
+        <p:blipFill>
+          <a:blip r:embed="rId6">
+            <a:extLst>
+              <a:ext uri="{28A0092B-C50C-407E-A947-70E740481C1C}">
+                <a14:useLocalDpi xmlns:a14="http://schemas.microsoft.com/office/drawing/2010/main" val="0"/>
+              </a:ext>
+            </a:extLst>
+          </a:blip>
+          <a:stretch>
+            <a:fillRect/>
+          </a:stretch>
+        </p:blipFill>
+        <p:spPr>
+          <a:xfrm>
+            <a:off x="4712680" y="3508044"/>
+            <a:ext cx="3799387" cy="1548464"/>
+          </a:xfrm>
+          <a:prstGeom prst="rect">
+            <a:avLst/>
+          </a:prstGeom>
+        </p:spPr>
+      </p:pic>
     </p:spTree>
     <p:extLst>
       <p:ext uri="{BB962C8B-B14F-4D97-AF65-F5344CB8AC3E}">
-        <p14:creationId xmlns:p14="http://schemas.microsoft.com/office/powerpoint/2010/main" val="2850158995"/>
+        <p14:creationId xmlns:p14="http://schemas.microsoft.com/office/powerpoint/2010/main" val="1784242546"/>
       </p:ext>
     </p:extLst>
   </p:cSld>
   <p:clrMapOvr>
     <a:masterClrMapping/>
   </p:clrMapOvr>
+  <p:timing>
+    <p:tnLst>
+      <p:par>
+        <p:cTn id="1" dur="indefinite" restart="never" nodeType="tmRoot">
+          <p:childTnLst>
+            <p:seq concurrent="1" nextAc="seek">
+              <p:cTn id="2" dur="indefinite" nodeType="mainSeq">
+                <p:childTnLst>
+                  <p:par>
+                    <p:cTn id="3" fill="hold">
+                      <p:stCondLst>
+                        <p:cond delay="indefinite"/>
+                      </p:stCondLst>
+                      <p:childTnLst>
+                        <p:par>
+                          <p:cTn id="4" fill="hold">
+                            <p:stCondLst>
+                              <p:cond delay="0"/>
+                            </p:stCondLst>
+                            <p:childTnLst>
+                              <p:par>
+                                <p:cTn id="5" presetID="2" presetClass="entr" presetSubtype="4" fill="hold" grpId="0" nodeType="clickEffect">
+                                  <p:stCondLst>
+                                    <p:cond delay="0"/>
+                                  </p:stCondLst>
+                                  <p:childTnLst>
+                                    <p:set>
+                                      <p:cBhvr>
+                                        <p:cTn id="6" dur="1" fill="hold">
+                                          <p:stCondLst>
+                                            <p:cond delay="0"/>
+                                          </p:stCondLst>
+                                        </p:cTn>
+                                        <p:tgtEl>
+                                          <p:spTgt spid="12">
+                                            <p:txEl>
+                                              <p:pRg st="0" end="0"/>
+                                            </p:txEl>
+                                          </p:spTgt>
+                                        </p:tgtEl>
+                                        <p:attrNameLst>
+                                          <p:attrName>style.visibility</p:attrName>
+                                        </p:attrNameLst>
+                                      </p:cBhvr>
+                                      <p:to>
+                                        <p:strVal val="visible"/>
+                                      </p:to>
+                                    </p:set>
+                                    <p:anim calcmode="lin" valueType="num">
+                                      <p:cBhvr additive="base">
+                                        <p:cTn id="7" dur="500" fill="hold"/>
+                                        <p:tgtEl>
+                                          <p:spTgt spid="12">
+                                            <p:txEl>
+                                              <p:pRg st="0" end="0"/>
+                                            </p:txEl>
+                                          </p:spTgt>
+                                        </p:tgtEl>
+                                        <p:attrNameLst>
+                                          <p:attrName>ppt_x</p:attrName>
+                                        </p:attrNameLst>
+                                      </p:cBhvr>
+                                      <p:tavLst>
+                                        <p:tav tm="0">
+                                          <p:val>
+                                            <p:strVal val="#ppt_x"/>
+                                          </p:val>
+                                        </p:tav>
+                                        <p:tav tm="100000">
+                                          <p:val>
+                                            <p:strVal val="#ppt_x"/>
+                                          </p:val>
+                                        </p:tav>
+                                      </p:tavLst>
+                                    </p:anim>
+                                    <p:anim calcmode="lin" valueType="num">
+                                      <p:cBhvr additive="base">
+                                        <p:cTn id="8" dur="500" fill="hold"/>
+                                        <p:tgtEl>
+                                          <p:spTgt spid="12">
+                                            <p:txEl>
+                                              <p:pRg st="0" end="0"/>
+                                            </p:txEl>
+                                          </p:spTgt>
+                                        </p:tgtEl>
+                                        <p:attrNameLst>
+                                          <p:attrName>ppt_y</p:attrName>
+                                        </p:attrNameLst>
+                                      </p:cBhvr>
+                                      <p:tavLst>
+                                        <p:tav tm="0">
+                                          <p:val>
+                                            <p:strVal val="1+#ppt_h/2"/>
+                                          </p:val>
+                                        </p:tav>
+                                        <p:tav tm="100000">
+                                          <p:val>
+                                            <p:strVal val="#ppt_y"/>
+                                          </p:val>
+                                        </p:tav>
+                                      </p:tavLst>
+                                    </p:anim>
+                                  </p:childTnLst>
+                                </p:cTn>
+                              </p:par>
+                              <p:par>
+                                <p:cTn id="9" presetID="2" presetClass="entr" presetSubtype="4" fill="hold" nodeType="withEffect">
+                                  <p:stCondLst>
+                                    <p:cond delay="0"/>
+                                  </p:stCondLst>
+                                  <p:childTnLst>
+                                    <p:set>
+                                      <p:cBhvr>
+                                        <p:cTn id="10" dur="1" fill="hold">
+                                          <p:stCondLst>
+                                            <p:cond delay="0"/>
+                                          </p:stCondLst>
+                                        </p:cTn>
+                                        <p:tgtEl>
+                                          <p:spTgt spid="5"/>
+                                        </p:tgtEl>
+                                        <p:attrNameLst>
+                                          <p:attrName>style.visibility</p:attrName>
+                                        </p:attrNameLst>
+                                      </p:cBhvr>
+                                      <p:to>
+                                        <p:strVal val="visible"/>
+                                      </p:to>
+                                    </p:set>
+                                    <p:anim calcmode="lin" valueType="num">
+                                      <p:cBhvr additive="base">
+                                        <p:cTn id="11" dur="500" fill="hold"/>
+                                        <p:tgtEl>
+                                          <p:spTgt spid="5"/>
+                                        </p:tgtEl>
+                                        <p:attrNameLst>
+                                          <p:attrName>ppt_x</p:attrName>
+                                        </p:attrNameLst>
+                                      </p:cBhvr>
+                                      <p:tavLst>
+                                        <p:tav tm="0">
+                                          <p:val>
+                                            <p:strVal val="#ppt_x"/>
+                                          </p:val>
+                                        </p:tav>
+                                        <p:tav tm="100000">
+                                          <p:val>
+                                            <p:strVal val="#ppt_x"/>
+                                          </p:val>
+                                        </p:tav>
+                                      </p:tavLst>
+                                    </p:anim>
+                                    <p:anim calcmode="lin" valueType="num">
+                                      <p:cBhvr additive="base">
+                                        <p:cTn id="12" dur="500" fill="hold"/>
+                                        <p:tgtEl>
+                                          <p:spTgt spid="5"/>
+                                        </p:tgtEl>
+                                        <p:attrNameLst>
+                                          <p:attrName>ppt_y</p:attrName>
+                                        </p:attrNameLst>
+                                      </p:cBhvr>
+                                      <p:tavLst>
+                                        <p:tav tm="0">
+                                          <p:val>
+                                            <p:strVal val="1+#ppt_h/2"/>
+                                          </p:val>
+                                        </p:tav>
+                                        <p:tav tm="100000">
+                                          <p:val>
+                                            <p:strVal val="#ppt_y"/>
+                                          </p:val>
+                                        </p:tav>
+                                      </p:tavLst>
+                                    </p:anim>
+                                  </p:childTnLst>
+                                </p:cTn>
+                              </p:par>
+                              <p:par>
+                                <p:cTn id="13" presetID="2" presetClass="entr" presetSubtype="4" fill="hold" grpId="0" nodeType="withEffect">
+                                  <p:stCondLst>
+                                    <p:cond delay="0"/>
+                                  </p:stCondLst>
+                                  <p:childTnLst>
+                                    <p:set>
+                                      <p:cBhvr>
+                                        <p:cTn id="14" dur="1" fill="hold">
+                                          <p:stCondLst>
+                                            <p:cond delay="0"/>
+                                          </p:stCondLst>
+                                        </p:cTn>
+                                        <p:tgtEl>
+                                          <p:spTgt spid="3">
+                                            <p:txEl>
+                                              <p:pRg st="0" end="0"/>
+                                            </p:txEl>
+                                          </p:spTgt>
+                                        </p:tgtEl>
+                                        <p:attrNameLst>
+                                          <p:attrName>style.visibility</p:attrName>
+                                        </p:attrNameLst>
+                                      </p:cBhvr>
+                                      <p:to>
+                                        <p:strVal val="visible"/>
+                                      </p:to>
+                                    </p:set>
+                                    <p:anim calcmode="lin" valueType="num">
+                                      <p:cBhvr additive="base">
+                                        <p:cTn id="15" dur="500" fill="hold"/>
+                                        <p:tgtEl>
+                                          <p:spTgt spid="3">
+                                            <p:txEl>
+                                              <p:pRg st="0" end="0"/>
+                                            </p:txEl>
+                                          </p:spTgt>
+                                        </p:tgtEl>
+                                        <p:attrNameLst>
+                                          <p:attrName>ppt_x</p:attrName>
+                                        </p:attrNameLst>
+                                      </p:cBhvr>
+                                      <p:tavLst>
+                                        <p:tav tm="0">
+                                          <p:val>
+                                            <p:strVal val="#ppt_x"/>
+                                          </p:val>
+                                        </p:tav>
+                                        <p:tav tm="100000">
+                                          <p:val>
+                                            <p:strVal val="#ppt_x"/>
+                                          </p:val>
+                                        </p:tav>
+                                      </p:tavLst>
+                                    </p:anim>
+                                    <p:anim calcmode="lin" valueType="num">
+                                      <p:cBhvr additive="base">
+                                        <p:cTn id="16" dur="500" fill="hold"/>
+                                        <p:tgtEl>
+                                          <p:spTgt spid="3">
+                                            <p:txEl>
+                                              <p:pRg st="0" end="0"/>
+                                            </p:txEl>
+                                          </p:spTgt>
+                                        </p:tgtEl>
+                                        <p:attrNameLst>
+                                          <p:attrName>ppt_y</p:attrName>
+                                        </p:attrNameLst>
+                                      </p:cBhvr>
+                                      <p:tavLst>
+                                        <p:tav tm="0">
+                                          <p:val>
+                                            <p:strVal val="1+#ppt_h/2"/>
+                                          </p:val>
+                                        </p:tav>
+                                        <p:tav tm="100000">
+                                          <p:val>
+                                            <p:strVal val="#ppt_y"/>
+                                          </p:val>
+                                        </p:tav>
+                                      </p:tavLst>
+                                    </p:anim>
+                                  </p:childTnLst>
+                                </p:cTn>
+                              </p:par>
+                              <p:par>
+                                <p:cTn id="17" presetID="2" presetClass="entr" presetSubtype="4" fill="hold" nodeType="withEffect">
+                                  <p:stCondLst>
+                                    <p:cond delay="0"/>
+                                  </p:stCondLst>
+                                  <p:childTnLst>
+                                    <p:set>
+                                      <p:cBhvr>
+                                        <p:cTn id="18" dur="1" fill="hold">
+                                          <p:stCondLst>
+                                            <p:cond delay="0"/>
+                                          </p:stCondLst>
+                                        </p:cTn>
+                                        <p:tgtEl>
+                                          <p:spTgt spid="7"/>
+                                        </p:tgtEl>
+                                        <p:attrNameLst>
+                                          <p:attrName>style.visibility</p:attrName>
+                                        </p:attrNameLst>
+                                      </p:cBhvr>
+                                      <p:to>
+                                        <p:strVal val="visible"/>
+                                      </p:to>
+                                    </p:set>
+                                    <p:anim calcmode="lin" valueType="num">
+                                      <p:cBhvr additive="base">
+                                        <p:cTn id="19" dur="500" fill="hold"/>
+                                        <p:tgtEl>
+                                          <p:spTgt spid="7"/>
+                                        </p:tgtEl>
+                                        <p:attrNameLst>
+                                          <p:attrName>ppt_x</p:attrName>
+                                        </p:attrNameLst>
+                                      </p:cBhvr>
+                                      <p:tavLst>
+                                        <p:tav tm="0">
+                                          <p:val>
+                                            <p:strVal val="#ppt_x"/>
+                                          </p:val>
+                                        </p:tav>
+                                        <p:tav tm="100000">
+                                          <p:val>
+                                            <p:strVal val="#ppt_x"/>
+                                          </p:val>
+                                        </p:tav>
+                                      </p:tavLst>
+                                    </p:anim>
+                                    <p:anim calcmode="lin" valueType="num">
+                                      <p:cBhvr additive="base">
+                                        <p:cTn id="20" dur="500" fill="hold"/>
+                                        <p:tgtEl>
+                                          <p:spTgt spid="7"/>
+                                        </p:tgtEl>
+                                        <p:attrNameLst>
+                                          <p:attrName>ppt_y</p:attrName>
+                                        </p:attrNameLst>
+                                      </p:cBhvr>
+                                      <p:tavLst>
+                                        <p:tav tm="0">
+                                          <p:val>
+                                            <p:strVal val="1+#ppt_h/2"/>
+                                          </p:val>
+                                        </p:tav>
+                                        <p:tav tm="100000">
+                                          <p:val>
+                                            <p:strVal val="#ppt_y"/>
+                                          </p:val>
+                                        </p:tav>
+                                      </p:tavLst>
+                                    </p:anim>
+                                  </p:childTnLst>
+                                </p:cTn>
+                              </p:par>
+                            </p:childTnLst>
+                          </p:cTn>
+                        </p:par>
+                      </p:childTnLst>
+                    </p:cTn>
+                  </p:par>
+                  <p:par>
+                    <p:cTn id="21" fill="hold">
+                      <p:stCondLst>
+                        <p:cond delay="indefinite"/>
+                      </p:stCondLst>
+                      <p:childTnLst>
+                        <p:par>
+                          <p:cTn id="22" fill="hold">
+                            <p:stCondLst>
+                              <p:cond delay="0"/>
+                            </p:stCondLst>
+                            <p:childTnLst>
+                              <p:par>
+                                <p:cTn id="23" presetID="2" presetClass="entr" presetSubtype="4" fill="hold" nodeType="clickEffect">
+                                  <p:stCondLst>
+                                    <p:cond delay="0"/>
+                                  </p:stCondLst>
+                                  <p:childTnLst>
+                                    <p:set>
+                                      <p:cBhvr>
+                                        <p:cTn id="24" dur="1" fill="hold">
+                                          <p:stCondLst>
+                                            <p:cond delay="0"/>
+                                          </p:stCondLst>
+                                        </p:cTn>
+                                        <p:tgtEl>
+                                          <p:spTgt spid="9"/>
+                                        </p:tgtEl>
+                                        <p:attrNameLst>
+                                          <p:attrName>style.visibility</p:attrName>
+                                        </p:attrNameLst>
+                                      </p:cBhvr>
+                                      <p:to>
+                                        <p:strVal val="visible"/>
+                                      </p:to>
+                                    </p:set>
+                                    <p:anim calcmode="lin" valueType="num">
+                                      <p:cBhvr additive="base">
+                                        <p:cTn id="25" dur="500" fill="hold"/>
+                                        <p:tgtEl>
+                                          <p:spTgt spid="9"/>
+                                        </p:tgtEl>
+                                        <p:attrNameLst>
+                                          <p:attrName>ppt_x</p:attrName>
+                                        </p:attrNameLst>
+                                      </p:cBhvr>
+                                      <p:tavLst>
+                                        <p:tav tm="0">
+                                          <p:val>
+                                            <p:strVal val="#ppt_x"/>
+                                          </p:val>
+                                        </p:tav>
+                                        <p:tav tm="100000">
+                                          <p:val>
+                                            <p:strVal val="#ppt_x"/>
+                                          </p:val>
+                                        </p:tav>
+                                      </p:tavLst>
+                                    </p:anim>
+                                    <p:anim calcmode="lin" valueType="num">
+                                      <p:cBhvr additive="base">
+                                        <p:cTn id="26" dur="500" fill="hold"/>
+                                        <p:tgtEl>
+                                          <p:spTgt spid="9"/>
+                                        </p:tgtEl>
+                                        <p:attrNameLst>
+                                          <p:attrName>ppt_y</p:attrName>
+                                        </p:attrNameLst>
+                                      </p:cBhvr>
+                                      <p:tavLst>
+                                        <p:tav tm="0">
+                                          <p:val>
+                                            <p:strVal val="1+#ppt_h/2"/>
+                                          </p:val>
+                                        </p:tav>
+                                        <p:tav tm="100000">
+                                          <p:val>
+                                            <p:strVal val="#ppt_y"/>
+                                          </p:val>
+                                        </p:tav>
+                                      </p:tavLst>
+                                    </p:anim>
+                                  </p:childTnLst>
+                                </p:cTn>
+                              </p:par>
+                              <p:par>
+                                <p:cTn id="27" presetID="2" presetClass="entr" presetSubtype="4" fill="hold" nodeType="withEffect">
+                                  <p:stCondLst>
+                                    <p:cond delay="0"/>
+                                  </p:stCondLst>
+                                  <p:childTnLst>
+                                    <p:set>
+                                      <p:cBhvr>
+                                        <p:cTn id="28" dur="1" fill="hold">
+                                          <p:stCondLst>
+                                            <p:cond delay="0"/>
+                                          </p:stCondLst>
+                                        </p:cTn>
+                                        <p:tgtEl>
+                                          <p:spTgt spid="13"/>
+                                        </p:tgtEl>
+                                        <p:attrNameLst>
+                                          <p:attrName>style.visibility</p:attrName>
+                                        </p:attrNameLst>
+                                      </p:cBhvr>
+                                      <p:to>
+                                        <p:strVal val="visible"/>
+                                      </p:to>
+                                    </p:set>
+                                    <p:anim calcmode="lin" valueType="num">
+                                      <p:cBhvr additive="base">
+                                        <p:cTn id="29" dur="500" fill="hold"/>
+                                        <p:tgtEl>
+                                          <p:spTgt spid="13"/>
+                                        </p:tgtEl>
+                                        <p:attrNameLst>
+                                          <p:attrName>ppt_x</p:attrName>
+                                        </p:attrNameLst>
+                                      </p:cBhvr>
+                                      <p:tavLst>
+                                        <p:tav tm="0">
+                                          <p:val>
+                                            <p:strVal val="#ppt_x"/>
+                                          </p:val>
+                                        </p:tav>
+                                        <p:tav tm="100000">
+                                          <p:val>
+                                            <p:strVal val="#ppt_x"/>
+                                          </p:val>
+                                        </p:tav>
+                                      </p:tavLst>
+                                    </p:anim>
+                                    <p:anim calcmode="lin" valueType="num">
+                                      <p:cBhvr additive="base">
+                                        <p:cTn id="30" dur="500" fill="hold"/>
+                                        <p:tgtEl>
+                                          <p:spTgt spid="13"/>
+                                        </p:tgtEl>
+                                        <p:attrNameLst>
+                                          <p:attrName>ppt_y</p:attrName>
+                                        </p:attrNameLst>
+                                      </p:cBhvr>
+                                      <p:tavLst>
+                                        <p:tav tm="0">
+                                          <p:val>
+                                            <p:strVal val="1+#ppt_h/2"/>
+                                          </p:val>
+                                        </p:tav>
+                                        <p:tav tm="100000">
+                                          <p:val>
+                                            <p:strVal val="#ppt_y"/>
+                                          </p:val>
+                                        </p:tav>
+                                      </p:tavLst>
+                                    </p:anim>
+                                  </p:childTnLst>
+                                </p:cTn>
+                              </p:par>
+                            </p:childTnLst>
+                          </p:cTn>
+                        </p:par>
+                      </p:childTnLst>
+                    </p:cTn>
+                  </p:par>
+                </p:childTnLst>
+              </p:cTn>
+              <p:prevCondLst>
+                <p:cond evt="onPrev" delay="0">
+                  <p:tgtEl>
+                    <p:sldTgt/>
+                  </p:tgtEl>
+                </p:cond>
+              </p:prevCondLst>
+              <p:nextCondLst>
+                <p:cond evt="onNext" delay="0">
+                  <p:tgtEl>
+                    <p:sldTgt/>
+                  </p:tgtEl>
+                </p:cond>
+              </p:nextCondLst>
+            </p:seq>
+          </p:childTnLst>
+        </p:cTn>
+      </p:par>
+    </p:tnLst>
+    <p:bldLst>
+      <p:bldP spid="3" grpId="0" build="p"/>
+      <p:bldP spid="12" grpId="0" build="p"/>
+    </p:bldLst>
+  </p:timing>
 </p:sld>
 </file>
 
@@ -4751,28 +6693,24 @@
           <a:p>
             <a:r>
               <a:rPr lang="en-US" dirty="0"/>
-              <a:t> </a:t>
+              <a:t>	Exploratory </a:t>
             </a:r>
             <a:br>
               <a:rPr lang="en-US" dirty="0"/>
             </a:br>
             <a:r>
               <a:rPr lang="en-US" dirty="0"/>
-              <a:t>ML - LSTM </a:t>
-            </a:r>
-            <a:br>
-              <a:rPr lang="en-US" dirty="0"/>
-            </a:br>
-            <a:endParaRPr lang="en-US" dirty="0"/>
-          </a:p>
-        </p:txBody>
-      </p:sp>
-      <p:sp>
-        <p:nvSpPr>
-          <p:cNvPr id="14" name="Content Placeholder 13">
+              <a:t>Sentiment Analysis</a:t>
+            </a:r>
+          </a:p>
+        </p:txBody>
+      </p:sp>
+      <p:sp>
+        <p:nvSpPr>
+          <p:cNvPr id="3" name="Text Placeholder 2">
             <a:extLst>
               <a:ext uri="{FF2B5EF4-FFF2-40B4-BE49-F238E27FC236}">
-                <a16:creationId xmlns:a16="http://schemas.microsoft.com/office/drawing/2014/main" id="{B8EA48B3-BFEC-5250-84ED-7AE604E94D24}"/>
+                <a16:creationId xmlns:a16="http://schemas.microsoft.com/office/drawing/2014/main" id="{4481ED22-CC5A-1C0C-92B1-BE18477AF5A0}"/>
               </a:ext>
             </a:extLst>
           </p:cNvPr>
@@ -4780,96 +6718,1275 @@
             <a:spLocks noGrp="1"/>
           </p:cNvSpPr>
           <p:nvPr>
-            <p:ph sz="half" idx="2"/>
+            <p:ph type="body" sz="quarter" idx="3"/>
           </p:nvPr>
         </p:nvSpPr>
         <p:spPr>
           <a:xfrm>
-            <a:off x="522131" y="2127914"/>
-            <a:ext cx="8161380" cy="2276294"/>
+            <a:off x="4557252" y="1341632"/>
+            <a:ext cx="4041775" cy="479822"/>
           </a:xfrm>
         </p:spPr>
         <p:txBody>
           <a:bodyPr>
-            <a:normAutofit fontScale="85000" lnSpcReduction="20000"/>
+            <a:normAutofit/>
           </a:bodyPr>
           <a:lstStyle/>
           <a:p>
-            <a:pPr algn="l"/>
-            <a:r>
-              <a:rPr lang="en-US" dirty="0"/>
-              <a:t>LSTM Model to predict future stock prices based upon sentiment scores</a:t>
-            </a:r>
-          </a:p>
-          <a:p>
-            <a:pPr algn="l"/>
-            <a:r>
-              <a:rPr lang="en-US" dirty="0"/>
-              <a:t>Natural Language Processing + Time Series Data</a:t>
-            </a:r>
-          </a:p>
-          <a:p>
-            <a:pPr algn="l"/>
-            <a:r>
-              <a:rPr lang="en-US" dirty="0"/>
-              <a:t>Hyperparameter Tuning</a:t>
-            </a:r>
-          </a:p>
-          <a:p>
-            <a:pPr lvl="1" algn="l"/>
-            <a:r>
-              <a:rPr lang="en-US" dirty="0"/>
-              <a:t>Window size</a:t>
-            </a:r>
-          </a:p>
-          <a:p>
-            <a:pPr lvl="1" algn="l"/>
-            <a:r>
-              <a:rPr lang="en-US" dirty="0"/>
-              <a:t>Number of Units</a:t>
-            </a:r>
-          </a:p>
-          <a:p>
-            <a:pPr lvl="1" algn="l"/>
-            <a:r>
-              <a:rPr lang="en-US" dirty="0"/>
-              <a:t>Dropout Ratio</a:t>
-            </a:r>
-          </a:p>
-          <a:p>
-            <a:pPr lvl="1" algn="l"/>
-            <a:r>
-              <a:rPr lang="en-US" dirty="0"/>
-              <a:t>Epochs</a:t>
-            </a:r>
-          </a:p>
-          <a:p>
-            <a:pPr lvl="1" algn="l"/>
-            <a:r>
-              <a:rPr lang="en-US" dirty="0"/>
-              <a:t>Batch Size</a:t>
-            </a:r>
-          </a:p>
-          <a:p>
-            <a:pPr algn="l"/>
-            <a:endParaRPr lang="en-US" dirty="0"/>
-          </a:p>
-          <a:p>
-            <a:pPr algn="l"/>
-            <a:endParaRPr lang="en-US" dirty="0"/>
-          </a:p>
-        </p:txBody>
-      </p:sp>
+            <a:r>
+              <a:rPr lang="en-US" dirty="0"/>
+              <a:t>Sentiment Score (XOM)</a:t>
+            </a:r>
+          </a:p>
+        </p:txBody>
+      </p:sp>
+      <p:pic>
+        <p:nvPicPr>
+          <p:cNvPr id="7" name="Content Placeholder 6" descr="Scatter chart&#10;&#10;Description automatically generated">
+            <a:extLst>
+              <a:ext uri="{FF2B5EF4-FFF2-40B4-BE49-F238E27FC236}">
+                <a16:creationId xmlns:a16="http://schemas.microsoft.com/office/drawing/2014/main" id="{0ED5C9F4-84B7-4FE1-CDDC-5F0A39E3AA16}"/>
+              </a:ext>
+            </a:extLst>
+          </p:cNvPr>
+          <p:cNvPicPr>
+            <a:picLocks noGrp="1" noChangeAspect="1"/>
+          </p:cNvPicPr>
+          <p:nvPr>
+            <p:ph sz="quarter" idx="4"/>
+          </p:nvPr>
+        </p:nvPicPr>
+        <p:blipFill>
+          <a:blip r:embed="rId2">
+            <a:extLst>
+              <a:ext uri="{28A0092B-C50C-407E-A947-70E740481C1C}">
+                <a14:useLocalDpi xmlns:a14="http://schemas.microsoft.com/office/drawing/2010/main" val="0"/>
+              </a:ext>
+            </a:extLst>
+          </a:blip>
+          <a:stretch>
+            <a:fillRect/>
+          </a:stretch>
+        </p:blipFill>
+        <p:spPr>
+          <a:xfrm>
+            <a:off x="4744529" y="2020382"/>
+            <a:ext cx="4041775" cy="1102302"/>
+          </a:xfrm>
+        </p:spPr>
+      </p:pic>
+      <p:sp>
+        <p:nvSpPr>
+          <p:cNvPr id="12" name="Text Placeholder 11">
+            <a:extLst>
+              <a:ext uri="{FF2B5EF4-FFF2-40B4-BE49-F238E27FC236}">
+                <a16:creationId xmlns:a16="http://schemas.microsoft.com/office/drawing/2014/main" id="{B47D7A09-57EA-F524-90A9-2457C48D5884}"/>
+              </a:ext>
+            </a:extLst>
+          </p:cNvPr>
+          <p:cNvSpPr>
+            <a:spLocks noGrp="1"/>
+          </p:cNvSpPr>
+          <p:nvPr>
+            <p:ph type="body" idx="1"/>
+          </p:nvPr>
+        </p:nvSpPr>
+        <p:spPr>
+          <a:xfrm>
+            <a:off x="522131" y="1341632"/>
+            <a:ext cx="4040188" cy="479822"/>
+          </a:xfrm>
+        </p:spPr>
+        <p:txBody>
+          <a:bodyPr>
+            <a:normAutofit/>
+          </a:bodyPr>
+          <a:lstStyle/>
+          <a:p>
+            <a:r>
+              <a:rPr lang="en-US" dirty="0"/>
+              <a:t>Sentiment Score (NVDA)</a:t>
+            </a:r>
+          </a:p>
+        </p:txBody>
+      </p:sp>
+      <p:pic>
+        <p:nvPicPr>
+          <p:cNvPr id="5" name="Content Placeholder 4" descr="Chart, scatter chart&#10;&#10;Description automatically generated">
+            <a:extLst>
+              <a:ext uri="{FF2B5EF4-FFF2-40B4-BE49-F238E27FC236}">
+                <a16:creationId xmlns:a16="http://schemas.microsoft.com/office/drawing/2014/main" id="{091E380D-D01A-F51E-99F5-1527EF11CF94}"/>
+              </a:ext>
+            </a:extLst>
+          </p:cNvPr>
+          <p:cNvPicPr>
+            <a:picLocks noGrp="1" noChangeAspect="1"/>
+          </p:cNvPicPr>
+          <p:nvPr>
+            <p:ph sz="half" idx="2"/>
+          </p:nvPr>
+        </p:nvPicPr>
+        <p:blipFill>
+          <a:blip r:embed="rId3">
+            <a:extLst>
+              <a:ext uri="{28A0092B-C50C-407E-A947-70E740481C1C}">
+                <a14:useLocalDpi xmlns:a14="http://schemas.microsoft.com/office/drawing/2010/main" val="0"/>
+              </a:ext>
+            </a:extLst>
+          </a:blip>
+          <a:stretch>
+            <a:fillRect/>
+          </a:stretch>
+        </p:blipFill>
+        <p:spPr>
+          <a:xfrm>
+            <a:off x="357696" y="2020815"/>
+            <a:ext cx="4040187" cy="1101869"/>
+          </a:xfrm>
+        </p:spPr>
+      </p:pic>
+      <p:sp>
+        <p:nvSpPr>
+          <p:cNvPr id="11" name="Text Placeholder 2">
+            <a:extLst>
+              <a:ext uri="{FF2B5EF4-FFF2-40B4-BE49-F238E27FC236}">
+                <a16:creationId xmlns:a16="http://schemas.microsoft.com/office/drawing/2014/main" id="{4258B5C0-2F3E-C2DD-834C-36C970F2D3FC}"/>
+              </a:ext>
+            </a:extLst>
+          </p:cNvPr>
+          <p:cNvSpPr txBox="1">
+            <a:spLocks/>
+          </p:cNvSpPr>
+          <p:nvPr/>
+        </p:nvSpPr>
+        <p:spPr>
+          <a:xfrm>
+            <a:off x="4556458" y="3122684"/>
+            <a:ext cx="4041775" cy="479822"/>
+          </a:xfrm>
+          <a:prstGeom prst="rect">
+            <a:avLst/>
+          </a:prstGeom>
+        </p:spPr>
+        <p:txBody>
+          <a:bodyPr vert="horz" lIns="91440" tIns="45720" rIns="91440" bIns="45720" rtlCol="0" anchor="b">
+            <a:normAutofit/>
+          </a:bodyPr>
+          <a:lstStyle>
+            <a:lvl1pPr marL="0" indent="0" algn="ctr" defTabSz="914400" rtl="0" eaLnBrk="1" latinLnBrk="0" hangingPunct="1">
+              <a:spcBef>
+                <a:spcPct val="20000"/>
+              </a:spcBef>
+              <a:buFont typeface="Arial" pitchFamily="34" charset="0"/>
+              <a:buNone/>
+              <a:defRPr sz="2400" b="1" kern="1200">
+                <a:solidFill>
+                  <a:schemeClr val="bg1"/>
+                </a:solidFill>
+                <a:latin typeface="+mn-lt"/>
+                <a:ea typeface="+mn-ea"/>
+                <a:cs typeface="+mn-cs"/>
+              </a:defRPr>
+            </a:lvl1pPr>
+            <a:lvl2pPr marL="457200" indent="0" algn="l" defTabSz="914400" rtl="0" eaLnBrk="1" latinLnBrk="0" hangingPunct="1">
+              <a:spcBef>
+                <a:spcPct val="20000"/>
+              </a:spcBef>
+              <a:buFont typeface="Arial" pitchFamily="34" charset="0"/>
+              <a:buNone/>
+              <a:defRPr sz="2000" b="1" kern="1200">
+                <a:solidFill>
+                  <a:schemeClr val="tx1"/>
+                </a:solidFill>
+                <a:latin typeface="+mn-lt"/>
+                <a:ea typeface="+mn-ea"/>
+                <a:cs typeface="+mn-cs"/>
+              </a:defRPr>
+            </a:lvl2pPr>
+            <a:lvl3pPr marL="914400" indent="0" algn="l" defTabSz="914400" rtl="0" eaLnBrk="1" latinLnBrk="0" hangingPunct="1">
+              <a:spcBef>
+                <a:spcPct val="20000"/>
+              </a:spcBef>
+              <a:buFont typeface="Arial" pitchFamily="34" charset="0"/>
+              <a:buNone/>
+              <a:defRPr sz="1800" b="1" kern="1200">
+                <a:solidFill>
+                  <a:schemeClr val="tx1"/>
+                </a:solidFill>
+                <a:latin typeface="+mn-lt"/>
+                <a:ea typeface="+mn-ea"/>
+                <a:cs typeface="+mn-cs"/>
+              </a:defRPr>
+            </a:lvl3pPr>
+            <a:lvl4pPr marL="1371600" indent="0" algn="l" defTabSz="914400" rtl="0" eaLnBrk="1" latinLnBrk="0" hangingPunct="1">
+              <a:spcBef>
+                <a:spcPct val="20000"/>
+              </a:spcBef>
+              <a:buFont typeface="Arial" pitchFamily="34" charset="0"/>
+              <a:buNone/>
+              <a:defRPr sz="1600" b="1" kern="1200">
+                <a:solidFill>
+                  <a:schemeClr val="tx1"/>
+                </a:solidFill>
+                <a:latin typeface="+mn-lt"/>
+                <a:ea typeface="+mn-ea"/>
+                <a:cs typeface="+mn-cs"/>
+              </a:defRPr>
+            </a:lvl4pPr>
+            <a:lvl5pPr marL="1828800" indent="0" algn="l" defTabSz="914400" rtl="0" eaLnBrk="1" latinLnBrk="0" hangingPunct="1">
+              <a:spcBef>
+                <a:spcPct val="20000"/>
+              </a:spcBef>
+              <a:buFont typeface="Arial" pitchFamily="34" charset="0"/>
+              <a:buNone/>
+              <a:defRPr sz="1600" b="1" kern="1200">
+                <a:solidFill>
+                  <a:schemeClr val="tx1"/>
+                </a:solidFill>
+                <a:latin typeface="+mn-lt"/>
+                <a:ea typeface="+mn-ea"/>
+                <a:cs typeface="+mn-cs"/>
+              </a:defRPr>
+            </a:lvl5pPr>
+            <a:lvl6pPr marL="2286000" indent="0" algn="l" defTabSz="914400" rtl="0" eaLnBrk="1" latinLnBrk="0" hangingPunct="1">
+              <a:spcBef>
+                <a:spcPct val="20000"/>
+              </a:spcBef>
+              <a:buFont typeface="Arial" pitchFamily="34" charset="0"/>
+              <a:buNone/>
+              <a:defRPr sz="1600" b="1" kern="1200">
+                <a:solidFill>
+                  <a:schemeClr val="tx1"/>
+                </a:solidFill>
+                <a:latin typeface="+mn-lt"/>
+                <a:ea typeface="+mn-ea"/>
+                <a:cs typeface="+mn-cs"/>
+              </a:defRPr>
+            </a:lvl6pPr>
+            <a:lvl7pPr marL="2743200" indent="0" algn="l" defTabSz="914400" rtl="0" eaLnBrk="1" latinLnBrk="0" hangingPunct="1">
+              <a:spcBef>
+                <a:spcPct val="20000"/>
+              </a:spcBef>
+              <a:buFont typeface="Arial" pitchFamily="34" charset="0"/>
+              <a:buNone/>
+              <a:defRPr sz="1600" b="1" kern="1200">
+                <a:solidFill>
+                  <a:schemeClr val="tx1"/>
+                </a:solidFill>
+                <a:latin typeface="+mn-lt"/>
+                <a:ea typeface="+mn-ea"/>
+                <a:cs typeface="+mn-cs"/>
+              </a:defRPr>
+            </a:lvl7pPr>
+            <a:lvl8pPr marL="3200400" indent="0" algn="l" defTabSz="914400" rtl="0" eaLnBrk="1" latinLnBrk="0" hangingPunct="1">
+              <a:spcBef>
+                <a:spcPct val="20000"/>
+              </a:spcBef>
+              <a:buFont typeface="Arial" pitchFamily="34" charset="0"/>
+              <a:buNone/>
+              <a:defRPr sz="1600" b="1" kern="1200">
+                <a:solidFill>
+                  <a:schemeClr val="tx1"/>
+                </a:solidFill>
+                <a:latin typeface="+mn-lt"/>
+                <a:ea typeface="+mn-ea"/>
+                <a:cs typeface="+mn-cs"/>
+              </a:defRPr>
+            </a:lvl8pPr>
+            <a:lvl9pPr marL="3657600" indent="0" algn="l" defTabSz="914400" rtl="0" eaLnBrk="1" latinLnBrk="0" hangingPunct="1">
+              <a:spcBef>
+                <a:spcPct val="20000"/>
+              </a:spcBef>
+              <a:buFont typeface="Arial" pitchFamily="34" charset="0"/>
+              <a:buNone/>
+              <a:defRPr sz="1600" b="1" kern="1200">
+                <a:solidFill>
+                  <a:schemeClr val="tx1"/>
+                </a:solidFill>
+                <a:latin typeface="+mn-lt"/>
+                <a:ea typeface="+mn-ea"/>
+                <a:cs typeface="+mn-cs"/>
+              </a:defRPr>
+            </a:lvl9pPr>
+          </a:lstStyle>
+          <a:p>
+            <a:r>
+              <a:rPr lang="en-US" dirty="0"/>
+              <a:t>Correlation (XOM)</a:t>
+            </a:r>
+          </a:p>
+        </p:txBody>
+      </p:sp>
+      <p:sp>
+        <p:nvSpPr>
+          <p:cNvPr id="15" name="Text Placeholder 11">
+            <a:extLst>
+              <a:ext uri="{FF2B5EF4-FFF2-40B4-BE49-F238E27FC236}">
+                <a16:creationId xmlns:a16="http://schemas.microsoft.com/office/drawing/2014/main" id="{1E8D3866-1F52-9FEE-EB87-7709EAB94162}"/>
+              </a:ext>
+            </a:extLst>
+          </p:cNvPr>
+          <p:cNvSpPr txBox="1">
+            <a:spLocks/>
+          </p:cNvSpPr>
+          <p:nvPr/>
+        </p:nvSpPr>
+        <p:spPr>
+          <a:xfrm>
+            <a:off x="328199" y="3180320"/>
+            <a:ext cx="4040188" cy="479822"/>
+          </a:xfrm>
+          <a:prstGeom prst="rect">
+            <a:avLst/>
+          </a:prstGeom>
+        </p:spPr>
+        <p:txBody>
+          <a:bodyPr vert="horz" lIns="91440" tIns="45720" rIns="91440" bIns="45720" rtlCol="0" anchor="b">
+            <a:normAutofit/>
+          </a:bodyPr>
+          <a:lstStyle>
+            <a:lvl1pPr marL="0" indent="0" algn="ctr" defTabSz="914400" rtl="0" eaLnBrk="1" latinLnBrk="0" hangingPunct="1">
+              <a:spcBef>
+                <a:spcPct val="20000"/>
+              </a:spcBef>
+              <a:buFont typeface="Arial" pitchFamily="34" charset="0"/>
+              <a:buNone/>
+              <a:defRPr sz="2400" b="1" kern="1200">
+                <a:solidFill>
+                  <a:schemeClr val="bg1"/>
+                </a:solidFill>
+                <a:latin typeface="+mn-lt"/>
+                <a:ea typeface="+mn-ea"/>
+                <a:cs typeface="+mn-cs"/>
+              </a:defRPr>
+            </a:lvl1pPr>
+            <a:lvl2pPr marL="457200" indent="0" algn="l" defTabSz="914400" rtl="0" eaLnBrk="1" latinLnBrk="0" hangingPunct="1">
+              <a:spcBef>
+                <a:spcPct val="20000"/>
+              </a:spcBef>
+              <a:buFont typeface="Arial" pitchFamily="34" charset="0"/>
+              <a:buNone/>
+              <a:defRPr sz="2000" b="1" kern="1200">
+                <a:solidFill>
+                  <a:schemeClr val="tx1"/>
+                </a:solidFill>
+                <a:latin typeface="+mn-lt"/>
+                <a:ea typeface="+mn-ea"/>
+                <a:cs typeface="+mn-cs"/>
+              </a:defRPr>
+            </a:lvl2pPr>
+            <a:lvl3pPr marL="914400" indent="0" algn="l" defTabSz="914400" rtl="0" eaLnBrk="1" latinLnBrk="0" hangingPunct="1">
+              <a:spcBef>
+                <a:spcPct val="20000"/>
+              </a:spcBef>
+              <a:buFont typeface="Arial" pitchFamily="34" charset="0"/>
+              <a:buNone/>
+              <a:defRPr sz="1800" b="1" kern="1200">
+                <a:solidFill>
+                  <a:schemeClr val="tx1"/>
+                </a:solidFill>
+                <a:latin typeface="+mn-lt"/>
+                <a:ea typeface="+mn-ea"/>
+                <a:cs typeface="+mn-cs"/>
+              </a:defRPr>
+            </a:lvl3pPr>
+            <a:lvl4pPr marL="1371600" indent="0" algn="l" defTabSz="914400" rtl="0" eaLnBrk="1" latinLnBrk="0" hangingPunct="1">
+              <a:spcBef>
+                <a:spcPct val="20000"/>
+              </a:spcBef>
+              <a:buFont typeface="Arial" pitchFamily="34" charset="0"/>
+              <a:buNone/>
+              <a:defRPr sz="1600" b="1" kern="1200">
+                <a:solidFill>
+                  <a:schemeClr val="tx1"/>
+                </a:solidFill>
+                <a:latin typeface="+mn-lt"/>
+                <a:ea typeface="+mn-ea"/>
+                <a:cs typeface="+mn-cs"/>
+              </a:defRPr>
+            </a:lvl4pPr>
+            <a:lvl5pPr marL="1828800" indent="0" algn="l" defTabSz="914400" rtl="0" eaLnBrk="1" latinLnBrk="0" hangingPunct="1">
+              <a:spcBef>
+                <a:spcPct val="20000"/>
+              </a:spcBef>
+              <a:buFont typeface="Arial" pitchFamily="34" charset="0"/>
+              <a:buNone/>
+              <a:defRPr sz="1600" b="1" kern="1200">
+                <a:solidFill>
+                  <a:schemeClr val="tx1"/>
+                </a:solidFill>
+                <a:latin typeface="+mn-lt"/>
+                <a:ea typeface="+mn-ea"/>
+                <a:cs typeface="+mn-cs"/>
+              </a:defRPr>
+            </a:lvl5pPr>
+            <a:lvl6pPr marL="2286000" indent="0" algn="l" defTabSz="914400" rtl="0" eaLnBrk="1" latinLnBrk="0" hangingPunct="1">
+              <a:spcBef>
+                <a:spcPct val="20000"/>
+              </a:spcBef>
+              <a:buFont typeface="Arial" pitchFamily="34" charset="0"/>
+              <a:buNone/>
+              <a:defRPr sz="1600" b="1" kern="1200">
+                <a:solidFill>
+                  <a:schemeClr val="tx1"/>
+                </a:solidFill>
+                <a:latin typeface="+mn-lt"/>
+                <a:ea typeface="+mn-ea"/>
+                <a:cs typeface="+mn-cs"/>
+              </a:defRPr>
+            </a:lvl6pPr>
+            <a:lvl7pPr marL="2743200" indent="0" algn="l" defTabSz="914400" rtl="0" eaLnBrk="1" latinLnBrk="0" hangingPunct="1">
+              <a:spcBef>
+                <a:spcPct val="20000"/>
+              </a:spcBef>
+              <a:buFont typeface="Arial" pitchFamily="34" charset="0"/>
+              <a:buNone/>
+              <a:defRPr sz="1600" b="1" kern="1200">
+                <a:solidFill>
+                  <a:schemeClr val="tx1"/>
+                </a:solidFill>
+                <a:latin typeface="+mn-lt"/>
+                <a:ea typeface="+mn-ea"/>
+                <a:cs typeface="+mn-cs"/>
+              </a:defRPr>
+            </a:lvl7pPr>
+            <a:lvl8pPr marL="3200400" indent="0" algn="l" defTabSz="914400" rtl="0" eaLnBrk="1" latinLnBrk="0" hangingPunct="1">
+              <a:spcBef>
+                <a:spcPct val="20000"/>
+              </a:spcBef>
+              <a:buFont typeface="Arial" pitchFamily="34" charset="0"/>
+              <a:buNone/>
+              <a:defRPr sz="1600" b="1" kern="1200">
+                <a:solidFill>
+                  <a:schemeClr val="tx1"/>
+                </a:solidFill>
+                <a:latin typeface="+mn-lt"/>
+                <a:ea typeface="+mn-ea"/>
+                <a:cs typeface="+mn-cs"/>
+              </a:defRPr>
+            </a:lvl8pPr>
+            <a:lvl9pPr marL="3657600" indent="0" algn="l" defTabSz="914400" rtl="0" eaLnBrk="1" latinLnBrk="0" hangingPunct="1">
+              <a:spcBef>
+                <a:spcPct val="20000"/>
+              </a:spcBef>
+              <a:buFont typeface="Arial" pitchFamily="34" charset="0"/>
+              <a:buNone/>
+              <a:defRPr sz="1600" b="1" kern="1200">
+                <a:solidFill>
+                  <a:schemeClr val="tx1"/>
+                </a:solidFill>
+                <a:latin typeface="+mn-lt"/>
+                <a:ea typeface="+mn-ea"/>
+                <a:cs typeface="+mn-cs"/>
+              </a:defRPr>
+            </a:lvl9pPr>
+          </a:lstStyle>
+          <a:p>
+            <a:r>
+              <a:rPr lang="en-US" dirty="0"/>
+              <a:t>Correlation (NVDA)</a:t>
+            </a:r>
+          </a:p>
+        </p:txBody>
+      </p:sp>
+      <p:pic>
+        <p:nvPicPr>
+          <p:cNvPr id="9" name="Picture 8" descr="A picture containing Teams&#10;&#10;Description automatically generated">
+            <a:extLst>
+              <a:ext uri="{FF2B5EF4-FFF2-40B4-BE49-F238E27FC236}">
+                <a16:creationId xmlns:a16="http://schemas.microsoft.com/office/drawing/2014/main" id="{1EF6C3B4-BF06-54D9-1024-BFF12558128E}"/>
+              </a:ext>
+            </a:extLst>
+          </p:cNvPr>
+          <p:cNvPicPr>
+            <a:picLocks noChangeAspect="1"/>
+          </p:cNvPicPr>
+          <p:nvPr/>
+        </p:nvPicPr>
+        <p:blipFill>
+          <a:blip r:embed="rId4">
+            <a:extLst>
+              <a:ext uri="{28A0092B-C50C-407E-A947-70E740481C1C}">
+                <a14:useLocalDpi xmlns:a14="http://schemas.microsoft.com/office/drawing/2010/main" val="0"/>
+              </a:ext>
+            </a:extLst>
+          </a:blip>
+          <a:stretch>
+            <a:fillRect/>
+          </a:stretch>
+        </p:blipFill>
+        <p:spPr>
+          <a:xfrm>
+            <a:off x="328199" y="3717778"/>
+            <a:ext cx="4040188" cy="1188291"/>
+          </a:xfrm>
+          <a:prstGeom prst="rect">
+            <a:avLst/>
+          </a:prstGeom>
+        </p:spPr>
+      </p:pic>
+      <p:pic>
+        <p:nvPicPr>
+          <p:cNvPr id="18" name="Picture 17" descr="A picture containing graphical user interface&#10;&#10;Description automatically generated">
+            <a:extLst>
+              <a:ext uri="{FF2B5EF4-FFF2-40B4-BE49-F238E27FC236}">
+                <a16:creationId xmlns:a16="http://schemas.microsoft.com/office/drawing/2014/main" id="{01D7D93E-E493-990B-C4F4-77ACCEB12E5F}"/>
+              </a:ext>
+            </a:extLst>
+          </p:cNvPr>
+          <p:cNvPicPr>
+            <a:picLocks noChangeAspect="1"/>
+          </p:cNvPicPr>
+          <p:nvPr/>
+        </p:nvPicPr>
+        <p:blipFill>
+          <a:blip r:embed="rId5">
+            <a:extLst>
+              <a:ext uri="{28A0092B-C50C-407E-A947-70E740481C1C}">
+                <a14:useLocalDpi xmlns:a14="http://schemas.microsoft.com/office/drawing/2010/main" val="0"/>
+              </a:ext>
+            </a:extLst>
+          </a:blip>
+          <a:stretch>
+            <a:fillRect/>
+          </a:stretch>
+        </p:blipFill>
+        <p:spPr>
+          <a:xfrm>
+            <a:off x="4698575" y="3726262"/>
+            <a:ext cx="3899658" cy="1177474"/>
+          </a:xfrm>
+          <a:prstGeom prst="rect">
+            <a:avLst/>
+          </a:prstGeom>
+        </p:spPr>
+      </p:pic>
     </p:spTree>
     <p:extLst>
       <p:ext uri="{BB962C8B-B14F-4D97-AF65-F5344CB8AC3E}">
-        <p14:creationId xmlns:p14="http://schemas.microsoft.com/office/powerpoint/2010/main" val="1267715079"/>
+        <p14:creationId xmlns:p14="http://schemas.microsoft.com/office/powerpoint/2010/main" val="836583286"/>
       </p:ext>
     </p:extLst>
   </p:cSld>
   <p:clrMapOvr>
     <a:masterClrMapping/>
   </p:clrMapOvr>
+  <p:timing>
+    <p:tnLst>
+      <p:par>
+        <p:cTn id="1" dur="indefinite" restart="never" nodeType="tmRoot">
+          <p:childTnLst>
+            <p:seq concurrent="1" nextAc="seek">
+              <p:cTn id="2" dur="indefinite" nodeType="mainSeq">
+                <p:childTnLst>
+                  <p:par>
+                    <p:cTn id="3" fill="hold">
+                      <p:stCondLst>
+                        <p:cond delay="indefinite"/>
+                      </p:stCondLst>
+                      <p:childTnLst>
+                        <p:par>
+                          <p:cTn id="4" fill="hold">
+                            <p:stCondLst>
+                              <p:cond delay="0"/>
+                            </p:stCondLst>
+                            <p:childTnLst>
+                              <p:par>
+                                <p:cTn id="5" presetID="2" presetClass="entr" presetSubtype="4" fill="hold" grpId="0" nodeType="clickEffect">
+                                  <p:stCondLst>
+                                    <p:cond delay="0"/>
+                                  </p:stCondLst>
+                                  <p:childTnLst>
+                                    <p:set>
+                                      <p:cBhvr>
+                                        <p:cTn id="6" dur="1" fill="hold">
+                                          <p:stCondLst>
+                                            <p:cond delay="0"/>
+                                          </p:stCondLst>
+                                        </p:cTn>
+                                        <p:tgtEl>
+                                          <p:spTgt spid="12">
+                                            <p:txEl>
+                                              <p:pRg st="0" end="0"/>
+                                            </p:txEl>
+                                          </p:spTgt>
+                                        </p:tgtEl>
+                                        <p:attrNameLst>
+                                          <p:attrName>style.visibility</p:attrName>
+                                        </p:attrNameLst>
+                                      </p:cBhvr>
+                                      <p:to>
+                                        <p:strVal val="visible"/>
+                                      </p:to>
+                                    </p:set>
+                                    <p:anim calcmode="lin" valueType="num">
+                                      <p:cBhvr additive="base">
+                                        <p:cTn id="7" dur="500" fill="hold"/>
+                                        <p:tgtEl>
+                                          <p:spTgt spid="12">
+                                            <p:txEl>
+                                              <p:pRg st="0" end="0"/>
+                                            </p:txEl>
+                                          </p:spTgt>
+                                        </p:tgtEl>
+                                        <p:attrNameLst>
+                                          <p:attrName>ppt_x</p:attrName>
+                                        </p:attrNameLst>
+                                      </p:cBhvr>
+                                      <p:tavLst>
+                                        <p:tav tm="0">
+                                          <p:val>
+                                            <p:strVal val="#ppt_x"/>
+                                          </p:val>
+                                        </p:tav>
+                                        <p:tav tm="100000">
+                                          <p:val>
+                                            <p:strVal val="#ppt_x"/>
+                                          </p:val>
+                                        </p:tav>
+                                      </p:tavLst>
+                                    </p:anim>
+                                    <p:anim calcmode="lin" valueType="num">
+                                      <p:cBhvr additive="base">
+                                        <p:cTn id="8" dur="500" fill="hold"/>
+                                        <p:tgtEl>
+                                          <p:spTgt spid="12">
+                                            <p:txEl>
+                                              <p:pRg st="0" end="0"/>
+                                            </p:txEl>
+                                          </p:spTgt>
+                                        </p:tgtEl>
+                                        <p:attrNameLst>
+                                          <p:attrName>ppt_y</p:attrName>
+                                        </p:attrNameLst>
+                                      </p:cBhvr>
+                                      <p:tavLst>
+                                        <p:tav tm="0">
+                                          <p:val>
+                                            <p:strVal val="1+#ppt_h/2"/>
+                                          </p:val>
+                                        </p:tav>
+                                        <p:tav tm="100000">
+                                          <p:val>
+                                            <p:strVal val="#ppt_y"/>
+                                          </p:val>
+                                        </p:tav>
+                                      </p:tavLst>
+                                    </p:anim>
+                                  </p:childTnLst>
+                                </p:cTn>
+                              </p:par>
+                              <p:par>
+                                <p:cTn id="9" presetID="2" presetClass="entr" presetSubtype="4" fill="hold" nodeType="withEffect">
+                                  <p:stCondLst>
+                                    <p:cond delay="0"/>
+                                  </p:stCondLst>
+                                  <p:childTnLst>
+                                    <p:set>
+                                      <p:cBhvr>
+                                        <p:cTn id="10" dur="1" fill="hold">
+                                          <p:stCondLst>
+                                            <p:cond delay="0"/>
+                                          </p:stCondLst>
+                                        </p:cTn>
+                                        <p:tgtEl>
+                                          <p:spTgt spid="5"/>
+                                        </p:tgtEl>
+                                        <p:attrNameLst>
+                                          <p:attrName>style.visibility</p:attrName>
+                                        </p:attrNameLst>
+                                      </p:cBhvr>
+                                      <p:to>
+                                        <p:strVal val="visible"/>
+                                      </p:to>
+                                    </p:set>
+                                    <p:anim calcmode="lin" valueType="num">
+                                      <p:cBhvr additive="base">
+                                        <p:cTn id="11" dur="500" fill="hold"/>
+                                        <p:tgtEl>
+                                          <p:spTgt spid="5"/>
+                                        </p:tgtEl>
+                                        <p:attrNameLst>
+                                          <p:attrName>ppt_x</p:attrName>
+                                        </p:attrNameLst>
+                                      </p:cBhvr>
+                                      <p:tavLst>
+                                        <p:tav tm="0">
+                                          <p:val>
+                                            <p:strVal val="#ppt_x"/>
+                                          </p:val>
+                                        </p:tav>
+                                        <p:tav tm="100000">
+                                          <p:val>
+                                            <p:strVal val="#ppt_x"/>
+                                          </p:val>
+                                        </p:tav>
+                                      </p:tavLst>
+                                    </p:anim>
+                                    <p:anim calcmode="lin" valueType="num">
+                                      <p:cBhvr additive="base">
+                                        <p:cTn id="12" dur="500" fill="hold"/>
+                                        <p:tgtEl>
+                                          <p:spTgt spid="5"/>
+                                        </p:tgtEl>
+                                        <p:attrNameLst>
+                                          <p:attrName>ppt_y</p:attrName>
+                                        </p:attrNameLst>
+                                      </p:cBhvr>
+                                      <p:tavLst>
+                                        <p:tav tm="0">
+                                          <p:val>
+                                            <p:strVal val="1+#ppt_h/2"/>
+                                          </p:val>
+                                        </p:tav>
+                                        <p:tav tm="100000">
+                                          <p:val>
+                                            <p:strVal val="#ppt_y"/>
+                                          </p:val>
+                                        </p:tav>
+                                      </p:tavLst>
+                                    </p:anim>
+                                  </p:childTnLst>
+                                </p:cTn>
+                              </p:par>
+                            </p:childTnLst>
+                          </p:cTn>
+                        </p:par>
+                      </p:childTnLst>
+                    </p:cTn>
+                  </p:par>
+                  <p:par>
+                    <p:cTn id="13" fill="hold">
+                      <p:stCondLst>
+                        <p:cond delay="indefinite"/>
+                      </p:stCondLst>
+                      <p:childTnLst>
+                        <p:par>
+                          <p:cTn id="14" fill="hold">
+                            <p:stCondLst>
+                              <p:cond delay="0"/>
+                            </p:stCondLst>
+                            <p:childTnLst>
+                              <p:par>
+                                <p:cTn id="15" presetID="2" presetClass="entr" presetSubtype="4" fill="hold" grpId="0" nodeType="clickEffect">
+                                  <p:stCondLst>
+                                    <p:cond delay="0"/>
+                                  </p:stCondLst>
+                                  <p:childTnLst>
+                                    <p:set>
+                                      <p:cBhvr>
+                                        <p:cTn id="16" dur="1" fill="hold">
+                                          <p:stCondLst>
+                                            <p:cond delay="0"/>
+                                          </p:stCondLst>
+                                        </p:cTn>
+                                        <p:tgtEl>
+                                          <p:spTgt spid="3">
+                                            <p:txEl>
+                                              <p:pRg st="0" end="0"/>
+                                            </p:txEl>
+                                          </p:spTgt>
+                                        </p:tgtEl>
+                                        <p:attrNameLst>
+                                          <p:attrName>style.visibility</p:attrName>
+                                        </p:attrNameLst>
+                                      </p:cBhvr>
+                                      <p:to>
+                                        <p:strVal val="visible"/>
+                                      </p:to>
+                                    </p:set>
+                                    <p:anim calcmode="lin" valueType="num">
+                                      <p:cBhvr additive="base">
+                                        <p:cTn id="17" dur="500" fill="hold"/>
+                                        <p:tgtEl>
+                                          <p:spTgt spid="3">
+                                            <p:txEl>
+                                              <p:pRg st="0" end="0"/>
+                                            </p:txEl>
+                                          </p:spTgt>
+                                        </p:tgtEl>
+                                        <p:attrNameLst>
+                                          <p:attrName>ppt_x</p:attrName>
+                                        </p:attrNameLst>
+                                      </p:cBhvr>
+                                      <p:tavLst>
+                                        <p:tav tm="0">
+                                          <p:val>
+                                            <p:strVal val="#ppt_x"/>
+                                          </p:val>
+                                        </p:tav>
+                                        <p:tav tm="100000">
+                                          <p:val>
+                                            <p:strVal val="#ppt_x"/>
+                                          </p:val>
+                                        </p:tav>
+                                      </p:tavLst>
+                                    </p:anim>
+                                    <p:anim calcmode="lin" valueType="num">
+                                      <p:cBhvr additive="base">
+                                        <p:cTn id="18" dur="500" fill="hold"/>
+                                        <p:tgtEl>
+                                          <p:spTgt spid="3">
+                                            <p:txEl>
+                                              <p:pRg st="0" end="0"/>
+                                            </p:txEl>
+                                          </p:spTgt>
+                                        </p:tgtEl>
+                                        <p:attrNameLst>
+                                          <p:attrName>ppt_y</p:attrName>
+                                        </p:attrNameLst>
+                                      </p:cBhvr>
+                                      <p:tavLst>
+                                        <p:tav tm="0">
+                                          <p:val>
+                                            <p:strVal val="1+#ppt_h/2"/>
+                                          </p:val>
+                                        </p:tav>
+                                        <p:tav tm="100000">
+                                          <p:val>
+                                            <p:strVal val="#ppt_y"/>
+                                          </p:val>
+                                        </p:tav>
+                                      </p:tavLst>
+                                    </p:anim>
+                                  </p:childTnLst>
+                                </p:cTn>
+                              </p:par>
+                              <p:par>
+                                <p:cTn id="19" presetID="2" presetClass="entr" presetSubtype="4" fill="hold" nodeType="withEffect">
+                                  <p:stCondLst>
+                                    <p:cond delay="0"/>
+                                  </p:stCondLst>
+                                  <p:childTnLst>
+                                    <p:set>
+                                      <p:cBhvr>
+                                        <p:cTn id="20" dur="1" fill="hold">
+                                          <p:stCondLst>
+                                            <p:cond delay="0"/>
+                                          </p:stCondLst>
+                                        </p:cTn>
+                                        <p:tgtEl>
+                                          <p:spTgt spid="7"/>
+                                        </p:tgtEl>
+                                        <p:attrNameLst>
+                                          <p:attrName>style.visibility</p:attrName>
+                                        </p:attrNameLst>
+                                      </p:cBhvr>
+                                      <p:to>
+                                        <p:strVal val="visible"/>
+                                      </p:to>
+                                    </p:set>
+                                    <p:anim calcmode="lin" valueType="num">
+                                      <p:cBhvr additive="base">
+                                        <p:cTn id="21" dur="500" fill="hold"/>
+                                        <p:tgtEl>
+                                          <p:spTgt spid="7"/>
+                                        </p:tgtEl>
+                                        <p:attrNameLst>
+                                          <p:attrName>ppt_x</p:attrName>
+                                        </p:attrNameLst>
+                                      </p:cBhvr>
+                                      <p:tavLst>
+                                        <p:tav tm="0">
+                                          <p:val>
+                                            <p:strVal val="#ppt_x"/>
+                                          </p:val>
+                                        </p:tav>
+                                        <p:tav tm="100000">
+                                          <p:val>
+                                            <p:strVal val="#ppt_x"/>
+                                          </p:val>
+                                        </p:tav>
+                                      </p:tavLst>
+                                    </p:anim>
+                                    <p:anim calcmode="lin" valueType="num">
+                                      <p:cBhvr additive="base">
+                                        <p:cTn id="22" dur="500" fill="hold"/>
+                                        <p:tgtEl>
+                                          <p:spTgt spid="7"/>
+                                        </p:tgtEl>
+                                        <p:attrNameLst>
+                                          <p:attrName>ppt_y</p:attrName>
+                                        </p:attrNameLst>
+                                      </p:cBhvr>
+                                      <p:tavLst>
+                                        <p:tav tm="0">
+                                          <p:val>
+                                            <p:strVal val="1+#ppt_h/2"/>
+                                          </p:val>
+                                        </p:tav>
+                                        <p:tav tm="100000">
+                                          <p:val>
+                                            <p:strVal val="#ppt_y"/>
+                                          </p:val>
+                                        </p:tav>
+                                      </p:tavLst>
+                                    </p:anim>
+                                  </p:childTnLst>
+                                </p:cTn>
+                              </p:par>
+                            </p:childTnLst>
+                          </p:cTn>
+                        </p:par>
+                      </p:childTnLst>
+                    </p:cTn>
+                  </p:par>
+                  <p:par>
+                    <p:cTn id="23" fill="hold">
+                      <p:stCondLst>
+                        <p:cond delay="indefinite"/>
+                      </p:stCondLst>
+                      <p:childTnLst>
+                        <p:par>
+                          <p:cTn id="24" fill="hold">
+                            <p:stCondLst>
+                              <p:cond delay="0"/>
+                            </p:stCondLst>
+                            <p:childTnLst>
+                              <p:par>
+                                <p:cTn id="25" presetID="2" presetClass="entr" presetSubtype="4" fill="hold" grpId="0" nodeType="clickEffect">
+                                  <p:stCondLst>
+                                    <p:cond delay="0"/>
+                                  </p:stCondLst>
+                                  <p:childTnLst>
+                                    <p:set>
+                                      <p:cBhvr>
+                                        <p:cTn id="26" dur="1" fill="hold">
+                                          <p:stCondLst>
+                                            <p:cond delay="0"/>
+                                          </p:stCondLst>
+                                        </p:cTn>
+                                        <p:tgtEl>
+                                          <p:spTgt spid="15"/>
+                                        </p:tgtEl>
+                                        <p:attrNameLst>
+                                          <p:attrName>style.visibility</p:attrName>
+                                        </p:attrNameLst>
+                                      </p:cBhvr>
+                                      <p:to>
+                                        <p:strVal val="visible"/>
+                                      </p:to>
+                                    </p:set>
+                                    <p:anim calcmode="lin" valueType="num">
+                                      <p:cBhvr additive="base">
+                                        <p:cTn id="27" dur="500" fill="hold"/>
+                                        <p:tgtEl>
+                                          <p:spTgt spid="15"/>
+                                        </p:tgtEl>
+                                        <p:attrNameLst>
+                                          <p:attrName>ppt_x</p:attrName>
+                                        </p:attrNameLst>
+                                      </p:cBhvr>
+                                      <p:tavLst>
+                                        <p:tav tm="0">
+                                          <p:val>
+                                            <p:strVal val="#ppt_x"/>
+                                          </p:val>
+                                        </p:tav>
+                                        <p:tav tm="100000">
+                                          <p:val>
+                                            <p:strVal val="#ppt_x"/>
+                                          </p:val>
+                                        </p:tav>
+                                      </p:tavLst>
+                                    </p:anim>
+                                    <p:anim calcmode="lin" valueType="num">
+                                      <p:cBhvr additive="base">
+                                        <p:cTn id="28" dur="500" fill="hold"/>
+                                        <p:tgtEl>
+                                          <p:spTgt spid="15"/>
+                                        </p:tgtEl>
+                                        <p:attrNameLst>
+                                          <p:attrName>ppt_y</p:attrName>
+                                        </p:attrNameLst>
+                                      </p:cBhvr>
+                                      <p:tavLst>
+                                        <p:tav tm="0">
+                                          <p:val>
+                                            <p:strVal val="1+#ppt_h/2"/>
+                                          </p:val>
+                                        </p:tav>
+                                        <p:tav tm="100000">
+                                          <p:val>
+                                            <p:strVal val="#ppt_y"/>
+                                          </p:val>
+                                        </p:tav>
+                                      </p:tavLst>
+                                    </p:anim>
+                                  </p:childTnLst>
+                                </p:cTn>
+                              </p:par>
+                              <p:par>
+                                <p:cTn id="29" presetID="2" presetClass="entr" presetSubtype="4" fill="hold" nodeType="withEffect">
+                                  <p:stCondLst>
+                                    <p:cond delay="0"/>
+                                  </p:stCondLst>
+                                  <p:childTnLst>
+                                    <p:set>
+                                      <p:cBhvr>
+                                        <p:cTn id="30" dur="1" fill="hold">
+                                          <p:stCondLst>
+                                            <p:cond delay="0"/>
+                                          </p:stCondLst>
+                                        </p:cTn>
+                                        <p:tgtEl>
+                                          <p:spTgt spid="9"/>
+                                        </p:tgtEl>
+                                        <p:attrNameLst>
+                                          <p:attrName>style.visibility</p:attrName>
+                                        </p:attrNameLst>
+                                      </p:cBhvr>
+                                      <p:to>
+                                        <p:strVal val="visible"/>
+                                      </p:to>
+                                    </p:set>
+                                    <p:anim calcmode="lin" valueType="num">
+                                      <p:cBhvr additive="base">
+                                        <p:cTn id="31" dur="500" fill="hold"/>
+                                        <p:tgtEl>
+                                          <p:spTgt spid="9"/>
+                                        </p:tgtEl>
+                                        <p:attrNameLst>
+                                          <p:attrName>ppt_x</p:attrName>
+                                        </p:attrNameLst>
+                                      </p:cBhvr>
+                                      <p:tavLst>
+                                        <p:tav tm="0">
+                                          <p:val>
+                                            <p:strVal val="#ppt_x"/>
+                                          </p:val>
+                                        </p:tav>
+                                        <p:tav tm="100000">
+                                          <p:val>
+                                            <p:strVal val="#ppt_x"/>
+                                          </p:val>
+                                        </p:tav>
+                                      </p:tavLst>
+                                    </p:anim>
+                                    <p:anim calcmode="lin" valueType="num">
+                                      <p:cBhvr additive="base">
+                                        <p:cTn id="32" dur="500" fill="hold"/>
+                                        <p:tgtEl>
+                                          <p:spTgt spid="9"/>
+                                        </p:tgtEl>
+                                        <p:attrNameLst>
+                                          <p:attrName>ppt_y</p:attrName>
+                                        </p:attrNameLst>
+                                      </p:cBhvr>
+                                      <p:tavLst>
+                                        <p:tav tm="0">
+                                          <p:val>
+                                            <p:strVal val="1+#ppt_h/2"/>
+                                          </p:val>
+                                        </p:tav>
+                                        <p:tav tm="100000">
+                                          <p:val>
+                                            <p:strVal val="#ppt_y"/>
+                                          </p:val>
+                                        </p:tav>
+                                      </p:tavLst>
+                                    </p:anim>
+                                  </p:childTnLst>
+                                </p:cTn>
+                              </p:par>
+                            </p:childTnLst>
+                          </p:cTn>
+                        </p:par>
+                      </p:childTnLst>
+                    </p:cTn>
+                  </p:par>
+                  <p:par>
+                    <p:cTn id="33" fill="hold">
+                      <p:stCondLst>
+                        <p:cond delay="indefinite"/>
+                      </p:stCondLst>
+                      <p:childTnLst>
+                        <p:par>
+                          <p:cTn id="34" fill="hold">
+                            <p:stCondLst>
+                              <p:cond delay="0"/>
+                            </p:stCondLst>
+                            <p:childTnLst>
+                              <p:par>
+                                <p:cTn id="35" presetID="2" presetClass="entr" presetSubtype="4" fill="hold" grpId="0" nodeType="clickEffect">
+                                  <p:stCondLst>
+                                    <p:cond delay="0"/>
+                                  </p:stCondLst>
+                                  <p:childTnLst>
+                                    <p:set>
+                                      <p:cBhvr>
+                                        <p:cTn id="36" dur="1" fill="hold">
+                                          <p:stCondLst>
+                                            <p:cond delay="0"/>
+                                          </p:stCondLst>
+                                        </p:cTn>
+                                        <p:tgtEl>
+                                          <p:spTgt spid="11"/>
+                                        </p:tgtEl>
+                                        <p:attrNameLst>
+                                          <p:attrName>style.visibility</p:attrName>
+                                        </p:attrNameLst>
+                                      </p:cBhvr>
+                                      <p:to>
+                                        <p:strVal val="visible"/>
+                                      </p:to>
+                                    </p:set>
+                                    <p:anim calcmode="lin" valueType="num">
+                                      <p:cBhvr additive="base">
+                                        <p:cTn id="37" dur="500" fill="hold"/>
+                                        <p:tgtEl>
+                                          <p:spTgt spid="11"/>
+                                        </p:tgtEl>
+                                        <p:attrNameLst>
+                                          <p:attrName>ppt_x</p:attrName>
+                                        </p:attrNameLst>
+                                      </p:cBhvr>
+                                      <p:tavLst>
+                                        <p:tav tm="0">
+                                          <p:val>
+                                            <p:strVal val="#ppt_x"/>
+                                          </p:val>
+                                        </p:tav>
+                                        <p:tav tm="100000">
+                                          <p:val>
+                                            <p:strVal val="#ppt_x"/>
+                                          </p:val>
+                                        </p:tav>
+                                      </p:tavLst>
+                                    </p:anim>
+                                    <p:anim calcmode="lin" valueType="num">
+                                      <p:cBhvr additive="base">
+                                        <p:cTn id="38" dur="500" fill="hold"/>
+                                        <p:tgtEl>
+                                          <p:spTgt spid="11"/>
+                                        </p:tgtEl>
+                                        <p:attrNameLst>
+                                          <p:attrName>ppt_y</p:attrName>
+                                        </p:attrNameLst>
+                                      </p:cBhvr>
+                                      <p:tavLst>
+                                        <p:tav tm="0">
+                                          <p:val>
+                                            <p:strVal val="1+#ppt_h/2"/>
+                                          </p:val>
+                                        </p:tav>
+                                        <p:tav tm="100000">
+                                          <p:val>
+                                            <p:strVal val="#ppt_y"/>
+                                          </p:val>
+                                        </p:tav>
+                                      </p:tavLst>
+                                    </p:anim>
+                                  </p:childTnLst>
+                                </p:cTn>
+                              </p:par>
+                              <p:par>
+                                <p:cTn id="39" presetID="2" presetClass="entr" presetSubtype="4" fill="hold" nodeType="withEffect">
+                                  <p:stCondLst>
+                                    <p:cond delay="0"/>
+                                  </p:stCondLst>
+                                  <p:childTnLst>
+                                    <p:set>
+                                      <p:cBhvr>
+                                        <p:cTn id="40" dur="1" fill="hold">
+                                          <p:stCondLst>
+                                            <p:cond delay="0"/>
+                                          </p:stCondLst>
+                                        </p:cTn>
+                                        <p:tgtEl>
+                                          <p:spTgt spid="18"/>
+                                        </p:tgtEl>
+                                        <p:attrNameLst>
+                                          <p:attrName>style.visibility</p:attrName>
+                                        </p:attrNameLst>
+                                      </p:cBhvr>
+                                      <p:to>
+                                        <p:strVal val="visible"/>
+                                      </p:to>
+                                    </p:set>
+                                    <p:anim calcmode="lin" valueType="num">
+                                      <p:cBhvr additive="base">
+                                        <p:cTn id="41" dur="500" fill="hold"/>
+                                        <p:tgtEl>
+                                          <p:spTgt spid="18"/>
+                                        </p:tgtEl>
+                                        <p:attrNameLst>
+                                          <p:attrName>ppt_x</p:attrName>
+                                        </p:attrNameLst>
+                                      </p:cBhvr>
+                                      <p:tavLst>
+                                        <p:tav tm="0">
+                                          <p:val>
+                                            <p:strVal val="#ppt_x"/>
+                                          </p:val>
+                                        </p:tav>
+                                        <p:tav tm="100000">
+                                          <p:val>
+                                            <p:strVal val="#ppt_x"/>
+                                          </p:val>
+                                        </p:tav>
+                                      </p:tavLst>
+                                    </p:anim>
+                                    <p:anim calcmode="lin" valueType="num">
+                                      <p:cBhvr additive="base">
+                                        <p:cTn id="42" dur="500" fill="hold"/>
+                                        <p:tgtEl>
+                                          <p:spTgt spid="18"/>
+                                        </p:tgtEl>
+                                        <p:attrNameLst>
+                                          <p:attrName>ppt_y</p:attrName>
+                                        </p:attrNameLst>
+                                      </p:cBhvr>
+                                      <p:tavLst>
+                                        <p:tav tm="0">
+                                          <p:val>
+                                            <p:strVal val="1+#ppt_h/2"/>
+                                          </p:val>
+                                        </p:tav>
+                                        <p:tav tm="100000">
+                                          <p:val>
+                                            <p:strVal val="#ppt_y"/>
+                                          </p:val>
+                                        </p:tav>
+                                      </p:tavLst>
+                                    </p:anim>
+                                  </p:childTnLst>
+                                </p:cTn>
+                              </p:par>
+                            </p:childTnLst>
+                          </p:cTn>
+                        </p:par>
+                      </p:childTnLst>
+                    </p:cTn>
+                  </p:par>
+                </p:childTnLst>
+              </p:cTn>
+              <p:prevCondLst>
+                <p:cond evt="onPrev" delay="0">
+                  <p:tgtEl>
+                    <p:sldTgt/>
+                  </p:tgtEl>
+                </p:cond>
+              </p:prevCondLst>
+              <p:nextCondLst>
+                <p:cond evt="onNext" delay="0">
+                  <p:tgtEl>
+                    <p:sldTgt/>
+                  </p:tgtEl>
+                </p:cond>
+              </p:nextCondLst>
+            </p:seq>
+          </p:childTnLst>
+        </p:cTn>
+      </p:par>
+    </p:tnLst>
+    <p:bldLst>
+      <p:bldP spid="3" grpId="0" build="p"/>
+      <p:bldP spid="12" grpId="0" build="p"/>
+      <p:bldP spid="11" grpId="0"/>
+      <p:bldP spid="15" grpId="0"/>
+    </p:bldLst>
+  </p:timing>
 </p:sld>
 </file>
 
@@ -4903,100 +8020,14 @@
         <p:spPr/>
         <p:txBody>
           <a:bodyPr>
-            <a:normAutofit fontScale="90000"/>
+            <a:normAutofit/>
           </a:bodyPr>
           <a:lstStyle/>
           <a:p>
             <a:r>
               <a:rPr lang="en-US" dirty="0"/>
-              <a:t> </a:t>
-            </a:r>
-            <a:br>
-              <a:rPr lang="en-US" dirty="0"/>
-            </a:br>
-            <a:r>
-              <a:rPr lang="en-US" dirty="0"/>
-              <a:t>Challenges </a:t>
-            </a:r>
-            <a:br>
-              <a:rPr lang="en-US" dirty="0"/>
-            </a:br>
-            <a:endParaRPr lang="en-US" dirty="0"/>
-          </a:p>
-        </p:txBody>
-      </p:sp>
-      <p:sp>
-        <p:nvSpPr>
-          <p:cNvPr id="3" name="Text Placeholder 2">
-            <a:extLst>
-              <a:ext uri="{FF2B5EF4-FFF2-40B4-BE49-F238E27FC236}">
-                <a16:creationId xmlns:a16="http://schemas.microsoft.com/office/drawing/2014/main" id="{4481ED22-CC5A-1C0C-92B1-BE18477AF5A0}"/>
-              </a:ext>
-            </a:extLst>
-          </p:cNvPr>
-          <p:cNvSpPr>
-            <a:spLocks noGrp="1"/>
-          </p:cNvSpPr>
-          <p:nvPr>
-            <p:ph type="body" sz="quarter" idx="3"/>
-          </p:nvPr>
-        </p:nvSpPr>
-        <p:spPr/>
-        <p:txBody>
-          <a:bodyPr/>
-          <a:lstStyle/>
-          <a:p>
-            <a:endParaRPr lang="en-US"/>
-          </a:p>
-        </p:txBody>
-      </p:sp>
-      <p:sp>
-        <p:nvSpPr>
-          <p:cNvPr id="10" name="Content Placeholder 9">
-            <a:extLst>
-              <a:ext uri="{FF2B5EF4-FFF2-40B4-BE49-F238E27FC236}">
-                <a16:creationId xmlns:a16="http://schemas.microsoft.com/office/drawing/2014/main" id="{36A475B4-B50B-5084-9AFE-E7E03D7A69B7}"/>
-              </a:ext>
-            </a:extLst>
-          </p:cNvPr>
-          <p:cNvSpPr>
-            <a:spLocks noGrp="1"/>
-          </p:cNvSpPr>
-          <p:nvPr>
-            <p:ph sz="quarter" idx="4"/>
-          </p:nvPr>
-        </p:nvSpPr>
-        <p:spPr/>
-        <p:txBody>
-          <a:bodyPr/>
-          <a:lstStyle/>
-          <a:p>
-            <a:endParaRPr lang="en-US"/>
-          </a:p>
-        </p:txBody>
-      </p:sp>
-      <p:sp>
-        <p:nvSpPr>
-          <p:cNvPr id="12" name="Text Placeholder 11">
-            <a:extLst>
-              <a:ext uri="{FF2B5EF4-FFF2-40B4-BE49-F238E27FC236}">
-                <a16:creationId xmlns:a16="http://schemas.microsoft.com/office/drawing/2014/main" id="{B47D7A09-57EA-F524-90A9-2457C48D5884}"/>
-              </a:ext>
-            </a:extLst>
-          </p:cNvPr>
-          <p:cNvSpPr>
-            <a:spLocks noGrp="1"/>
-          </p:cNvSpPr>
-          <p:nvPr>
-            <p:ph type="body" idx="1"/>
-          </p:nvPr>
-        </p:nvSpPr>
-        <p:spPr/>
-        <p:txBody>
-          <a:bodyPr/>
-          <a:lstStyle/>
-          <a:p>
-            <a:endParaRPr lang="en-US"/>
+              <a:t>NLP Sentiment Scores</a:t>
+            </a:r>
           </a:p>
         </p:txBody>
       </p:sp>
@@ -5016,19 +8047,63 @@
             <p:ph sz="half" idx="2"/>
           </p:nvPr>
         </p:nvSpPr>
-        <p:spPr/>
-        <p:txBody>
-          <a:bodyPr/>
+        <p:spPr>
+          <a:xfrm>
+            <a:off x="390140" y="1667425"/>
+            <a:ext cx="8378468" cy="2276294"/>
+          </a:xfrm>
+        </p:spPr>
+        <p:txBody>
+          <a:bodyPr>
+            <a:normAutofit fontScale="92500" lnSpcReduction="20000"/>
+          </a:bodyPr>
           <a:lstStyle/>
           <a:p>
-            <a:endParaRPr lang="en-US"/>
+            <a:pPr algn="l"/>
+            <a:r>
+              <a:rPr lang="en-US" dirty="0"/>
+              <a:t>Polygon Ticker News API</a:t>
+            </a:r>
+          </a:p>
+          <a:p>
+            <a:pPr algn="l"/>
+            <a:r>
+              <a:rPr lang="en-US" dirty="0"/>
+              <a:t>Sourced news articles for CY ‘22 ytd for various tickers</a:t>
+            </a:r>
+          </a:p>
+          <a:p>
+            <a:pPr algn="l"/>
+            <a:r>
+              <a:rPr lang="en-US" dirty="0"/>
+              <a:t>Performed sentiment analysis on both the title and text of new articles</a:t>
+            </a:r>
+          </a:p>
+          <a:p>
+            <a:pPr algn="l"/>
+            <a:r>
+              <a:rPr lang="en-US" dirty="0"/>
+              <a:t>Correlation metrics against stock performance to determine whether title or text compound score would serve as the main feature for the machine learning model</a:t>
+            </a:r>
+          </a:p>
+          <a:p>
+            <a:pPr marL="0" indent="0">
+              <a:buNone/>
+            </a:pPr>
+            <a:endParaRPr lang="en-US" dirty="0"/>
+          </a:p>
+          <a:p>
+            <a:pPr marL="0" indent="0">
+              <a:buNone/>
+            </a:pPr>
+            <a:endParaRPr lang="en-US" dirty="0"/>
           </a:p>
         </p:txBody>
       </p:sp>
     </p:spTree>
     <p:extLst>
       <p:ext uri="{BB962C8B-B14F-4D97-AF65-F5344CB8AC3E}">
-        <p14:creationId xmlns:p14="http://schemas.microsoft.com/office/powerpoint/2010/main" val="4201720666"/>
+        <p14:creationId xmlns:p14="http://schemas.microsoft.com/office/powerpoint/2010/main" val="2850158995"/>
       </p:ext>
     </p:extLst>
   </p:cSld>
@@ -5057,48 +8132,235 @@
       </p:grpSpPr>
       <p:sp>
         <p:nvSpPr>
-          <p:cNvPr id="5" name="TextBox 4">
+          <p:cNvPr id="4" name="Title 3"/>
+          <p:cNvSpPr>
+            <a:spLocks noGrp="1"/>
+          </p:cNvSpPr>
+          <p:nvPr>
+            <p:ph type="title"/>
+          </p:nvPr>
+        </p:nvSpPr>
+        <p:spPr/>
+        <p:txBody>
+          <a:bodyPr>
+            <a:normAutofit fontScale="90000"/>
+          </a:bodyPr>
+          <a:lstStyle/>
+          <a:p>
+            <a:r>
+              <a:rPr lang="en-US" dirty="0"/>
+              <a:t> </a:t>
+            </a:r>
+            <a:br>
+              <a:rPr lang="en-US" dirty="0"/>
+            </a:br>
+            <a:r>
+              <a:rPr lang="en-US" dirty="0"/>
+              <a:t>ML - LSTM </a:t>
+            </a:r>
+            <a:br>
+              <a:rPr lang="en-US" dirty="0"/>
+            </a:br>
+            <a:endParaRPr lang="en-US" dirty="0"/>
+          </a:p>
+        </p:txBody>
+      </p:sp>
+      <p:sp>
+        <p:nvSpPr>
+          <p:cNvPr id="14" name="Content Placeholder 13">
             <a:extLst>
               <a:ext uri="{FF2B5EF4-FFF2-40B4-BE49-F238E27FC236}">
-                <a16:creationId xmlns:a16="http://schemas.microsoft.com/office/drawing/2014/main" id="{C203A596-FF26-A210-2113-4A9A67629F3D}"/>
+                <a16:creationId xmlns:a16="http://schemas.microsoft.com/office/drawing/2014/main" id="{B8EA48B3-BFEC-5250-84ED-7AE604E94D24}"/>
               </a:ext>
             </a:extLst>
           </p:cNvPr>
-          <p:cNvSpPr txBox="1"/>
-          <p:nvPr/>
+          <p:cNvSpPr>
+            <a:spLocks noGrp="1"/>
+          </p:cNvSpPr>
+          <p:nvPr>
+            <p:ph sz="half" idx="2"/>
+          </p:nvPr>
         </p:nvSpPr>
         <p:spPr>
           <a:xfrm>
-            <a:off x="1856232" y="2387084"/>
-            <a:ext cx="5870448" cy="707886"/>
+            <a:off x="522131" y="2127914"/>
+            <a:ext cx="8161380" cy="2276294"/>
           </a:xfrm>
-          <a:prstGeom prst="rect">
-            <a:avLst/>
-          </a:prstGeom>
-          <a:noFill/>
         </p:spPr>
         <p:txBody>
-          <a:bodyPr wrap="square" rtlCol="0">
-            <a:spAutoFit/>
+          <a:bodyPr>
+            <a:normAutofit fontScale="85000" lnSpcReduction="20000"/>
           </a:bodyPr>
           <a:lstStyle/>
           <a:p>
-            <a:pPr algn="ctr"/>
-            <a:r>
-              <a:rPr lang="en-US" sz="4000" dirty="0">
-                <a:solidFill>
-                  <a:schemeClr val="bg1"/>
-                </a:solidFill>
-              </a:rPr>
-              <a:t>Questions ?</a:t>
-            </a:r>
+            <a:pPr algn="l"/>
+            <a:r>
+              <a:rPr lang="en-US" dirty="0"/>
+              <a:t>LSTM Model to predict future stock prices based upon sentiment scores</a:t>
+            </a:r>
+          </a:p>
+          <a:p>
+            <a:pPr algn="l"/>
+            <a:r>
+              <a:rPr lang="en-US" dirty="0"/>
+              <a:t>Natural Language Processing + Time Series Data</a:t>
+            </a:r>
+          </a:p>
+          <a:p>
+            <a:pPr algn="l"/>
+            <a:r>
+              <a:rPr lang="en-US" dirty="0"/>
+              <a:t>Hyperparameter Tuning</a:t>
+            </a:r>
+          </a:p>
+          <a:p>
+            <a:pPr lvl="1" algn="l"/>
+            <a:r>
+              <a:rPr lang="en-US" dirty="0"/>
+              <a:t>Window size</a:t>
+            </a:r>
+          </a:p>
+          <a:p>
+            <a:pPr lvl="1" algn="l"/>
+            <a:r>
+              <a:rPr lang="en-US" dirty="0"/>
+              <a:t>Number of Units</a:t>
+            </a:r>
+          </a:p>
+          <a:p>
+            <a:pPr lvl="1" algn="l"/>
+            <a:r>
+              <a:rPr lang="en-US" dirty="0"/>
+              <a:t>Dropout Ratio</a:t>
+            </a:r>
+          </a:p>
+          <a:p>
+            <a:pPr lvl="1" algn="l"/>
+            <a:r>
+              <a:rPr lang="en-US" dirty="0"/>
+              <a:t>Epochs</a:t>
+            </a:r>
+          </a:p>
+          <a:p>
+            <a:pPr lvl="1" algn="l"/>
+            <a:r>
+              <a:rPr lang="en-US" dirty="0"/>
+              <a:t>Batch Size</a:t>
+            </a:r>
+          </a:p>
+          <a:p>
+            <a:pPr algn="l"/>
+            <a:endParaRPr lang="en-US" dirty="0"/>
+          </a:p>
+          <a:p>
+            <a:pPr algn="l"/>
+            <a:endParaRPr lang="en-US" dirty="0"/>
           </a:p>
         </p:txBody>
       </p:sp>
     </p:spTree>
     <p:extLst>
       <p:ext uri="{BB962C8B-B14F-4D97-AF65-F5344CB8AC3E}">
-        <p14:creationId xmlns:p14="http://schemas.microsoft.com/office/powerpoint/2010/main" val="109100692"/>
+        <p14:creationId xmlns:p14="http://schemas.microsoft.com/office/powerpoint/2010/main" val="1267715079"/>
+      </p:ext>
+    </p:extLst>
+  </p:cSld>
+  <p:clrMapOvr>
+    <a:masterClrMapping/>
+  </p:clrMapOvr>
+</p:sld>
+</file>
+
+<file path=ppt/slides/slide9.xml><?xml version="1.0" encoding="utf-8"?>
+<p:sld xmlns:a="http://schemas.openxmlformats.org/drawingml/2006/main" xmlns:r="http://schemas.openxmlformats.org/officeDocument/2006/relationships" xmlns:p="http://schemas.openxmlformats.org/presentationml/2006/main">
+  <p:cSld>
+    <p:spTree>
+      <p:nvGrpSpPr>
+        <p:cNvPr id="1" name=""/>
+        <p:cNvGrpSpPr/>
+        <p:nvPr/>
+      </p:nvGrpSpPr>
+      <p:grpSpPr>
+        <a:xfrm>
+          <a:off x="0" y="0"/>
+          <a:ext cx="0" cy="0"/>
+          <a:chOff x="0" y="0"/>
+          <a:chExt cx="0" cy="0"/>
+        </a:xfrm>
+      </p:grpSpPr>
+      <p:sp>
+        <p:nvSpPr>
+          <p:cNvPr id="4" name="Title 3"/>
+          <p:cNvSpPr>
+            <a:spLocks noGrp="1"/>
+          </p:cNvSpPr>
+          <p:nvPr>
+            <p:ph type="title"/>
+          </p:nvPr>
+        </p:nvSpPr>
+        <p:spPr/>
+        <p:txBody>
+          <a:bodyPr>
+            <a:normAutofit fontScale="90000"/>
+          </a:bodyPr>
+          <a:lstStyle/>
+          <a:p>
+            <a:r>
+              <a:rPr lang="en-US" dirty="0"/>
+              <a:t> </a:t>
+            </a:r>
+            <a:br>
+              <a:rPr lang="en-US" dirty="0"/>
+            </a:br>
+            <a:r>
+              <a:rPr lang="en-US" dirty="0"/>
+              <a:t>Challenges </a:t>
+            </a:r>
+            <a:br>
+              <a:rPr lang="en-US" dirty="0"/>
+            </a:br>
+            <a:endParaRPr lang="en-US" dirty="0"/>
+          </a:p>
+        </p:txBody>
+      </p:sp>
+      <p:sp>
+        <p:nvSpPr>
+          <p:cNvPr id="14" name="Content Placeholder 13">
+            <a:extLst>
+              <a:ext uri="{FF2B5EF4-FFF2-40B4-BE49-F238E27FC236}">
+                <a16:creationId xmlns:a16="http://schemas.microsoft.com/office/drawing/2014/main" id="{B8EA48B3-BFEC-5250-84ED-7AE604E94D24}"/>
+              </a:ext>
+            </a:extLst>
+          </p:cNvPr>
+          <p:cNvSpPr>
+            <a:spLocks noGrp="1"/>
+          </p:cNvSpPr>
+          <p:nvPr>
+            <p:ph sz="half" idx="2"/>
+          </p:nvPr>
+        </p:nvSpPr>
+        <p:spPr>
+          <a:xfrm>
+            <a:off x="522130" y="1627632"/>
+            <a:ext cx="8093365" cy="2776576"/>
+          </a:xfrm>
+        </p:spPr>
+        <p:txBody>
+          <a:bodyPr/>
+          <a:lstStyle/>
+          <a:p>
+            <a:pPr algn="l"/>
+            <a:r>
+              <a:rPr lang="en-US" dirty="0"/>
+              <a:t>News data collection</a:t>
+            </a:r>
+          </a:p>
+        </p:txBody>
+      </p:sp>
+    </p:spTree>
+    <p:extLst>
+      <p:ext uri="{BB962C8B-B14F-4D97-AF65-F5344CB8AC3E}">
+        <p14:creationId xmlns:p14="http://schemas.microsoft.com/office/powerpoint/2010/main" val="4201720666"/>
       </p:ext>
     </p:extLst>
   </p:cSld>

</xml_diff>

<commit_message>
lstm charts and addt'l slide to review NVDA and ARKK LSTM model charts
</commit_message>
<xml_diff>
--- a/Project 02.pptx
+++ b/Project 02.pptx
@@ -5,7 +5,7 @@
     <p:sldMasterId id="2147483648" r:id="rId1"/>
   </p:sldMasterIdLst>
   <p:notesMasterIdLst>
-    <p:notesMasterId r:id="rId13"/>
+    <p:notesMasterId r:id="rId14"/>
   </p:notesMasterIdLst>
   <p:sldIdLst>
     <p:sldId id="256" r:id="rId2"/>
@@ -16,9 +16,10 @@
     <p:sldId id="261" r:id="rId7"/>
     <p:sldId id="264" r:id="rId8"/>
     <p:sldId id="263" r:id="rId9"/>
-    <p:sldId id="262" r:id="rId10"/>
-    <p:sldId id="267" r:id="rId11"/>
-    <p:sldId id="260" r:id="rId12"/>
+    <p:sldId id="268" r:id="rId10"/>
+    <p:sldId id="262" r:id="rId11"/>
+    <p:sldId id="267" r:id="rId12"/>
+    <p:sldId id="260" r:id="rId13"/>
   </p:sldIdLst>
   <p:sldSz cx="9144000" cy="5143500" type="screen16x9"/>
   <p:notesSz cx="6858000" cy="9144000"/>
@@ -218,7 +219,7 @@
           <a:p>
             <a:fld id="{C8D18E60-4300-4729-A0D7-6AB984C3922D}" type="datetimeFigureOut">
               <a:rPr lang="en-US" smtClean="0"/>
-              <a:t>6/10/22</a:t>
+              <a:t>6/10/2022</a:t>
             </a:fld>
             <a:endParaRPr lang="en-US"/>
           </a:p>
@@ -634,7 +635,7 @@
           <a:p>
             <a:fld id="{87350B06-B074-48FC-8CFD-53D2CD8FB95F}" type="slidenum">
               <a:rPr lang="en-US" smtClean="0"/>
-              <a:t>11</a:t>
+              <a:t>12</a:t>
             </a:fld>
             <a:endParaRPr lang="en-US"/>
           </a:p>
@@ -872,7 +873,7 @@
             <a:fld id="{53074F12-AA26-4AC8-9962-C36BB8F32554}" type="datetimeFigureOut">
               <a:rPr lang="en-US" smtClean="0"/>
               <a:pPr/>
-              <a:t>6/10/22</a:t>
+              <a:t>6/10/2022</a:t>
             </a:fld>
             <a:endParaRPr lang="en-US"/>
           </a:p>
@@ -1126,7 +1127,7 @@
             <a:fld id="{53074F12-AA26-4AC8-9962-C36BB8F32554}" type="datetimeFigureOut">
               <a:rPr lang="en-US" smtClean="0"/>
               <a:pPr/>
-              <a:t>6/10/22</a:t>
+              <a:t>6/10/2022</a:t>
             </a:fld>
             <a:endParaRPr lang="en-US"/>
           </a:p>
@@ -1296,7 +1297,7 @@
             <a:fld id="{53074F12-AA26-4AC8-9962-C36BB8F32554}" type="datetimeFigureOut">
               <a:rPr lang="en-US" smtClean="0"/>
               <a:pPr/>
-              <a:t>6/10/22</a:t>
+              <a:t>6/10/2022</a:t>
             </a:fld>
             <a:endParaRPr lang="en-US"/>
           </a:p>
@@ -1476,7 +1477,7 @@
             <a:fld id="{53074F12-AA26-4AC8-9962-C36BB8F32554}" type="datetimeFigureOut">
               <a:rPr lang="en-US" smtClean="0"/>
               <a:pPr/>
-              <a:t>6/10/22</a:t>
+              <a:t>6/10/2022</a:t>
             </a:fld>
             <a:endParaRPr lang="en-US"/>
           </a:p>
@@ -1758,7 +1759,7 @@
             <a:fld id="{53074F12-AA26-4AC8-9962-C36BB8F32554}" type="datetimeFigureOut">
               <a:rPr lang="en-US" smtClean="0"/>
               <a:pPr/>
-              <a:t>6/10/22</a:t>
+              <a:t>6/10/2022</a:t>
             </a:fld>
             <a:endParaRPr lang="en-US"/>
           </a:p>
@@ -2005,7 +2006,7 @@
             <a:fld id="{53074F12-AA26-4AC8-9962-C36BB8F32554}" type="datetimeFigureOut">
               <a:rPr lang="en-US" smtClean="0"/>
               <a:pPr/>
-              <a:t>6/10/22</a:t>
+              <a:t>6/10/2022</a:t>
             </a:fld>
             <a:endParaRPr lang="en-US"/>
           </a:p>
@@ -2252,7 +2253,7 @@
             <a:fld id="{53074F12-AA26-4AC8-9962-C36BB8F32554}" type="datetimeFigureOut">
               <a:rPr lang="en-US" smtClean="0"/>
               <a:pPr/>
-              <a:t>6/10/22</a:t>
+              <a:t>6/10/2022</a:t>
             </a:fld>
             <a:endParaRPr lang="en-US"/>
           </a:p>
@@ -2539,7 +2540,7 @@
             <a:fld id="{53074F12-AA26-4AC8-9962-C36BB8F32554}" type="datetimeFigureOut">
               <a:rPr lang="en-US" smtClean="0"/>
               <a:pPr/>
-              <a:t>6/10/22</a:t>
+              <a:t>6/10/2022</a:t>
             </a:fld>
             <a:endParaRPr lang="en-US"/>
           </a:p>
@@ -3026,7 +3027,7 @@
             <a:fld id="{53074F12-AA26-4AC8-9962-C36BB8F32554}" type="datetimeFigureOut">
               <a:rPr lang="en-US" smtClean="0"/>
               <a:pPr/>
-              <a:t>6/10/22</a:t>
+              <a:t>6/10/2022</a:t>
             </a:fld>
             <a:endParaRPr lang="en-US"/>
           </a:p>
@@ -3145,7 +3146,7 @@
             <a:fld id="{53074F12-AA26-4AC8-9962-C36BB8F32554}" type="datetimeFigureOut">
               <a:rPr lang="en-US" smtClean="0"/>
               <a:pPr/>
-              <a:t>6/10/22</a:t>
+              <a:t>6/10/2022</a:t>
             </a:fld>
             <a:endParaRPr lang="en-US"/>
           </a:p>
@@ -3242,7 +3243,7 @@
             <a:fld id="{53074F12-AA26-4AC8-9962-C36BB8F32554}" type="datetimeFigureOut">
               <a:rPr lang="en-US" smtClean="0"/>
               <a:pPr/>
-              <a:t>6/10/22</a:t>
+              <a:t>6/10/2022</a:t>
             </a:fld>
             <a:endParaRPr lang="en-US"/>
           </a:p>
@@ -3519,7 +3520,7 @@
             <a:fld id="{53074F12-AA26-4AC8-9962-C36BB8F32554}" type="datetimeFigureOut">
               <a:rPr lang="en-US" smtClean="0"/>
               <a:pPr/>
-              <a:t>6/10/22</a:t>
+              <a:t>6/10/2022</a:t>
             </a:fld>
             <a:endParaRPr lang="en-US"/>
           </a:p>
@@ -3741,7 +3742,7 @@
             <a:fld id="{53074F12-AA26-4AC8-9962-C36BB8F32554}" type="datetimeFigureOut">
               <a:rPr lang="en-US" smtClean="0"/>
               <a:pPr/>
-              <a:t>6/10/22</a:t>
+              <a:t>6/10/2022</a:t>
             </a:fld>
             <a:endParaRPr lang="en-US"/>
           </a:p>
@@ -4300,6 +4301,105 @@
       </p:grpSpPr>
       <p:sp>
         <p:nvSpPr>
+          <p:cNvPr id="4" name="Title 3"/>
+          <p:cNvSpPr>
+            <a:spLocks noGrp="1"/>
+          </p:cNvSpPr>
+          <p:nvPr>
+            <p:ph type="title"/>
+          </p:nvPr>
+        </p:nvSpPr>
+        <p:spPr/>
+        <p:txBody>
+          <a:bodyPr>
+            <a:normAutofit fontScale="90000"/>
+          </a:bodyPr>
+          <a:lstStyle/>
+          <a:p>
+            <a:r>
+              <a:rPr lang="en-US" dirty="0"/>
+              <a:t> </a:t>
+            </a:r>
+            <a:br>
+              <a:rPr lang="en-US" dirty="0"/>
+            </a:br>
+            <a:r>
+              <a:rPr lang="en-US" dirty="0"/>
+              <a:t>Challenges </a:t>
+            </a:r>
+            <a:br>
+              <a:rPr lang="en-US" dirty="0"/>
+            </a:br>
+            <a:endParaRPr lang="en-US" dirty="0"/>
+          </a:p>
+        </p:txBody>
+      </p:sp>
+      <p:sp>
+        <p:nvSpPr>
+          <p:cNvPr id="14" name="Content Placeholder 13">
+            <a:extLst>
+              <a:ext uri="{FF2B5EF4-FFF2-40B4-BE49-F238E27FC236}">
+                <a16:creationId xmlns:a16="http://schemas.microsoft.com/office/drawing/2014/main" id="{B8EA48B3-BFEC-5250-84ED-7AE604E94D24}"/>
+              </a:ext>
+            </a:extLst>
+          </p:cNvPr>
+          <p:cNvSpPr>
+            <a:spLocks noGrp="1"/>
+          </p:cNvSpPr>
+          <p:nvPr>
+            <p:ph sz="half" idx="2"/>
+          </p:nvPr>
+        </p:nvSpPr>
+        <p:spPr>
+          <a:xfrm>
+            <a:off x="522130" y="1627632"/>
+            <a:ext cx="8093365" cy="2776576"/>
+          </a:xfrm>
+        </p:spPr>
+        <p:txBody>
+          <a:bodyPr/>
+          <a:lstStyle/>
+          <a:p>
+            <a:pPr algn="l"/>
+            <a:r>
+              <a:rPr lang="en-US" dirty="0"/>
+              <a:t>News data collection</a:t>
+            </a:r>
+          </a:p>
+        </p:txBody>
+      </p:sp>
+    </p:spTree>
+    <p:extLst>
+      <p:ext uri="{BB962C8B-B14F-4D97-AF65-F5344CB8AC3E}">
+        <p14:creationId xmlns:p14="http://schemas.microsoft.com/office/powerpoint/2010/main" val="4201720666"/>
+      </p:ext>
+    </p:extLst>
+  </p:cSld>
+  <p:clrMapOvr>
+    <a:masterClrMapping/>
+  </p:clrMapOvr>
+</p:sld>
+</file>
+
+<file path=ppt/slides/slide11.xml><?xml version="1.0" encoding="utf-8"?>
+<p:sld xmlns:a="http://schemas.openxmlformats.org/drawingml/2006/main" xmlns:r="http://schemas.openxmlformats.org/officeDocument/2006/relationships" xmlns:p="http://schemas.openxmlformats.org/presentationml/2006/main">
+  <p:cSld>
+    <p:spTree>
+      <p:nvGrpSpPr>
+        <p:cNvPr id="1" name=""/>
+        <p:cNvGrpSpPr/>
+        <p:nvPr/>
+      </p:nvGrpSpPr>
+      <p:grpSpPr>
+        <a:xfrm>
+          <a:off x="0" y="0"/>
+          <a:ext cx="0" cy="0"/>
+          <a:chOff x="0" y="0"/>
+          <a:chExt cx="0" cy="0"/>
+        </a:xfrm>
+      </p:grpSpPr>
+      <p:sp>
+        <p:nvSpPr>
           <p:cNvPr id="2" name="Title 1">
             <a:extLst>
               <a:ext uri="{FF2B5EF4-FFF2-40B4-BE49-F238E27FC236}">
@@ -4415,7 +4515,7 @@
 </p:sld>
 </file>
 
-<file path=ppt/slides/slide11.xml><?xml version="1.0" encoding="utf-8"?>
+<file path=ppt/slides/slide12.xml><?xml version="1.0" encoding="utf-8"?>
 <p:sld xmlns:a="http://schemas.openxmlformats.org/drawingml/2006/main" xmlns:r="http://schemas.openxmlformats.org/officeDocument/2006/relationships" xmlns:p="http://schemas.openxmlformats.org/presentationml/2006/main">
   <p:cSld>
     <p:spTree>
@@ -5950,7 +6050,7 @@
           </p:nvPr>
         </p:nvPicPr>
         <p:blipFill>
-          <a:blip r:embed="rId3">
+          <a:blip r:embed="rId3" cstate="print">
             <a:extLst>
               <a:ext uri="{28A0092B-C50C-407E-A947-70E740481C1C}">
                 <a14:useLocalDpi xmlns:a14="http://schemas.microsoft.com/office/drawing/2010/main" val="0"/>
@@ -6022,7 +6122,7 @@
           </p:nvPr>
         </p:nvPicPr>
         <p:blipFill>
-          <a:blip r:embed="rId4">
+          <a:blip r:embed="rId4" cstate="print">
             <a:extLst>
               <a:ext uri="{28A0092B-C50C-407E-A947-70E740481C1C}">
                 <a14:useLocalDpi xmlns:a14="http://schemas.microsoft.com/office/drawing/2010/main" val="0"/>
@@ -6055,7 +6155,7 @@
           <p:nvPr/>
         </p:nvPicPr>
         <p:blipFill>
-          <a:blip r:embed="rId5">
+          <a:blip r:embed="rId5" cstate="print">
             <a:extLst>
               <a:ext uri="{28A0092B-C50C-407E-A947-70E740481C1C}">
                 <a14:useLocalDpi xmlns:a14="http://schemas.microsoft.com/office/drawing/2010/main" val="0"/>
@@ -6091,7 +6191,7 @@
           <p:nvPr/>
         </p:nvPicPr>
         <p:blipFill>
-          <a:blip r:embed="rId6">
+          <a:blip r:embed="rId6" cstate="print">
             <a:extLst>
               <a:ext uri="{28A0092B-C50C-407E-A947-70E740481C1C}">
                 <a14:useLocalDpi xmlns:a14="http://schemas.microsoft.com/office/drawing/2010/main" val="0"/>
@@ -6757,7 +6857,7 @@
           </p:nvPr>
         </p:nvPicPr>
         <p:blipFill>
-          <a:blip r:embed="rId2">
+          <a:blip r:embed="rId2" cstate="print">
             <a:extLst>
               <a:ext uri="{28A0092B-C50C-407E-A947-70E740481C1C}">
                 <a14:useLocalDpi xmlns:a14="http://schemas.microsoft.com/office/drawing/2010/main" val="0"/>
@@ -6827,7 +6927,7 @@
           </p:nvPr>
         </p:nvPicPr>
         <p:blipFill>
-          <a:blip r:embed="rId3">
+          <a:blip r:embed="rId3" cstate="print">
             <a:extLst>
               <a:ext uri="{28A0092B-C50C-407E-A947-70E740481C1C}">
                 <a14:useLocalDpi xmlns:a14="http://schemas.microsoft.com/office/drawing/2010/main" val="0"/>
@@ -8314,7 +8414,7 @@
             </a:br>
             <a:r>
               <a:rPr lang="en-US" dirty="0"/>
-              <a:t>Challenges </a:t>
+              <a:t>ML – LSTM Cont’d </a:t>
             </a:r>
             <a:br>
               <a:rPr lang="en-US" dirty="0"/>
@@ -8325,10 +8425,10 @@
       </p:sp>
       <p:sp>
         <p:nvSpPr>
-          <p:cNvPr id="14" name="Content Placeholder 13">
+          <p:cNvPr id="6" name="Text Placeholder 11">
             <a:extLst>
               <a:ext uri="{FF2B5EF4-FFF2-40B4-BE49-F238E27FC236}">
-                <a16:creationId xmlns:a16="http://schemas.microsoft.com/office/drawing/2014/main" id="{B8EA48B3-BFEC-5250-84ED-7AE604E94D24}"/>
+                <a16:creationId xmlns:a16="http://schemas.microsoft.com/office/drawing/2014/main" id="{F03B4F5B-220E-B7D5-2B18-5144B4F46DD3}"/>
               </a:ext>
             </a:extLst>
           </p:cNvPr>
@@ -8336,37 +8436,522 @@
             <a:spLocks noGrp="1"/>
           </p:cNvSpPr>
           <p:nvPr>
-            <p:ph sz="half" idx="2"/>
+            <p:ph type="body" idx="1"/>
           </p:nvPr>
         </p:nvSpPr>
         <p:spPr>
           <a:xfrm>
-            <a:off x="522130" y="1627632"/>
-            <a:ext cx="8093365" cy="2776576"/>
+            <a:off x="706298" y="1624171"/>
+            <a:ext cx="3140606" cy="479822"/>
           </a:xfrm>
         </p:spPr>
         <p:txBody>
-          <a:bodyPr/>
+          <a:bodyPr>
+            <a:normAutofit/>
+          </a:bodyPr>
           <a:lstStyle/>
           <a:p>
-            <a:pPr algn="l"/>
-            <a:r>
-              <a:rPr lang="en-US" dirty="0"/>
-              <a:t>News data collection</a:t>
-            </a:r>
-          </a:p>
-        </p:txBody>
-      </p:sp>
+            <a:r>
+              <a:rPr lang="en-US" dirty="0"/>
+              <a:t>NVDA</a:t>
+            </a:r>
+          </a:p>
+        </p:txBody>
+      </p:sp>
+      <p:sp>
+        <p:nvSpPr>
+          <p:cNvPr id="7" name="Text Placeholder 11">
+            <a:extLst>
+              <a:ext uri="{FF2B5EF4-FFF2-40B4-BE49-F238E27FC236}">
+                <a16:creationId xmlns:a16="http://schemas.microsoft.com/office/drawing/2014/main" id="{51C06715-6D48-C21F-811B-C1E1547336A2}"/>
+              </a:ext>
+            </a:extLst>
+          </p:cNvPr>
+          <p:cNvSpPr txBox="1">
+            <a:spLocks/>
+          </p:cNvSpPr>
+          <p:nvPr/>
+        </p:nvSpPr>
+        <p:spPr>
+          <a:xfrm>
+            <a:off x="5297096" y="1624171"/>
+            <a:ext cx="3140606" cy="479822"/>
+          </a:xfrm>
+          <a:prstGeom prst="rect">
+            <a:avLst/>
+          </a:prstGeom>
+        </p:spPr>
+        <p:txBody>
+          <a:bodyPr vert="horz" lIns="91440" tIns="45720" rIns="91440" bIns="45720" rtlCol="0" anchor="b">
+            <a:normAutofit/>
+          </a:bodyPr>
+          <a:lstStyle>
+            <a:lvl1pPr marL="0" indent="0" algn="ctr" defTabSz="914400" rtl="0" eaLnBrk="1" latinLnBrk="0" hangingPunct="1">
+              <a:spcBef>
+                <a:spcPct val="20000"/>
+              </a:spcBef>
+              <a:buFont typeface="Arial" pitchFamily="34" charset="0"/>
+              <a:buNone/>
+              <a:defRPr sz="2400" b="1" kern="1200">
+                <a:solidFill>
+                  <a:schemeClr val="bg1"/>
+                </a:solidFill>
+                <a:latin typeface="+mn-lt"/>
+                <a:ea typeface="+mn-ea"/>
+                <a:cs typeface="+mn-cs"/>
+              </a:defRPr>
+            </a:lvl1pPr>
+            <a:lvl2pPr marL="457200" indent="0" algn="l" defTabSz="914400" rtl="0" eaLnBrk="1" latinLnBrk="0" hangingPunct="1">
+              <a:spcBef>
+                <a:spcPct val="20000"/>
+              </a:spcBef>
+              <a:buFont typeface="Arial" pitchFamily="34" charset="0"/>
+              <a:buNone/>
+              <a:defRPr sz="2000" b="1" kern="1200">
+                <a:solidFill>
+                  <a:schemeClr val="tx1"/>
+                </a:solidFill>
+                <a:latin typeface="+mn-lt"/>
+                <a:ea typeface="+mn-ea"/>
+                <a:cs typeface="+mn-cs"/>
+              </a:defRPr>
+            </a:lvl2pPr>
+            <a:lvl3pPr marL="914400" indent="0" algn="l" defTabSz="914400" rtl="0" eaLnBrk="1" latinLnBrk="0" hangingPunct="1">
+              <a:spcBef>
+                <a:spcPct val="20000"/>
+              </a:spcBef>
+              <a:buFont typeface="Arial" pitchFamily="34" charset="0"/>
+              <a:buNone/>
+              <a:defRPr sz="1800" b="1" kern="1200">
+                <a:solidFill>
+                  <a:schemeClr val="tx1"/>
+                </a:solidFill>
+                <a:latin typeface="+mn-lt"/>
+                <a:ea typeface="+mn-ea"/>
+                <a:cs typeface="+mn-cs"/>
+              </a:defRPr>
+            </a:lvl3pPr>
+            <a:lvl4pPr marL="1371600" indent="0" algn="l" defTabSz="914400" rtl="0" eaLnBrk="1" latinLnBrk="0" hangingPunct="1">
+              <a:spcBef>
+                <a:spcPct val="20000"/>
+              </a:spcBef>
+              <a:buFont typeface="Arial" pitchFamily="34" charset="0"/>
+              <a:buNone/>
+              <a:defRPr sz="1600" b="1" kern="1200">
+                <a:solidFill>
+                  <a:schemeClr val="tx1"/>
+                </a:solidFill>
+                <a:latin typeface="+mn-lt"/>
+                <a:ea typeface="+mn-ea"/>
+                <a:cs typeface="+mn-cs"/>
+              </a:defRPr>
+            </a:lvl4pPr>
+            <a:lvl5pPr marL="1828800" indent="0" algn="l" defTabSz="914400" rtl="0" eaLnBrk="1" latinLnBrk="0" hangingPunct="1">
+              <a:spcBef>
+                <a:spcPct val="20000"/>
+              </a:spcBef>
+              <a:buFont typeface="Arial" pitchFamily="34" charset="0"/>
+              <a:buNone/>
+              <a:defRPr sz="1600" b="1" kern="1200">
+                <a:solidFill>
+                  <a:schemeClr val="tx1"/>
+                </a:solidFill>
+                <a:latin typeface="+mn-lt"/>
+                <a:ea typeface="+mn-ea"/>
+                <a:cs typeface="+mn-cs"/>
+              </a:defRPr>
+            </a:lvl5pPr>
+            <a:lvl6pPr marL="2286000" indent="0" algn="l" defTabSz="914400" rtl="0" eaLnBrk="1" latinLnBrk="0" hangingPunct="1">
+              <a:spcBef>
+                <a:spcPct val="20000"/>
+              </a:spcBef>
+              <a:buFont typeface="Arial" pitchFamily="34" charset="0"/>
+              <a:buNone/>
+              <a:defRPr sz="1600" b="1" kern="1200">
+                <a:solidFill>
+                  <a:schemeClr val="tx1"/>
+                </a:solidFill>
+                <a:latin typeface="+mn-lt"/>
+                <a:ea typeface="+mn-ea"/>
+                <a:cs typeface="+mn-cs"/>
+              </a:defRPr>
+            </a:lvl6pPr>
+            <a:lvl7pPr marL="2743200" indent="0" algn="l" defTabSz="914400" rtl="0" eaLnBrk="1" latinLnBrk="0" hangingPunct="1">
+              <a:spcBef>
+                <a:spcPct val="20000"/>
+              </a:spcBef>
+              <a:buFont typeface="Arial" pitchFamily="34" charset="0"/>
+              <a:buNone/>
+              <a:defRPr sz="1600" b="1" kern="1200">
+                <a:solidFill>
+                  <a:schemeClr val="tx1"/>
+                </a:solidFill>
+                <a:latin typeface="+mn-lt"/>
+                <a:ea typeface="+mn-ea"/>
+                <a:cs typeface="+mn-cs"/>
+              </a:defRPr>
+            </a:lvl7pPr>
+            <a:lvl8pPr marL="3200400" indent="0" algn="l" defTabSz="914400" rtl="0" eaLnBrk="1" latinLnBrk="0" hangingPunct="1">
+              <a:spcBef>
+                <a:spcPct val="20000"/>
+              </a:spcBef>
+              <a:buFont typeface="Arial" pitchFamily="34" charset="0"/>
+              <a:buNone/>
+              <a:defRPr sz="1600" b="1" kern="1200">
+                <a:solidFill>
+                  <a:schemeClr val="tx1"/>
+                </a:solidFill>
+                <a:latin typeface="+mn-lt"/>
+                <a:ea typeface="+mn-ea"/>
+                <a:cs typeface="+mn-cs"/>
+              </a:defRPr>
+            </a:lvl8pPr>
+            <a:lvl9pPr marL="3657600" indent="0" algn="l" defTabSz="914400" rtl="0" eaLnBrk="1" latinLnBrk="0" hangingPunct="1">
+              <a:spcBef>
+                <a:spcPct val="20000"/>
+              </a:spcBef>
+              <a:buFont typeface="Arial" pitchFamily="34" charset="0"/>
+              <a:buNone/>
+              <a:defRPr sz="1600" b="1" kern="1200">
+                <a:solidFill>
+                  <a:schemeClr val="tx1"/>
+                </a:solidFill>
+                <a:latin typeface="+mn-lt"/>
+                <a:ea typeface="+mn-ea"/>
+                <a:cs typeface="+mn-cs"/>
+              </a:defRPr>
+            </a:lvl9pPr>
+          </a:lstStyle>
+          <a:p>
+            <a:r>
+              <a:rPr lang="en-US" dirty="0"/>
+              <a:t>ARKK</a:t>
+            </a:r>
+          </a:p>
+        </p:txBody>
+      </p:sp>
+      <p:pic>
+        <p:nvPicPr>
+          <p:cNvPr id="8" name="Picture 7" descr="Chart, line chart&#10;&#10;Description automatically generated">
+            <a:extLst>
+              <a:ext uri="{FF2B5EF4-FFF2-40B4-BE49-F238E27FC236}">
+                <a16:creationId xmlns:a16="http://schemas.microsoft.com/office/drawing/2014/main" id="{7CB9EC50-41FF-F05A-8410-9F006B03F949}"/>
+              </a:ext>
+            </a:extLst>
+          </p:cNvPr>
+          <p:cNvPicPr>
+            <a:picLocks noChangeAspect="1"/>
+          </p:cNvPicPr>
+          <p:nvPr/>
+        </p:nvPicPr>
+        <p:blipFill>
+          <a:blip r:embed="rId2" cstate="print">
+            <a:extLst>
+              <a:ext uri="{28A0092B-C50C-407E-A947-70E740481C1C}">
+                <a14:useLocalDpi xmlns:a14="http://schemas.microsoft.com/office/drawing/2010/main" val="0"/>
+              </a:ext>
+            </a:extLst>
+          </a:blip>
+          <a:stretch>
+            <a:fillRect/>
+          </a:stretch>
+        </p:blipFill>
+        <p:spPr>
+          <a:xfrm>
+            <a:off x="4805151" y="2320032"/>
+            <a:ext cx="4124497" cy="2072170"/>
+          </a:xfrm>
+          <a:prstGeom prst="rect">
+            <a:avLst/>
+          </a:prstGeom>
+        </p:spPr>
+      </p:pic>
+      <p:pic>
+        <p:nvPicPr>
+          <p:cNvPr id="10" name="Picture 9" descr="Chart, line chart&#10;&#10;Description automatically generated">
+            <a:extLst>
+              <a:ext uri="{FF2B5EF4-FFF2-40B4-BE49-F238E27FC236}">
+                <a16:creationId xmlns:a16="http://schemas.microsoft.com/office/drawing/2014/main" id="{FE0F5E55-614F-D9FC-7816-06B1A6D16209}"/>
+              </a:ext>
+            </a:extLst>
+          </p:cNvPr>
+          <p:cNvPicPr>
+            <a:picLocks noChangeAspect="1"/>
+          </p:cNvPicPr>
+          <p:nvPr/>
+        </p:nvPicPr>
+        <p:blipFill>
+          <a:blip r:embed="rId3" cstate="print">
+            <a:extLst>
+              <a:ext uri="{28A0092B-C50C-407E-A947-70E740481C1C}">
+                <a14:useLocalDpi xmlns:a14="http://schemas.microsoft.com/office/drawing/2010/main" val="0"/>
+              </a:ext>
+            </a:extLst>
+          </a:blip>
+          <a:stretch>
+            <a:fillRect/>
+          </a:stretch>
+        </p:blipFill>
+        <p:spPr>
+          <a:xfrm>
+            <a:off x="214354" y="2320032"/>
+            <a:ext cx="4124497" cy="2072170"/>
+          </a:xfrm>
+          <a:prstGeom prst="rect">
+            <a:avLst/>
+          </a:prstGeom>
+        </p:spPr>
+      </p:pic>
     </p:spTree>
     <p:extLst>
       <p:ext uri="{BB962C8B-B14F-4D97-AF65-F5344CB8AC3E}">
-        <p14:creationId xmlns:p14="http://schemas.microsoft.com/office/powerpoint/2010/main" val="4201720666"/>
+        <p14:creationId xmlns:p14="http://schemas.microsoft.com/office/powerpoint/2010/main" val="3660762209"/>
       </p:ext>
     </p:extLst>
   </p:cSld>
   <p:clrMapOvr>
     <a:masterClrMapping/>
   </p:clrMapOvr>
+  <p:timing>
+    <p:tnLst>
+      <p:par>
+        <p:cTn id="1" dur="indefinite" restart="never" nodeType="tmRoot">
+          <p:childTnLst>
+            <p:seq concurrent="1" nextAc="seek">
+              <p:cTn id="2" dur="indefinite" nodeType="mainSeq">
+                <p:childTnLst>
+                  <p:par>
+                    <p:cTn id="3" fill="hold">
+                      <p:stCondLst>
+                        <p:cond delay="indefinite"/>
+                      </p:stCondLst>
+                      <p:childTnLst>
+                        <p:par>
+                          <p:cTn id="4" fill="hold">
+                            <p:stCondLst>
+                              <p:cond delay="0"/>
+                            </p:stCondLst>
+                            <p:childTnLst>
+                              <p:par>
+                                <p:cTn id="5" presetID="2" presetClass="entr" presetSubtype="4" fill="hold" grpId="0" nodeType="clickEffect">
+                                  <p:stCondLst>
+                                    <p:cond delay="0"/>
+                                  </p:stCondLst>
+                                  <p:childTnLst>
+                                    <p:set>
+                                      <p:cBhvr>
+                                        <p:cTn id="6" dur="1" fill="hold">
+                                          <p:stCondLst>
+                                            <p:cond delay="0"/>
+                                          </p:stCondLst>
+                                        </p:cTn>
+                                        <p:tgtEl>
+                                          <p:spTgt spid="6">
+                                            <p:txEl>
+                                              <p:pRg st="0" end="0"/>
+                                            </p:txEl>
+                                          </p:spTgt>
+                                        </p:tgtEl>
+                                        <p:attrNameLst>
+                                          <p:attrName>style.visibility</p:attrName>
+                                        </p:attrNameLst>
+                                      </p:cBhvr>
+                                      <p:to>
+                                        <p:strVal val="visible"/>
+                                      </p:to>
+                                    </p:set>
+                                    <p:anim calcmode="lin" valueType="num">
+                                      <p:cBhvr additive="base">
+                                        <p:cTn id="7" dur="500" fill="hold"/>
+                                        <p:tgtEl>
+                                          <p:spTgt spid="6">
+                                            <p:txEl>
+                                              <p:pRg st="0" end="0"/>
+                                            </p:txEl>
+                                          </p:spTgt>
+                                        </p:tgtEl>
+                                        <p:attrNameLst>
+                                          <p:attrName>ppt_x</p:attrName>
+                                        </p:attrNameLst>
+                                      </p:cBhvr>
+                                      <p:tavLst>
+                                        <p:tav tm="0">
+                                          <p:val>
+                                            <p:strVal val="#ppt_x"/>
+                                          </p:val>
+                                        </p:tav>
+                                        <p:tav tm="100000">
+                                          <p:val>
+                                            <p:strVal val="#ppt_x"/>
+                                          </p:val>
+                                        </p:tav>
+                                      </p:tavLst>
+                                    </p:anim>
+                                    <p:anim calcmode="lin" valueType="num">
+                                      <p:cBhvr additive="base">
+                                        <p:cTn id="8" dur="500" fill="hold"/>
+                                        <p:tgtEl>
+                                          <p:spTgt spid="6">
+                                            <p:txEl>
+                                              <p:pRg st="0" end="0"/>
+                                            </p:txEl>
+                                          </p:spTgt>
+                                        </p:tgtEl>
+                                        <p:attrNameLst>
+                                          <p:attrName>ppt_y</p:attrName>
+                                        </p:attrNameLst>
+                                      </p:cBhvr>
+                                      <p:tavLst>
+                                        <p:tav tm="0">
+                                          <p:val>
+                                            <p:strVal val="1+#ppt_h/2"/>
+                                          </p:val>
+                                        </p:tav>
+                                        <p:tav tm="100000">
+                                          <p:val>
+                                            <p:strVal val="#ppt_y"/>
+                                          </p:val>
+                                        </p:tav>
+                                      </p:tavLst>
+                                    </p:anim>
+                                  </p:childTnLst>
+                                </p:cTn>
+                              </p:par>
+                            </p:childTnLst>
+                          </p:cTn>
+                        </p:par>
+                      </p:childTnLst>
+                    </p:cTn>
+                  </p:par>
+                  <p:par>
+                    <p:cTn id="9" fill="hold">
+                      <p:stCondLst>
+                        <p:cond delay="indefinite"/>
+                      </p:stCondLst>
+                      <p:childTnLst>
+                        <p:par>
+                          <p:cTn id="10" fill="hold">
+                            <p:stCondLst>
+                              <p:cond delay="0"/>
+                            </p:stCondLst>
+                            <p:childTnLst>
+                              <p:par>
+                                <p:cTn id="11" presetID="2" presetClass="entr" presetSubtype="4" fill="hold" grpId="0" nodeType="clickEffect">
+                                  <p:stCondLst>
+                                    <p:cond delay="0"/>
+                                  </p:stCondLst>
+                                  <p:childTnLst>
+                                    <p:set>
+                                      <p:cBhvr>
+                                        <p:cTn id="12" dur="1" fill="hold">
+                                          <p:stCondLst>
+                                            <p:cond delay="0"/>
+                                          </p:stCondLst>
+                                        </p:cTn>
+                                        <p:tgtEl>
+                                          <p:spTgt spid="7">
+                                            <p:txEl>
+                                              <p:pRg st="0" end="0"/>
+                                            </p:txEl>
+                                          </p:spTgt>
+                                        </p:tgtEl>
+                                        <p:attrNameLst>
+                                          <p:attrName>style.visibility</p:attrName>
+                                        </p:attrNameLst>
+                                      </p:cBhvr>
+                                      <p:to>
+                                        <p:strVal val="visible"/>
+                                      </p:to>
+                                    </p:set>
+                                    <p:anim calcmode="lin" valueType="num">
+                                      <p:cBhvr additive="base">
+                                        <p:cTn id="13" dur="500" fill="hold"/>
+                                        <p:tgtEl>
+                                          <p:spTgt spid="7">
+                                            <p:txEl>
+                                              <p:pRg st="0" end="0"/>
+                                            </p:txEl>
+                                          </p:spTgt>
+                                        </p:tgtEl>
+                                        <p:attrNameLst>
+                                          <p:attrName>ppt_x</p:attrName>
+                                        </p:attrNameLst>
+                                      </p:cBhvr>
+                                      <p:tavLst>
+                                        <p:tav tm="0">
+                                          <p:val>
+                                            <p:strVal val="#ppt_x"/>
+                                          </p:val>
+                                        </p:tav>
+                                        <p:tav tm="100000">
+                                          <p:val>
+                                            <p:strVal val="#ppt_x"/>
+                                          </p:val>
+                                        </p:tav>
+                                      </p:tavLst>
+                                    </p:anim>
+                                    <p:anim calcmode="lin" valueType="num">
+                                      <p:cBhvr additive="base">
+                                        <p:cTn id="14" dur="500" fill="hold"/>
+                                        <p:tgtEl>
+                                          <p:spTgt spid="7">
+                                            <p:txEl>
+                                              <p:pRg st="0" end="0"/>
+                                            </p:txEl>
+                                          </p:spTgt>
+                                        </p:tgtEl>
+                                        <p:attrNameLst>
+                                          <p:attrName>ppt_y</p:attrName>
+                                        </p:attrNameLst>
+                                      </p:cBhvr>
+                                      <p:tavLst>
+                                        <p:tav tm="0">
+                                          <p:val>
+                                            <p:strVal val="1+#ppt_h/2"/>
+                                          </p:val>
+                                        </p:tav>
+                                        <p:tav tm="100000">
+                                          <p:val>
+                                            <p:strVal val="#ppt_y"/>
+                                          </p:val>
+                                        </p:tav>
+                                      </p:tavLst>
+                                    </p:anim>
+                                  </p:childTnLst>
+                                </p:cTn>
+                              </p:par>
+                            </p:childTnLst>
+                          </p:cTn>
+                        </p:par>
+                      </p:childTnLst>
+                    </p:cTn>
+                  </p:par>
+                </p:childTnLst>
+              </p:cTn>
+              <p:prevCondLst>
+                <p:cond evt="onPrev" delay="0">
+                  <p:tgtEl>
+                    <p:sldTgt/>
+                  </p:tgtEl>
+                </p:cond>
+              </p:prevCondLst>
+              <p:nextCondLst>
+                <p:cond evt="onNext" delay="0">
+                  <p:tgtEl>
+                    <p:sldTgt/>
+                  </p:tgtEl>
+                </p:cond>
+              </p:nextCondLst>
+            </p:seq>
+          </p:childTnLst>
+        </p:cTn>
+      </p:par>
+    </p:tnLst>
+    <p:bldLst>
+      <p:bldP spid="6" grpId="0" build="p"/>
+      <p:bldP spid="7" grpId="0" build="p"/>
+    </p:bldLst>
+  </p:timing>
 </p:sld>
 </file>
 

</xml_diff>

<commit_message>
Finalized slides and Merged Prepocessing & ML to one notebook
</commit_message>
<xml_diff>
--- a/Project 02.pptx
+++ b/Project 02.pptx
@@ -219,7 +219,7 @@
           <a:p>
             <a:fld id="{C8D18E60-4300-4729-A0D7-6AB984C3922D}" type="datetimeFigureOut">
               <a:rPr lang="en-US" smtClean="0"/>
-              <a:t>6/10/2022</a:t>
+              <a:t>6/11/22</a:t>
             </a:fld>
             <a:endParaRPr lang="en-US"/>
           </a:p>
@@ -873,7 +873,7 @@
             <a:fld id="{53074F12-AA26-4AC8-9962-C36BB8F32554}" type="datetimeFigureOut">
               <a:rPr lang="en-US" smtClean="0"/>
               <a:pPr/>
-              <a:t>6/10/2022</a:t>
+              <a:t>6/11/22</a:t>
             </a:fld>
             <a:endParaRPr lang="en-US"/>
           </a:p>
@@ -1127,7 +1127,7 @@
             <a:fld id="{53074F12-AA26-4AC8-9962-C36BB8F32554}" type="datetimeFigureOut">
               <a:rPr lang="en-US" smtClean="0"/>
               <a:pPr/>
-              <a:t>6/10/2022</a:t>
+              <a:t>6/11/22</a:t>
             </a:fld>
             <a:endParaRPr lang="en-US"/>
           </a:p>
@@ -1297,7 +1297,7 @@
             <a:fld id="{53074F12-AA26-4AC8-9962-C36BB8F32554}" type="datetimeFigureOut">
               <a:rPr lang="en-US" smtClean="0"/>
               <a:pPr/>
-              <a:t>6/10/2022</a:t>
+              <a:t>6/11/22</a:t>
             </a:fld>
             <a:endParaRPr lang="en-US"/>
           </a:p>
@@ -1477,7 +1477,7 @@
             <a:fld id="{53074F12-AA26-4AC8-9962-C36BB8F32554}" type="datetimeFigureOut">
               <a:rPr lang="en-US" smtClean="0"/>
               <a:pPr/>
-              <a:t>6/10/2022</a:t>
+              <a:t>6/11/22</a:t>
             </a:fld>
             <a:endParaRPr lang="en-US"/>
           </a:p>
@@ -1759,7 +1759,7 @@
             <a:fld id="{53074F12-AA26-4AC8-9962-C36BB8F32554}" type="datetimeFigureOut">
               <a:rPr lang="en-US" smtClean="0"/>
               <a:pPr/>
-              <a:t>6/10/2022</a:t>
+              <a:t>6/11/22</a:t>
             </a:fld>
             <a:endParaRPr lang="en-US"/>
           </a:p>
@@ -2006,7 +2006,7 @@
             <a:fld id="{53074F12-AA26-4AC8-9962-C36BB8F32554}" type="datetimeFigureOut">
               <a:rPr lang="en-US" smtClean="0"/>
               <a:pPr/>
-              <a:t>6/10/2022</a:t>
+              <a:t>6/11/22</a:t>
             </a:fld>
             <a:endParaRPr lang="en-US"/>
           </a:p>
@@ -2253,7 +2253,7 @@
             <a:fld id="{53074F12-AA26-4AC8-9962-C36BB8F32554}" type="datetimeFigureOut">
               <a:rPr lang="en-US" smtClean="0"/>
               <a:pPr/>
-              <a:t>6/10/2022</a:t>
+              <a:t>6/11/22</a:t>
             </a:fld>
             <a:endParaRPr lang="en-US"/>
           </a:p>
@@ -2540,7 +2540,7 @@
             <a:fld id="{53074F12-AA26-4AC8-9962-C36BB8F32554}" type="datetimeFigureOut">
               <a:rPr lang="en-US" smtClean="0"/>
               <a:pPr/>
-              <a:t>6/10/2022</a:t>
+              <a:t>6/11/22</a:t>
             </a:fld>
             <a:endParaRPr lang="en-US"/>
           </a:p>
@@ -3027,7 +3027,7 @@
             <a:fld id="{53074F12-AA26-4AC8-9962-C36BB8F32554}" type="datetimeFigureOut">
               <a:rPr lang="en-US" smtClean="0"/>
               <a:pPr/>
-              <a:t>6/10/2022</a:t>
+              <a:t>6/11/22</a:t>
             </a:fld>
             <a:endParaRPr lang="en-US"/>
           </a:p>
@@ -3146,7 +3146,7 @@
             <a:fld id="{53074F12-AA26-4AC8-9962-C36BB8F32554}" type="datetimeFigureOut">
               <a:rPr lang="en-US" smtClean="0"/>
               <a:pPr/>
-              <a:t>6/10/2022</a:t>
+              <a:t>6/11/22</a:t>
             </a:fld>
             <a:endParaRPr lang="en-US"/>
           </a:p>
@@ -3243,7 +3243,7 @@
             <a:fld id="{53074F12-AA26-4AC8-9962-C36BB8F32554}" type="datetimeFigureOut">
               <a:rPr lang="en-US" smtClean="0"/>
               <a:pPr/>
-              <a:t>6/10/2022</a:t>
+              <a:t>6/11/22</a:t>
             </a:fld>
             <a:endParaRPr lang="en-US"/>
           </a:p>
@@ -3520,7 +3520,7 @@
             <a:fld id="{53074F12-AA26-4AC8-9962-C36BB8F32554}" type="datetimeFigureOut">
               <a:rPr lang="en-US" smtClean="0"/>
               <a:pPr/>
-              <a:t>6/10/2022</a:t>
+              <a:t>6/11/22</a:t>
             </a:fld>
             <a:endParaRPr lang="en-US"/>
           </a:p>
@@ -3742,7 +3742,7 @@
             <a:fld id="{53074F12-AA26-4AC8-9962-C36BB8F32554}" type="datetimeFigureOut">
               <a:rPr lang="en-US" smtClean="0"/>
               <a:pPr/>
-              <a:t>6/10/2022</a:t>
+              <a:t>6/11/22</a:t>
             </a:fld>
             <a:endParaRPr lang="en-US"/>
           </a:p>
@@ -4366,6 +4366,31 @@
               <a:t>News data collection</a:t>
             </a:r>
           </a:p>
+          <a:p>
+            <a:pPr algn="l"/>
+            <a:r>
+              <a:rPr lang="en-US" dirty="0"/>
+              <a:t>Twitter / Reddit API constraints</a:t>
+            </a:r>
+          </a:p>
+          <a:p>
+            <a:pPr algn="l"/>
+            <a:r>
+              <a:rPr lang="en-US" dirty="0"/>
+              <a:t>Lack of full news article</a:t>
+            </a:r>
+          </a:p>
+          <a:p>
+            <a:pPr algn="l"/>
+            <a:r>
+              <a:rPr lang="en-US" dirty="0"/>
+              <a:t>Modifying the hyper tuning parameters</a:t>
+            </a:r>
+          </a:p>
+          <a:p>
+            <a:pPr algn="l"/>
+            <a:endParaRPr lang="en-US" dirty="0"/>
+          </a:p>
         </p:txBody>
       </p:sp>
     </p:spTree>
@@ -4378,6 +4403,394 @@
   <p:clrMapOvr>
     <a:masterClrMapping/>
   </p:clrMapOvr>
+  <p:timing>
+    <p:tnLst>
+      <p:par>
+        <p:cTn id="1" dur="indefinite" restart="never" nodeType="tmRoot">
+          <p:childTnLst>
+            <p:seq concurrent="1" nextAc="seek">
+              <p:cTn id="2" dur="indefinite" nodeType="mainSeq">
+                <p:childTnLst>
+                  <p:par>
+                    <p:cTn id="3" fill="hold">
+                      <p:stCondLst>
+                        <p:cond delay="indefinite"/>
+                      </p:stCondLst>
+                      <p:childTnLst>
+                        <p:par>
+                          <p:cTn id="4" fill="hold">
+                            <p:stCondLst>
+                              <p:cond delay="0"/>
+                            </p:stCondLst>
+                            <p:childTnLst>
+                              <p:par>
+                                <p:cTn id="5" presetID="2" presetClass="entr" presetSubtype="4" fill="hold" nodeType="clickEffect">
+                                  <p:stCondLst>
+                                    <p:cond delay="0"/>
+                                  </p:stCondLst>
+                                  <p:childTnLst>
+                                    <p:set>
+                                      <p:cBhvr>
+                                        <p:cTn id="6" dur="1" fill="hold">
+                                          <p:stCondLst>
+                                            <p:cond delay="0"/>
+                                          </p:stCondLst>
+                                        </p:cTn>
+                                        <p:tgtEl>
+                                          <p:spTgt spid="14">
+                                            <p:txEl>
+                                              <p:pRg st="0" end="0"/>
+                                            </p:txEl>
+                                          </p:spTgt>
+                                        </p:tgtEl>
+                                        <p:attrNameLst>
+                                          <p:attrName>style.visibility</p:attrName>
+                                        </p:attrNameLst>
+                                      </p:cBhvr>
+                                      <p:to>
+                                        <p:strVal val="visible"/>
+                                      </p:to>
+                                    </p:set>
+                                    <p:anim calcmode="lin" valueType="num">
+                                      <p:cBhvr additive="base">
+                                        <p:cTn id="7" dur="500" fill="hold"/>
+                                        <p:tgtEl>
+                                          <p:spTgt spid="14">
+                                            <p:txEl>
+                                              <p:pRg st="0" end="0"/>
+                                            </p:txEl>
+                                          </p:spTgt>
+                                        </p:tgtEl>
+                                        <p:attrNameLst>
+                                          <p:attrName>ppt_x</p:attrName>
+                                        </p:attrNameLst>
+                                      </p:cBhvr>
+                                      <p:tavLst>
+                                        <p:tav tm="0">
+                                          <p:val>
+                                            <p:strVal val="#ppt_x"/>
+                                          </p:val>
+                                        </p:tav>
+                                        <p:tav tm="100000">
+                                          <p:val>
+                                            <p:strVal val="#ppt_x"/>
+                                          </p:val>
+                                        </p:tav>
+                                      </p:tavLst>
+                                    </p:anim>
+                                    <p:anim calcmode="lin" valueType="num">
+                                      <p:cBhvr additive="base">
+                                        <p:cTn id="8" dur="500" fill="hold"/>
+                                        <p:tgtEl>
+                                          <p:spTgt spid="14">
+                                            <p:txEl>
+                                              <p:pRg st="0" end="0"/>
+                                            </p:txEl>
+                                          </p:spTgt>
+                                        </p:tgtEl>
+                                        <p:attrNameLst>
+                                          <p:attrName>ppt_y</p:attrName>
+                                        </p:attrNameLst>
+                                      </p:cBhvr>
+                                      <p:tavLst>
+                                        <p:tav tm="0">
+                                          <p:val>
+                                            <p:strVal val="1+#ppt_h/2"/>
+                                          </p:val>
+                                        </p:tav>
+                                        <p:tav tm="100000">
+                                          <p:val>
+                                            <p:strVal val="#ppt_y"/>
+                                          </p:val>
+                                        </p:tav>
+                                      </p:tavLst>
+                                    </p:anim>
+                                  </p:childTnLst>
+                                </p:cTn>
+                              </p:par>
+                              <p:par>
+                                <p:cTn id="9" presetID="2" presetClass="entr" presetSubtype="4" fill="hold" nodeType="withEffect">
+                                  <p:stCondLst>
+                                    <p:cond delay="0"/>
+                                  </p:stCondLst>
+                                  <p:childTnLst>
+                                    <p:set>
+                                      <p:cBhvr>
+                                        <p:cTn id="10" dur="1" fill="hold">
+                                          <p:stCondLst>
+                                            <p:cond delay="0"/>
+                                          </p:stCondLst>
+                                        </p:cTn>
+                                        <p:tgtEl>
+                                          <p:spTgt spid="14">
+                                            <p:txEl>
+                                              <p:pRg st="1" end="1"/>
+                                            </p:txEl>
+                                          </p:spTgt>
+                                        </p:tgtEl>
+                                        <p:attrNameLst>
+                                          <p:attrName>style.visibility</p:attrName>
+                                        </p:attrNameLst>
+                                      </p:cBhvr>
+                                      <p:to>
+                                        <p:strVal val="visible"/>
+                                      </p:to>
+                                    </p:set>
+                                    <p:anim calcmode="lin" valueType="num">
+                                      <p:cBhvr additive="base">
+                                        <p:cTn id="11" dur="500" fill="hold"/>
+                                        <p:tgtEl>
+                                          <p:spTgt spid="14">
+                                            <p:txEl>
+                                              <p:pRg st="1" end="1"/>
+                                            </p:txEl>
+                                          </p:spTgt>
+                                        </p:tgtEl>
+                                        <p:attrNameLst>
+                                          <p:attrName>ppt_x</p:attrName>
+                                        </p:attrNameLst>
+                                      </p:cBhvr>
+                                      <p:tavLst>
+                                        <p:tav tm="0">
+                                          <p:val>
+                                            <p:strVal val="#ppt_x"/>
+                                          </p:val>
+                                        </p:tav>
+                                        <p:tav tm="100000">
+                                          <p:val>
+                                            <p:strVal val="#ppt_x"/>
+                                          </p:val>
+                                        </p:tav>
+                                      </p:tavLst>
+                                    </p:anim>
+                                    <p:anim calcmode="lin" valueType="num">
+                                      <p:cBhvr additive="base">
+                                        <p:cTn id="12" dur="500" fill="hold"/>
+                                        <p:tgtEl>
+                                          <p:spTgt spid="14">
+                                            <p:txEl>
+                                              <p:pRg st="1" end="1"/>
+                                            </p:txEl>
+                                          </p:spTgt>
+                                        </p:tgtEl>
+                                        <p:attrNameLst>
+                                          <p:attrName>ppt_y</p:attrName>
+                                        </p:attrNameLst>
+                                      </p:cBhvr>
+                                      <p:tavLst>
+                                        <p:tav tm="0">
+                                          <p:val>
+                                            <p:strVal val="1+#ppt_h/2"/>
+                                          </p:val>
+                                        </p:tav>
+                                        <p:tav tm="100000">
+                                          <p:val>
+                                            <p:strVal val="#ppt_y"/>
+                                          </p:val>
+                                        </p:tav>
+                                      </p:tavLst>
+                                    </p:anim>
+                                  </p:childTnLst>
+                                </p:cTn>
+                              </p:par>
+                              <p:par>
+                                <p:cTn id="13" presetID="2" presetClass="entr" presetSubtype="4" fill="hold" nodeType="withEffect">
+                                  <p:stCondLst>
+                                    <p:cond delay="0"/>
+                                  </p:stCondLst>
+                                  <p:childTnLst>
+                                    <p:set>
+                                      <p:cBhvr>
+                                        <p:cTn id="14" dur="1" fill="hold">
+                                          <p:stCondLst>
+                                            <p:cond delay="0"/>
+                                          </p:stCondLst>
+                                        </p:cTn>
+                                        <p:tgtEl>
+                                          <p:spTgt spid="14">
+                                            <p:txEl>
+                                              <p:pRg st="2" end="2"/>
+                                            </p:txEl>
+                                          </p:spTgt>
+                                        </p:tgtEl>
+                                        <p:attrNameLst>
+                                          <p:attrName>style.visibility</p:attrName>
+                                        </p:attrNameLst>
+                                      </p:cBhvr>
+                                      <p:to>
+                                        <p:strVal val="visible"/>
+                                      </p:to>
+                                    </p:set>
+                                    <p:anim calcmode="lin" valueType="num">
+                                      <p:cBhvr additive="base">
+                                        <p:cTn id="15" dur="500" fill="hold"/>
+                                        <p:tgtEl>
+                                          <p:spTgt spid="14">
+                                            <p:txEl>
+                                              <p:pRg st="2" end="2"/>
+                                            </p:txEl>
+                                          </p:spTgt>
+                                        </p:tgtEl>
+                                        <p:attrNameLst>
+                                          <p:attrName>ppt_x</p:attrName>
+                                        </p:attrNameLst>
+                                      </p:cBhvr>
+                                      <p:tavLst>
+                                        <p:tav tm="0">
+                                          <p:val>
+                                            <p:strVal val="#ppt_x"/>
+                                          </p:val>
+                                        </p:tav>
+                                        <p:tav tm="100000">
+                                          <p:val>
+                                            <p:strVal val="#ppt_x"/>
+                                          </p:val>
+                                        </p:tav>
+                                      </p:tavLst>
+                                    </p:anim>
+                                    <p:anim calcmode="lin" valueType="num">
+                                      <p:cBhvr additive="base">
+                                        <p:cTn id="16" dur="500" fill="hold"/>
+                                        <p:tgtEl>
+                                          <p:spTgt spid="14">
+                                            <p:txEl>
+                                              <p:pRg st="2" end="2"/>
+                                            </p:txEl>
+                                          </p:spTgt>
+                                        </p:tgtEl>
+                                        <p:attrNameLst>
+                                          <p:attrName>ppt_y</p:attrName>
+                                        </p:attrNameLst>
+                                      </p:cBhvr>
+                                      <p:tavLst>
+                                        <p:tav tm="0">
+                                          <p:val>
+                                            <p:strVal val="1+#ppt_h/2"/>
+                                          </p:val>
+                                        </p:tav>
+                                        <p:tav tm="100000">
+                                          <p:val>
+                                            <p:strVal val="#ppt_y"/>
+                                          </p:val>
+                                        </p:tav>
+                                      </p:tavLst>
+                                    </p:anim>
+                                  </p:childTnLst>
+                                </p:cTn>
+                              </p:par>
+                              <p:par>
+                                <p:cTn id="17" presetID="2" presetClass="entr" presetSubtype="4" fill="hold" nodeType="withEffect">
+                                  <p:stCondLst>
+                                    <p:cond delay="0"/>
+                                  </p:stCondLst>
+                                  <p:childTnLst>
+                                    <p:set>
+                                      <p:cBhvr>
+                                        <p:cTn id="18" dur="1" fill="hold">
+                                          <p:stCondLst>
+                                            <p:cond delay="0"/>
+                                          </p:stCondLst>
+                                        </p:cTn>
+                                        <p:tgtEl>
+                                          <p:spTgt spid="14">
+                                            <p:txEl>
+                                              <p:pRg st="3" end="3"/>
+                                            </p:txEl>
+                                          </p:spTgt>
+                                        </p:tgtEl>
+                                        <p:attrNameLst>
+                                          <p:attrName>style.visibility</p:attrName>
+                                        </p:attrNameLst>
+                                      </p:cBhvr>
+                                      <p:to>
+                                        <p:strVal val="visible"/>
+                                      </p:to>
+                                    </p:set>
+                                    <p:anim calcmode="lin" valueType="num">
+                                      <p:cBhvr additive="base">
+                                        <p:cTn id="19" dur="500" fill="hold"/>
+                                        <p:tgtEl>
+                                          <p:spTgt spid="14">
+                                            <p:txEl>
+                                              <p:pRg st="3" end="3"/>
+                                            </p:txEl>
+                                          </p:spTgt>
+                                        </p:tgtEl>
+                                        <p:attrNameLst>
+                                          <p:attrName>ppt_x</p:attrName>
+                                        </p:attrNameLst>
+                                      </p:cBhvr>
+                                      <p:tavLst>
+                                        <p:tav tm="0">
+                                          <p:val>
+                                            <p:strVal val="#ppt_x"/>
+                                          </p:val>
+                                        </p:tav>
+                                        <p:tav tm="100000">
+                                          <p:val>
+                                            <p:strVal val="#ppt_x"/>
+                                          </p:val>
+                                        </p:tav>
+                                      </p:tavLst>
+                                    </p:anim>
+                                    <p:anim calcmode="lin" valueType="num">
+                                      <p:cBhvr additive="base">
+                                        <p:cTn id="20" dur="500" fill="hold"/>
+                                        <p:tgtEl>
+                                          <p:spTgt spid="14">
+                                            <p:txEl>
+                                              <p:pRg st="3" end="3"/>
+                                            </p:txEl>
+                                          </p:spTgt>
+                                        </p:tgtEl>
+                                        <p:attrNameLst>
+                                          <p:attrName>ppt_y</p:attrName>
+                                        </p:attrNameLst>
+                                      </p:cBhvr>
+                                      <p:tavLst>
+                                        <p:tav tm="0">
+                                          <p:val>
+                                            <p:strVal val="1+#ppt_h/2"/>
+                                          </p:val>
+                                        </p:tav>
+                                        <p:tav tm="100000">
+                                          <p:val>
+                                            <p:strVal val="#ppt_y"/>
+                                          </p:val>
+                                        </p:tav>
+                                      </p:tavLst>
+                                    </p:anim>
+                                  </p:childTnLst>
+                                </p:cTn>
+                              </p:par>
+                            </p:childTnLst>
+                          </p:cTn>
+                        </p:par>
+                      </p:childTnLst>
+                    </p:cTn>
+                  </p:par>
+                </p:childTnLst>
+              </p:cTn>
+              <p:prevCondLst>
+                <p:cond evt="onPrev" delay="0">
+                  <p:tgtEl>
+                    <p:sldTgt/>
+                  </p:tgtEl>
+                </p:cond>
+              </p:prevCondLst>
+              <p:nextCondLst>
+                <p:cond evt="onNext" delay="0">
+                  <p:tgtEl>
+                    <p:sldTgt/>
+                  </p:tgtEl>
+                </p:cond>
+              </p:nextCondLst>
+            </p:seq>
+          </p:childTnLst>
+        </p:cTn>
+      </p:par>
+    </p:tnLst>
+  </p:timing>
 </p:sld>
 </file>
 
@@ -4639,7 +5052,7 @@
         <p:spPr/>
         <p:txBody>
           <a:bodyPr>
-            <a:normAutofit fontScale="92500" lnSpcReduction="20000"/>
+            <a:normAutofit lnSpcReduction="10000"/>
           </a:bodyPr>
           <a:lstStyle/>
           <a:p>
@@ -4675,13 +5088,7 @@
           <a:p>
             <a:r>
               <a:rPr lang="en-US" dirty="0"/>
-              <a:t>Expansion</a:t>
-            </a:r>
-          </a:p>
-          <a:p>
-            <a:r>
-              <a:rPr lang="en-US" dirty="0"/>
-              <a:t> Ideas</a:t>
+              <a:t>Expansion Ideas</a:t>
             </a:r>
           </a:p>
           <a:p>
@@ -4708,6 +5115,355 @@
   <p:clrMapOvr>
     <a:masterClrMapping/>
   </p:clrMapOvr>
+  <p:timing>
+    <p:tnLst>
+      <p:par>
+        <p:cTn id="1" dur="indefinite" restart="never" nodeType="tmRoot">
+          <p:childTnLst>
+            <p:seq concurrent="1" nextAc="seek">
+              <p:cTn id="2" dur="indefinite" nodeType="mainSeq">
+                <p:childTnLst>
+                  <p:par>
+                    <p:cTn id="3" fill="hold">
+                      <p:stCondLst>
+                        <p:cond delay="indefinite"/>
+                      </p:stCondLst>
+                      <p:childTnLst>
+                        <p:par>
+                          <p:cTn id="4" fill="hold">
+                            <p:stCondLst>
+                              <p:cond delay="0"/>
+                            </p:stCondLst>
+                            <p:childTnLst>
+                              <p:par>
+                                <p:cTn id="5" presetID="5" presetClass="entr" presetSubtype="10" fill="hold" nodeType="clickEffect">
+                                  <p:stCondLst>
+                                    <p:cond delay="0"/>
+                                  </p:stCondLst>
+                                  <p:childTnLst>
+                                    <p:set>
+                                      <p:cBhvr>
+                                        <p:cTn id="6" dur="1" fill="hold">
+                                          <p:stCondLst>
+                                            <p:cond delay="0"/>
+                                          </p:stCondLst>
+                                        </p:cTn>
+                                        <p:tgtEl>
+                                          <p:spTgt spid="3">
+                                            <p:txEl>
+                                              <p:pRg st="0" end="0"/>
+                                            </p:txEl>
+                                          </p:spTgt>
+                                        </p:tgtEl>
+                                        <p:attrNameLst>
+                                          <p:attrName>style.visibility</p:attrName>
+                                        </p:attrNameLst>
+                                      </p:cBhvr>
+                                      <p:to>
+                                        <p:strVal val="visible"/>
+                                      </p:to>
+                                    </p:set>
+                                    <p:animEffect transition="in" filter="checkerboard(across)">
+                                      <p:cBhvr>
+                                        <p:cTn id="7" dur="500"/>
+                                        <p:tgtEl>
+                                          <p:spTgt spid="3">
+                                            <p:txEl>
+                                              <p:pRg st="0" end="0"/>
+                                            </p:txEl>
+                                          </p:spTgt>
+                                        </p:tgtEl>
+                                      </p:cBhvr>
+                                    </p:animEffect>
+                                  </p:childTnLst>
+                                </p:cTn>
+                              </p:par>
+                              <p:par>
+                                <p:cTn id="8" presetID="5" presetClass="entr" presetSubtype="10" fill="hold" nodeType="withEffect">
+                                  <p:stCondLst>
+                                    <p:cond delay="0"/>
+                                  </p:stCondLst>
+                                  <p:childTnLst>
+                                    <p:set>
+                                      <p:cBhvr>
+                                        <p:cTn id="9" dur="1" fill="hold">
+                                          <p:stCondLst>
+                                            <p:cond delay="0"/>
+                                          </p:stCondLst>
+                                        </p:cTn>
+                                        <p:tgtEl>
+                                          <p:spTgt spid="3">
+                                            <p:txEl>
+                                              <p:pRg st="1" end="1"/>
+                                            </p:txEl>
+                                          </p:spTgt>
+                                        </p:tgtEl>
+                                        <p:attrNameLst>
+                                          <p:attrName>style.visibility</p:attrName>
+                                        </p:attrNameLst>
+                                      </p:cBhvr>
+                                      <p:to>
+                                        <p:strVal val="visible"/>
+                                      </p:to>
+                                    </p:set>
+                                    <p:animEffect transition="in" filter="checkerboard(across)">
+                                      <p:cBhvr>
+                                        <p:cTn id="10" dur="500"/>
+                                        <p:tgtEl>
+                                          <p:spTgt spid="3">
+                                            <p:txEl>
+                                              <p:pRg st="1" end="1"/>
+                                            </p:txEl>
+                                          </p:spTgt>
+                                        </p:tgtEl>
+                                      </p:cBhvr>
+                                    </p:animEffect>
+                                  </p:childTnLst>
+                                </p:cTn>
+                              </p:par>
+                              <p:par>
+                                <p:cTn id="11" presetID="5" presetClass="entr" presetSubtype="10" fill="hold" nodeType="withEffect">
+                                  <p:stCondLst>
+                                    <p:cond delay="0"/>
+                                  </p:stCondLst>
+                                  <p:childTnLst>
+                                    <p:set>
+                                      <p:cBhvr>
+                                        <p:cTn id="12" dur="1" fill="hold">
+                                          <p:stCondLst>
+                                            <p:cond delay="0"/>
+                                          </p:stCondLst>
+                                        </p:cTn>
+                                        <p:tgtEl>
+                                          <p:spTgt spid="3">
+                                            <p:txEl>
+                                              <p:pRg st="2" end="2"/>
+                                            </p:txEl>
+                                          </p:spTgt>
+                                        </p:tgtEl>
+                                        <p:attrNameLst>
+                                          <p:attrName>style.visibility</p:attrName>
+                                        </p:attrNameLst>
+                                      </p:cBhvr>
+                                      <p:to>
+                                        <p:strVal val="visible"/>
+                                      </p:to>
+                                    </p:set>
+                                    <p:animEffect transition="in" filter="checkerboard(across)">
+                                      <p:cBhvr>
+                                        <p:cTn id="13" dur="500"/>
+                                        <p:tgtEl>
+                                          <p:spTgt spid="3">
+                                            <p:txEl>
+                                              <p:pRg st="2" end="2"/>
+                                            </p:txEl>
+                                          </p:spTgt>
+                                        </p:tgtEl>
+                                      </p:cBhvr>
+                                    </p:animEffect>
+                                  </p:childTnLst>
+                                </p:cTn>
+                              </p:par>
+                              <p:par>
+                                <p:cTn id="14" presetID="5" presetClass="entr" presetSubtype="10" fill="hold" nodeType="withEffect">
+                                  <p:stCondLst>
+                                    <p:cond delay="0"/>
+                                  </p:stCondLst>
+                                  <p:childTnLst>
+                                    <p:set>
+                                      <p:cBhvr>
+                                        <p:cTn id="15" dur="1" fill="hold">
+                                          <p:stCondLst>
+                                            <p:cond delay="0"/>
+                                          </p:stCondLst>
+                                        </p:cTn>
+                                        <p:tgtEl>
+                                          <p:spTgt spid="3">
+                                            <p:txEl>
+                                              <p:pRg st="3" end="3"/>
+                                            </p:txEl>
+                                          </p:spTgt>
+                                        </p:tgtEl>
+                                        <p:attrNameLst>
+                                          <p:attrName>style.visibility</p:attrName>
+                                        </p:attrNameLst>
+                                      </p:cBhvr>
+                                      <p:to>
+                                        <p:strVal val="visible"/>
+                                      </p:to>
+                                    </p:set>
+                                    <p:animEffect transition="in" filter="checkerboard(across)">
+                                      <p:cBhvr>
+                                        <p:cTn id="16" dur="500"/>
+                                        <p:tgtEl>
+                                          <p:spTgt spid="3">
+                                            <p:txEl>
+                                              <p:pRg st="3" end="3"/>
+                                            </p:txEl>
+                                          </p:spTgt>
+                                        </p:tgtEl>
+                                      </p:cBhvr>
+                                    </p:animEffect>
+                                  </p:childTnLst>
+                                </p:cTn>
+                              </p:par>
+                              <p:par>
+                                <p:cTn id="17" presetID="5" presetClass="entr" presetSubtype="10" fill="hold" nodeType="withEffect">
+                                  <p:stCondLst>
+                                    <p:cond delay="0"/>
+                                  </p:stCondLst>
+                                  <p:childTnLst>
+                                    <p:set>
+                                      <p:cBhvr>
+                                        <p:cTn id="18" dur="1" fill="hold">
+                                          <p:stCondLst>
+                                            <p:cond delay="0"/>
+                                          </p:stCondLst>
+                                        </p:cTn>
+                                        <p:tgtEl>
+                                          <p:spTgt spid="3">
+                                            <p:txEl>
+                                              <p:pRg st="4" end="4"/>
+                                            </p:txEl>
+                                          </p:spTgt>
+                                        </p:tgtEl>
+                                        <p:attrNameLst>
+                                          <p:attrName>style.visibility</p:attrName>
+                                        </p:attrNameLst>
+                                      </p:cBhvr>
+                                      <p:to>
+                                        <p:strVal val="visible"/>
+                                      </p:to>
+                                    </p:set>
+                                    <p:animEffect transition="in" filter="checkerboard(across)">
+                                      <p:cBhvr>
+                                        <p:cTn id="19" dur="500"/>
+                                        <p:tgtEl>
+                                          <p:spTgt spid="3">
+                                            <p:txEl>
+                                              <p:pRg st="4" end="4"/>
+                                            </p:txEl>
+                                          </p:spTgt>
+                                        </p:tgtEl>
+                                      </p:cBhvr>
+                                    </p:animEffect>
+                                  </p:childTnLst>
+                                </p:cTn>
+                              </p:par>
+                              <p:par>
+                                <p:cTn id="20" presetID="5" presetClass="entr" presetSubtype="10" fill="hold" nodeType="withEffect">
+                                  <p:stCondLst>
+                                    <p:cond delay="0"/>
+                                  </p:stCondLst>
+                                  <p:childTnLst>
+                                    <p:set>
+                                      <p:cBhvr>
+                                        <p:cTn id="21" dur="1" fill="hold">
+                                          <p:stCondLst>
+                                            <p:cond delay="0"/>
+                                          </p:stCondLst>
+                                        </p:cTn>
+                                        <p:tgtEl>
+                                          <p:spTgt spid="3">
+                                            <p:txEl>
+                                              <p:pRg st="5" end="5"/>
+                                            </p:txEl>
+                                          </p:spTgt>
+                                        </p:tgtEl>
+                                        <p:attrNameLst>
+                                          <p:attrName>style.visibility</p:attrName>
+                                        </p:attrNameLst>
+                                      </p:cBhvr>
+                                      <p:to>
+                                        <p:strVal val="visible"/>
+                                      </p:to>
+                                    </p:set>
+                                    <p:animEffect transition="in" filter="checkerboard(across)">
+                                      <p:cBhvr>
+                                        <p:cTn id="22" dur="500"/>
+                                        <p:tgtEl>
+                                          <p:spTgt spid="3">
+                                            <p:txEl>
+                                              <p:pRg st="5" end="5"/>
+                                            </p:txEl>
+                                          </p:spTgt>
+                                        </p:tgtEl>
+                                      </p:cBhvr>
+                                    </p:animEffect>
+                                  </p:childTnLst>
+                                </p:cTn>
+                              </p:par>
+                              <p:par>
+                                <p:cTn id="23" presetID="5" presetClass="entr" presetSubtype="10" fill="hold" nodeType="withEffect">
+                                  <p:stCondLst>
+                                    <p:cond delay="0"/>
+                                  </p:stCondLst>
+                                  <p:childTnLst>
+                                    <p:set>
+                                      <p:cBhvr>
+                                        <p:cTn id="24" dur="1" fill="hold">
+                                          <p:stCondLst>
+                                            <p:cond delay="0"/>
+                                          </p:stCondLst>
+                                        </p:cTn>
+                                        <p:tgtEl>
+                                          <p:spTgt spid="3">
+                                            <p:txEl>
+                                              <p:pRg st="6" end="6"/>
+                                            </p:txEl>
+                                          </p:spTgt>
+                                        </p:tgtEl>
+                                        <p:attrNameLst>
+                                          <p:attrName>style.visibility</p:attrName>
+                                        </p:attrNameLst>
+                                      </p:cBhvr>
+                                      <p:to>
+                                        <p:strVal val="visible"/>
+                                      </p:to>
+                                    </p:set>
+                                    <p:animEffect transition="in" filter="checkerboard(across)">
+                                      <p:cBhvr>
+                                        <p:cTn id="25" dur="500"/>
+                                        <p:tgtEl>
+                                          <p:spTgt spid="3">
+                                            <p:txEl>
+                                              <p:pRg st="6" end="6"/>
+                                            </p:txEl>
+                                          </p:spTgt>
+                                        </p:tgtEl>
+                                      </p:cBhvr>
+                                    </p:animEffect>
+                                  </p:childTnLst>
+                                </p:cTn>
+                              </p:par>
+                            </p:childTnLst>
+                          </p:cTn>
+                        </p:par>
+                      </p:childTnLst>
+                    </p:cTn>
+                  </p:par>
+                </p:childTnLst>
+              </p:cTn>
+              <p:prevCondLst>
+                <p:cond evt="onPrev" delay="0">
+                  <p:tgtEl>
+                    <p:sldTgt/>
+                  </p:tgtEl>
+                </p:cond>
+              </p:prevCondLst>
+              <p:nextCondLst>
+                <p:cond evt="onNext" delay="0">
+                  <p:tgtEl>
+                    <p:sldTgt/>
+                  </p:tgtEl>
+                </p:cond>
+              </p:nextCondLst>
+            </p:seq>
+          </p:childTnLst>
+        </p:cTn>
+      </p:par>
+    </p:tnLst>
+  </p:timing>
 </p:sld>
 </file>
 
@@ -6028,46 +6784,11 @@
             </a:r>
             <a:r>
               <a:rPr lang="en-US" dirty="0"/>
-              <a:t> (XOM)</a:t>
-            </a:r>
-          </a:p>
-        </p:txBody>
-      </p:sp>
-      <p:pic>
-        <p:nvPicPr>
-          <p:cNvPr id="7" name="Content Placeholder 6" descr="Text&#10;&#10;Description automatically generated">
-            <a:extLst>
-              <a:ext uri="{FF2B5EF4-FFF2-40B4-BE49-F238E27FC236}">
-                <a16:creationId xmlns:a16="http://schemas.microsoft.com/office/drawing/2014/main" id="{3050D8A8-53E0-44F1-BC76-621215DCB520}"/>
-              </a:ext>
-            </a:extLst>
-          </p:cNvPr>
-          <p:cNvPicPr>
-            <a:picLocks noGrp="1" noChangeAspect="1"/>
-          </p:cNvPicPr>
-          <p:nvPr>
-            <p:ph sz="quarter" idx="4"/>
-          </p:nvPr>
-        </p:nvPicPr>
-        <p:blipFill>
-          <a:blip r:embed="rId3" cstate="print">
-            <a:extLst>
-              <a:ext uri="{28A0092B-C50C-407E-A947-70E740481C1C}">
-                <a14:useLocalDpi xmlns:a14="http://schemas.microsoft.com/office/drawing/2010/main" val="0"/>
-              </a:ext>
-            </a:extLst>
-          </a:blip>
-          <a:stretch>
-            <a:fillRect/>
-          </a:stretch>
-        </p:blipFill>
-        <p:spPr>
-          <a:xfrm>
-            <a:off x="4712680" y="1870997"/>
-            <a:ext cx="3799386" cy="1548464"/>
-          </a:xfrm>
-        </p:spPr>
-      </p:pic>
+              <a:t> (ARKK)</a:t>
+            </a:r>
+          </a:p>
+        </p:txBody>
+      </p:sp>
       <p:sp>
         <p:nvSpPr>
           <p:cNvPr id="12" name="Text Placeholder 11">
@@ -6122,7 +6843,7 @@
           </p:nvPr>
         </p:nvPicPr>
         <p:blipFill>
-          <a:blip r:embed="rId4" cstate="print">
+          <a:blip r:embed="rId3" cstate="print">
             <a:extLst>
               <a:ext uri="{28A0092B-C50C-407E-A947-70E740481C1C}">
                 <a14:useLocalDpi xmlns:a14="http://schemas.microsoft.com/office/drawing/2010/main" val="0"/>
@@ -6155,7 +6876,7 @@
           <p:nvPr/>
         </p:nvPicPr>
         <p:blipFill>
-          <a:blip r:embed="rId5" cstate="print">
+          <a:blip r:embed="rId4" cstate="print">
             <a:extLst>
               <a:ext uri="{28A0092B-C50C-407E-A947-70E740481C1C}">
                 <a14:useLocalDpi xmlns:a14="http://schemas.microsoft.com/office/drawing/2010/main" val="0"/>
@@ -6178,20 +6899,22 @@
       </p:pic>
       <p:pic>
         <p:nvPicPr>
-          <p:cNvPr id="13" name="Picture 12" descr="Text&#10;&#10;Description automatically generated with medium confidence">
+          <p:cNvPr id="10" name="Content Placeholder 9" descr="Text&#10;&#10;Description automatically generated">
             <a:extLst>
               <a:ext uri="{FF2B5EF4-FFF2-40B4-BE49-F238E27FC236}">
-                <a16:creationId xmlns:a16="http://schemas.microsoft.com/office/drawing/2014/main" id="{E66D4711-50D2-E4BC-BEE2-CB17A98C4F76}"/>
+                <a16:creationId xmlns:a16="http://schemas.microsoft.com/office/drawing/2014/main" id="{48F484DE-D853-A8AF-C33E-2EE64CA7DDBC}"/>
               </a:ext>
             </a:extLst>
           </p:cNvPr>
           <p:cNvPicPr>
-            <a:picLocks noChangeAspect="1"/>
+            <a:picLocks noGrp="1" noChangeAspect="1"/>
           </p:cNvPicPr>
-          <p:nvPr/>
+          <p:nvPr>
+            <p:ph sz="quarter" idx="4"/>
+          </p:nvPr>
         </p:nvPicPr>
         <p:blipFill>
-          <a:blip r:embed="rId6" cstate="print">
+          <a:blip r:embed="rId5">
             <a:extLst>
               <a:ext uri="{28A0092B-C50C-407E-A947-70E740481C1C}">
                 <a14:useLocalDpi xmlns:a14="http://schemas.microsoft.com/office/drawing/2010/main" val="0"/>
@@ -6204,8 +6927,41 @@
         </p:blipFill>
         <p:spPr>
           <a:xfrm>
-            <a:off x="4712680" y="3508044"/>
-            <a:ext cx="3799387" cy="1548464"/>
+            <a:off x="4712680" y="1871393"/>
+            <a:ext cx="3799387" cy="1548463"/>
+          </a:xfrm>
+        </p:spPr>
+      </p:pic>
+      <p:pic>
+        <p:nvPicPr>
+          <p:cNvPr id="14" name="Picture 13" descr="A picture containing graphical user interface&#10;&#10;Description automatically generated">
+            <a:extLst>
+              <a:ext uri="{FF2B5EF4-FFF2-40B4-BE49-F238E27FC236}">
+                <a16:creationId xmlns:a16="http://schemas.microsoft.com/office/drawing/2014/main" id="{92986908-633E-95C1-ED46-732CD4D0D036}"/>
+              </a:ext>
+            </a:extLst>
+          </p:cNvPr>
+          <p:cNvPicPr>
+            <a:picLocks noChangeAspect="1"/>
+          </p:cNvPicPr>
+          <p:nvPr/>
+        </p:nvPicPr>
+        <p:blipFill>
+          <a:blip r:embed="rId6">
+            <a:extLst>
+              <a:ext uri="{28A0092B-C50C-407E-A947-70E740481C1C}">
+                <a14:useLocalDpi xmlns:a14="http://schemas.microsoft.com/office/drawing/2010/main" val="0"/>
+              </a:ext>
+            </a:extLst>
+          </a:blip>
+          <a:stretch>
+            <a:fillRect/>
+          </a:stretch>
+        </p:blipFill>
+        <p:spPr>
+          <a:xfrm>
+            <a:off x="4712679" y="3508170"/>
+            <a:ext cx="3799387" cy="1548463"/>
           </a:xfrm>
           <a:prstGeom prst="rect">
             <a:avLst/>
@@ -6499,7 +7255,7 @@
                                           </p:stCondLst>
                                         </p:cTn>
                                         <p:tgtEl>
-                                          <p:spTgt spid="7"/>
+                                          <p:spTgt spid="10"/>
                                         </p:tgtEl>
                                         <p:attrNameLst>
                                           <p:attrName>style.visibility</p:attrName>
@@ -6513,7 +7269,7 @@
                                       <p:cBhvr additive="base">
                                         <p:cTn id="19" dur="500" fill="hold"/>
                                         <p:tgtEl>
-                                          <p:spTgt spid="7"/>
+                                          <p:spTgt spid="10"/>
                                         </p:tgtEl>
                                         <p:attrNameLst>
                                           <p:attrName>ppt_x</p:attrName>
@@ -6536,7 +7292,7 @@
                                       <p:cBhvr additive="base">
                                         <p:cTn id="20" dur="500" fill="hold"/>
                                         <p:tgtEl>
-                                          <p:spTgt spid="7"/>
+                                          <p:spTgt spid="10"/>
                                         </p:tgtEl>
                                         <p:attrNameLst>
                                           <p:attrName>ppt_y</p:attrName>
@@ -6663,7 +7419,7 @@
                                           </p:stCondLst>
                                         </p:cTn>
                                         <p:tgtEl>
-                                          <p:spTgt spid="13"/>
+                                          <p:spTgt spid="14"/>
                                         </p:tgtEl>
                                         <p:attrNameLst>
                                           <p:attrName>style.visibility</p:attrName>
@@ -6677,7 +7433,7 @@
                                       <p:cBhvr additive="base">
                                         <p:cTn id="29" dur="500" fill="hold"/>
                                         <p:tgtEl>
-                                          <p:spTgt spid="13"/>
+                                          <p:spTgt spid="14"/>
                                         </p:tgtEl>
                                         <p:attrNameLst>
                                           <p:attrName>ppt_x</p:attrName>
@@ -6700,7 +7456,7 @@
                                       <p:cBhvr additive="base">
                                         <p:cTn id="30" dur="500" fill="hold"/>
                                         <p:tgtEl>
-                                          <p:spTgt spid="13"/>
+                                          <p:spTgt spid="14"/>
                                         </p:tgtEl>
                                         <p:attrNameLst>
                                           <p:attrName>ppt_y</p:attrName>
@@ -6835,46 +7591,11 @@
           <a:p>
             <a:r>
               <a:rPr lang="en-US" dirty="0"/>
-              <a:t>Sentiment Score (XOM)</a:t>
-            </a:r>
-          </a:p>
-        </p:txBody>
-      </p:sp>
-      <p:pic>
-        <p:nvPicPr>
-          <p:cNvPr id="7" name="Content Placeholder 6" descr="Scatter chart&#10;&#10;Description automatically generated">
-            <a:extLst>
-              <a:ext uri="{FF2B5EF4-FFF2-40B4-BE49-F238E27FC236}">
-                <a16:creationId xmlns:a16="http://schemas.microsoft.com/office/drawing/2014/main" id="{0ED5C9F4-84B7-4FE1-CDDC-5F0A39E3AA16}"/>
-              </a:ext>
-            </a:extLst>
-          </p:cNvPr>
-          <p:cNvPicPr>
-            <a:picLocks noGrp="1" noChangeAspect="1"/>
-          </p:cNvPicPr>
-          <p:nvPr>
-            <p:ph sz="quarter" idx="4"/>
-          </p:nvPr>
-        </p:nvPicPr>
-        <p:blipFill>
-          <a:blip r:embed="rId2" cstate="print">
-            <a:extLst>
-              <a:ext uri="{28A0092B-C50C-407E-A947-70E740481C1C}">
-                <a14:useLocalDpi xmlns:a14="http://schemas.microsoft.com/office/drawing/2010/main" val="0"/>
-              </a:ext>
-            </a:extLst>
-          </a:blip>
-          <a:stretch>
-            <a:fillRect/>
-          </a:stretch>
-        </p:blipFill>
-        <p:spPr>
-          <a:xfrm>
-            <a:off x="4744529" y="2020382"/>
-            <a:ext cx="4041775" cy="1102302"/>
-          </a:xfrm>
-        </p:spPr>
-      </p:pic>
+              <a:t>Sentiment Score (ARKK)</a:t>
+            </a:r>
+          </a:p>
+        </p:txBody>
+      </p:sp>
       <p:sp>
         <p:nvSpPr>
           <p:cNvPr id="12" name="Text Placeholder 11">
@@ -6927,7 +7648,7 @@
           </p:nvPr>
         </p:nvPicPr>
         <p:blipFill>
-          <a:blip r:embed="rId3" cstate="print">
+          <a:blip r:embed="rId2" cstate="print">
             <a:extLst>
               <a:ext uri="{28A0092B-C50C-407E-A947-70E740481C1C}">
                 <a14:useLocalDpi xmlns:a14="http://schemas.microsoft.com/office/drawing/2010/main" val="0"/>
@@ -7112,7 +7833,7 @@
           <a:p>
             <a:r>
               <a:rPr lang="en-US" dirty="0"/>
-              <a:t>Correlation (XOM)</a:t>
+              <a:t>Correlation (ARKK)</a:t>
             </a:r>
           </a:p>
         </p:txBody>
@@ -7304,7 +8025,7 @@
           <p:nvPr/>
         </p:nvPicPr>
         <p:blipFill>
-          <a:blip r:embed="rId4">
+          <a:blip r:embed="rId3">
             <a:extLst>
               <a:ext uri="{28A0092B-C50C-407E-A947-70E740481C1C}">
                 <a14:useLocalDpi xmlns:a14="http://schemas.microsoft.com/office/drawing/2010/main" val="0"/>
@@ -7327,10 +8048,45 @@
       </p:pic>
       <p:pic>
         <p:nvPicPr>
-          <p:cNvPr id="18" name="Picture 17" descr="A picture containing graphical user interface&#10;&#10;Description automatically generated">
+          <p:cNvPr id="10" name="Content Placeholder 9" descr="Calendar&#10;&#10;Description automatically generated">
             <a:extLst>
               <a:ext uri="{FF2B5EF4-FFF2-40B4-BE49-F238E27FC236}">
-                <a16:creationId xmlns:a16="http://schemas.microsoft.com/office/drawing/2014/main" id="{01D7D93E-E493-990B-C4F4-77ACCEB12E5F}"/>
+                <a16:creationId xmlns:a16="http://schemas.microsoft.com/office/drawing/2014/main" id="{6DFE270D-2F00-D0D0-54F7-FD616867E155}"/>
+              </a:ext>
+            </a:extLst>
+          </p:cNvPr>
+          <p:cNvPicPr>
+            <a:picLocks noGrp="1" noChangeAspect="1"/>
+          </p:cNvPicPr>
+          <p:nvPr>
+            <p:ph sz="quarter" idx="4"/>
+          </p:nvPr>
+        </p:nvPicPr>
+        <p:blipFill>
+          <a:blip r:embed="rId4">
+            <a:extLst>
+              <a:ext uri="{28A0092B-C50C-407E-A947-70E740481C1C}">
+                <a14:useLocalDpi xmlns:a14="http://schemas.microsoft.com/office/drawing/2010/main" val="0"/>
+              </a:ext>
+            </a:extLst>
+          </a:blip>
+          <a:stretch>
+            <a:fillRect/>
+          </a:stretch>
+        </p:blipFill>
+        <p:spPr>
+          <a:xfrm>
+            <a:off x="4746119" y="2020815"/>
+            <a:ext cx="4041775" cy="1102302"/>
+          </a:xfrm>
+        </p:spPr>
+      </p:pic>
+      <p:pic>
+        <p:nvPicPr>
+          <p:cNvPr id="14" name="Picture 13" descr="A picture containing graphical user interface&#10;&#10;Description automatically generated">
+            <a:extLst>
+              <a:ext uri="{FF2B5EF4-FFF2-40B4-BE49-F238E27FC236}">
+                <a16:creationId xmlns:a16="http://schemas.microsoft.com/office/drawing/2014/main" id="{1F9138EA-9A19-D79D-BECE-ACCF24DB2D8A}"/>
               </a:ext>
             </a:extLst>
           </p:cNvPr>
@@ -7353,8 +8109,8 @@
         </p:blipFill>
         <p:spPr>
           <a:xfrm>
-            <a:off x="4698575" y="3726262"/>
-            <a:ext cx="3899658" cy="1177474"/>
+            <a:off x="4746119" y="3715444"/>
+            <a:ext cx="4069682" cy="1188292"/>
           </a:xfrm>
           <a:prstGeom prst="rect">
             <a:avLst/>
@@ -7549,33 +8305,15 @@
                                   </p:childTnLst>
                                 </p:cTn>
                               </p:par>
-                            </p:childTnLst>
-                          </p:cTn>
-                        </p:par>
-                      </p:childTnLst>
-                    </p:cTn>
-                  </p:par>
-                  <p:par>
-                    <p:cTn id="13" fill="hold">
-                      <p:stCondLst>
-                        <p:cond delay="indefinite"/>
-                      </p:stCondLst>
-                      <p:childTnLst>
-                        <p:par>
-                          <p:cTn id="14" fill="hold">
-                            <p:stCondLst>
-                              <p:cond delay="0"/>
-                            </p:stCondLst>
-                            <p:childTnLst>
                               <p:par>
-                                <p:cTn id="15" presetID="2" presetClass="entr" presetSubtype="4" fill="hold" grpId="0" nodeType="clickEffect">
+                                <p:cTn id="13" presetID="2" presetClass="entr" presetSubtype="4" fill="hold" grpId="0" nodeType="withEffect">
                                   <p:stCondLst>
                                     <p:cond delay="0"/>
                                   </p:stCondLst>
                                   <p:childTnLst>
                                     <p:set>
                                       <p:cBhvr>
-                                        <p:cTn id="16" dur="1" fill="hold">
+                                        <p:cTn id="14" dur="1" fill="hold">
                                           <p:stCondLst>
                                             <p:cond delay="0"/>
                                           </p:stCondLst>
@@ -7597,7 +8335,7 @@
                                     </p:set>
                                     <p:anim calcmode="lin" valueType="num">
                                       <p:cBhvr additive="base">
-                                        <p:cTn id="17" dur="500" fill="hold"/>
+                                        <p:cTn id="15" dur="500" fill="hold"/>
                                         <p:tgtEl>
                                           <p:spTgt spid="3">
                                             <p:txEl>
@@ -7624,7 +8362,7 @@
                                     </p:anim>
                                     <p:anim calcmode="lin" valueType="num">
                                       <p:cBhvr additive="base">
-                                        <p:cTn id="18" dur="500" fill="hold"/>
+                                        <p:cTn id="16" dur="500" fill="hold"/>
                                         <p:tgtEl>
                                           <p:spTgt spid="3">
                                             <p:txEl>
@@ -7653,20 +8391,20 @@
                                 </p:cTn>
                               </p:par>
                               <p:par>
-                                <p:cTn id="19" presetID="2" presetClass="entr" presetSubtype="4" fill="hold" nodeType="withEffect">
+                                <p:cTn id="17" presetID="2" presetClass="entr" presetSubtype="4" fill="hold" nodeType="withEffect">
                                   <p:stCondLst>
                                     <p:cond delay="0"/>
                                   </p:stCondLst>
                                   <p:childTnLst>
                                     <p:set>
                                       <p:cBhvr>
-                                        <p:cTn id="20" dur="1" fill="hold">
+                                        <p:cTn id="18" dur="1" fill="hold">
                                           <p:stCondLst>
                                             <p:cond delay="0"/>
                                           </p:stCondLst>
                                         </p:cTn>
                                         <p:tgtEl>
-                                          <p:spTgt spid="7"/>
+                                          <p:spTgt spid="10"/>
                                         </p:tgtEl>
                                         <p:attrNameLst>
                                           <p:attrName>style.visibility</p:attrName>
@@ -7678,9 +8416,9 @@
                                     </p:set>
                                     <p:anim calcmode="lin" valueType="num">
                                       <p:cBhvr additive="base">
-                                        <p:cTn id="21" dur="500" fill="hold"/>
+                                        <p:cTn id="19" dur="500" fill="hold"/>
                                         <p:tgtEl>
-                                          <p:spTgt spid="7"/>
+                                          <p:spTgt spid="10"/>
                                         </p:tgtEl>
                                         <p:attrNameLst>
                                           <p:attrName>ppt_x</p:attrName>
@@ -7701,9 +8439,9 @@
                                     </p:anim>
                                     <p:anim calcmode="lin" valueType="num">
                                       <p:cBhvr additive="base">
-                                        <p:cTn id="22" dur="500" fill="hold"/>
+                                        <p:cTn id="20" dur="500" fill="hold"/>
                                         <p:tgtEl>
-                                          <p:spTgt spid="7"/>
+                                          <p:spTgt spid="10"/>
                                         </p:tgtEl>
                                         <p:attrNameLst>
                                           <p:attrName>ppt_y</p:attrName>
@@ -7732,26 +8470,26 @@
                     </p:cTn>
                   </p:par>
                   <p:par>
-                    <p:cTn id="23" fill="hold">
+                    <p:cTn id="21" fill="hold">
                       <p:stCondLst>
                         <p:cond delay="indefinite"/>
                       </p:stCondLst>
                       <p:childTnLst>
                         <p:par>
-                          <p:cTn id="24" fill="hold">
+                          <p:cTn id="22" fill="hold">
                             <p:stCondLst>
                               <p:cond delay="0"/>
                             </p:stCondLst>
                             <p:childTnLst>
                               <p:par>
-                                <p:cTn id="25" presetID="2" presetClass="entr" presetSubtype="4" fill="hold" grpId="0" nodeType="clickEffect">
+                                <p:cTn id="23" presetID="2" presetClass="entr" presetSubtype="4" fill="hold" grpId="0" nodeType="clickEffect">
                                   <p:stCondLst>
                                     <p:cond delay="0"/>
                                   </p:stCondLst>
                                   <p:childTnLst>
                                     <p:set>
                                       <p:cBhvr>
-                                        <p:cTn id="26" dur="1" fill="hold">
+                                        <p:cTn id="24" dur="1" fill="hold">
                                           <p:stCondLst>
                                             <p:cond delay="0"/>
                                           </p:stCondLst>
@@ -7769,7 +8507,7 @@
                                     </p:set>
                                     <p:anim calcmode="lin" valueType="num">
                                       <p:cBhvr additive="base">
-                                        <p:cTn id="27" dur="500" fill="hold"/>
+                                        <p:cTn id="25" dur="500" fill="hold"/>
                                         <p:tgtEl>
                                           <p:spTgt spid="15"/>
                                         </p:tgtEl>
@@ -7792,7 +8530,7 @@
                                     </p:anim>
                                     <p:anim calcmode="lin" valueType="num">
                                       <p:cBhvr additive="base">
-                                        <p:cTn id="28" dur="500" fill="hold"/>
+                                        <p:cTn id="26" dur="500" fill="hold"/>
                                         <p:tgtEl>
                                           <p:spTgt spid="15"/>
                                         </p:tgtEl>
@@ -7817,14 +8555,14 @@
                                 </p:cTn>
                               </p:par>
                               <p:par>
-                                <p:cTn id="29" presetID="2" presetClass="entr" presetSubtype="4" fill="hold" nodeType="withEffect">
+                                <p:cTn id="27" presetID="2" presetClass="entr" presetSubtype="4" fill="hold" nodeType="withEffect">
                                   <p:stCondLst>
                                     <p:cond delay="0"/>
                                   </p:stCondLst>
                                   <p:childTnLst>
                                     <p:set>
                                       <p:cBhvr>
-                                        <p:cTn id="30" dur="1" fill="hold">
+                                        <p:cTn id="28" dur="1" fill="hold">
                                           <p:stCondLst>
                                             <p:cond delay="0"/>
                                           </p:stCondLst>
@@ -7842,7 +8580,7 @@
                                     </p:set>
                                     <p:anim calcmode="lin" valueType="num">
                                       <p:cBhvr additive="base">
-                                        <p:cTn id="31" dur="500" fill="hold"/>
+                                        <p:cTn id="29" dur="500" fill="hold"/>
                                         <p:tgtEl>
                                           <p:spTgt spid="9"/>
                                         </p:tgtEl>
@@ -7865,7 +8603,7 @@
                                     </p:anim>
                                     <p:anim calcmode="lin" valueType="num">
                                       <p:cBhvr additive="base">
-                                        <p:cTn id="32" dur="500" fill="hold"/>
+                                        <p:cTn id="30" dur="500" fill="hold"/>
                                         <p:tgtEl>
                                           <p:spTgt spid="9"/>
                                         </p:tgtEl>
@@ -7889,33 +8627,15 @@
                                   </p:childTnLst>
                                 </p:cTn>
                               </p:par>
-                            </p:childTnLst>
-                          </p:cTn>
-                        </p:par>
-                      </p:childTnLst>
-                    </p:cTn>
-                  </p:par>
-                  <p:par>
-                    <p:cTn id="33" fill="hold">
-                      <p:stCondLst>
-                        <p:cond delay="indefinite"/>
-                      </p:stCondLst>
-                      <p:childTnLst>
-                        <p:par>
-                          <p:cTn id="34" fill="hold">
-                            <p:stCondLst>
-                              <p:cond delay="0"/>
-                            </p:stCondLst>
-                            <p:childTnLst>
                               <p:par>
-                                <p:cTn id="35" presetID="2" presetClass="entr" presetSubtype="4" fill="hold" grpId="0" nodeType="clickEffect">
+                                <p:cTn id="31" presetID="2" presetClass="entr" presetSubtype="4" fill="hold" grpId="0" nodeType="withEffect">
                                   <p:stCondLst>
                                     <p:cond delay="0"/>
                                   </p:stCondLst>
                                   <p:childTnLst>
                                     <p:set>
                                       <p:cBhvr>
-                                        <p:cTn id="36" dur="1" fill="hold">
+                                        <p:cTn id="32" dur="1" fill="hold">
                                           <p:stCondLst>
                                             <p:cond delay="0"/>
                                           </p:stCondLst>
@@ -7933,7 +8653,7 @@
                                     </p:set>
                                     <p:anim calcmode="lin" valueType="num">
                                       <p:cBhvr additive="base">
-                                        <p:cTn id="37" dur="500" fill="hold"/>
+                                        <p:cTn id="33" dur="500" fill="hold"/>
                                         <p:tgtEl>
                                           <p:spTgt spid="11"/>
                                         </p:tgtEl>
@@ -7956,7 +8676,7 @@
                                     </p:anim>
                                     <p:anim calcmode="lin" valueType="num">
                                       <p:cBhvr additive="base">
-                                        <p:cTn id="38" dur="500" fill="hold"/>
+                                        <p:cTn id="34" dur="500" fill="hold"/>
                                         <p:tgtEl>
                                           <p:spTgt spid="11"/>
                                         </p:tgtEl>
@@ -7981,20 +8701,20 @@
                                 </p:cTn>
                               </p:par>
                               <p:par>
-                                <p:cTn id="39" presetID="2" presetClass="entr" presetSubtype="4" fill="hold" nodeType="withEffect">
+                                <p:cTn id="35" presetID="2" presetClass="entr" presetSubtype="4" fill="hold" nodeType="withEffect">
                                   <p:stCondLst>
                                     <p:cond delay="0"/>
                                   </p:stCondLst>
                                   <p:childTnLst>
                                     <p:set>
                                       <p:cBhvr>
-                                        <p:cTn id="40" dur="1" fill="hold">
+                                        <p:cTn id="36" dur="1" fill="hold">
                                           <p:stCondLst>
                                             <p:cond delay="0"/>
                                           </p:stCondLst>
                                         </p:cTn>
                                         <p:tgtEl>
-                                          <p:spTgt spid="18"/>
+                                          <p:spTgt spid="14"/>
                                         </p:tgtEl>
                                         <p:attrNameLst>
                                           <p:attrName>style.visibility</p:attrName>
@@ -8006,9 +8726,9 @@
                                     </p:set>
                                     <p:anim calcmode="lin" valueType="num">
                                       <p:cBhvr additive="base">
-                                        <p:cTn id="41" dur="500" fill="hold"/>
+                                        <p:cTn id="37" dur="500" fill="hold"/>
                                         <p:tgtEl>
-                                          <p:spTgt spid="18"/>
+                                          <p:spTgt spid="14"/>
                                         </p:tgtEl>
                                         <p:attrNameLst>
                                           <p:attrName>ppt_x</p:attrName>
@@ -8029,9 +8749,9 @@
                                     </p:anim>
                                     <p:anim calcmode="lin" valueType="num">
                                       <p:cBhvr additive="base">
-                                        <p:cTn id="42" dur="500" fill="hold"/>
+                                        <p:cTn id="38" dur="500" fill="hold"/>
                                         <p:tgtEl>
-                                          <p:spTgt spid="18"/>
+                                          <p:spTgt spid="14"/>
                                         </p:tgtEl>
                                         <p:attrNameLst>
                                           <p:attrName>ppt_y</p:attrName>

</xml_diff>